<commit_message>
update efficient demonstration steps
</commit_message>
<xml_diff>
--- a/KICMistral_pre_v2.pptx
+++ b/KICMistral_pre_v2.pptx
@@ -5,7 +5,7 @@
     <p:sldMasterId id="2147483858" r:id="rId1"/>
   </p:sldMasterIdLst>
   <p:notesMasterIdLst>
-    <p:notesMasterId r:id="rId9"/>
+    <p:notesMasterId r:id="rId10"/>
   </p:notesMasterIdLst>
   <p:sldIdLst>
     <p:sldId id="256" r:id="rId2"/>
@@ -13,8 +13,9 @@
     <p:sldId id="257" r:id="rId4"/>
     <p:sldId id="282" r:id="rId5"/>
     <p:sldId id="285" r:id="rId6"/>
-    <p:sldId id="264" r:id="rId7"/>
-    <p:sldId id="283" r:id="rId8"/>
+    <p:sldId id="286" r:id="rId7"/>
+    <p:sldId id="264" r:id="rId8"/>
+    <p:sldId id="283" r:id="rId9"/>
   </p:sldIdLst>
   <p:sldSz cx="12192000" cy="6858000"/>
   <p:notesSz cx="6858000" cy="9144000"/>
@@ -203,7 +204,7 @@
           <a:p>
             <a:fld id="{0593CDAD-050A-435A-8B90-DDEC3FE3CFF6}" type="datetimeFigureOut">
               <a:rPr lang="en-US" smtClean="0"/>
-              <a:t>9/16/2024</a:t>
+              <a:t>9/19/2024</a:t>
             </a:fld>
             <a:endParaRPr lang="en-US"/>
           </a:p>
@@ -657,7 +658,7 @@
           <a:p>
             <a:fld id="{71BEB545-1150-4071-BC05-8EA9734F9E96}" type="datetimeFigureOut">
               <a:rPr lang="en-US" smtClean="0"/>
-              <a:t>9/16/2024</a:t>
+              <a:t>9/19/2024</a:t>
             </a:fld>
             <a:endParaRPr lang="en-US"/>
           </a:p>
@@ -932,7 +933,7 @@
           <a:p>
             <a:fld id="{71BEB545-1150-4071-BC05-8EA9734F9E96}" type="datetimeFigureOut">
               <a:rPr lang="en-US" smtClean="0"/>
-              <a:t>9/16/2024</a:t>
+              <a:t>9/19/2024</a:t>
             </a:fld>
             <a:endParaRPr lang="en-US"/>
           </a:p>
@@ -1126,7 +1127,7 @@
           <a:p>
             <a:fld id="{71BEB545-1150-4071-BC05-8EA9734F9E96}" type="datetimeFigureOut">
               <a:rPr lang="en-US" smtClean="0"/>
-              <a:t>9/16/2024</a:t>
+              <a:t>9/19/2024</a:t>
             </a:fld>
             <a:endParaRPr lang="en-US"/>
           </a:p>
@@ -1397,7 +1398,7 @@
           <a:p>
             <a:fld id="{71BEB545-1150-4071-BC05-8EA9734F9E96}" type="datetimeFigureOut">
               <a:rPr lang="en-US" smtClean="0"/>
-              <a:t>9/16/2024</a:t>
+              <a:t>9/19/2024</a:t>
             </a:fld>
             <a:endParaRPr lang="en-US"/>
           </a:p>
@@ -1724,7 +1725,7 @@
           <a:p>
             <a:fld id="{71BEB545-1150-4071-BC05-8EA9734F9E96}" type="datetimeFigureOut">
               <a:rPr lang="en-US" smtClean="0"/>
-              <a:t>9/16/2024</a:t>
+              <a:t>9/19/2024</a:t>
             </a:fld>
             <a:endParaRPr lang="en-US"/>
           </a:p>
@@ -2343,7 +2344,7 @@
           <a:p>
             <a:fld id="{71BEB545-1150-4071-BC05-8EA9734F9E96}" type="datetimeFigureOut">
               <a:rPr lang="en-US" smtClean="0"/>
-              <a:t>9/16/2024</a:t>
+              <a:t>9/19/2024</a:t>
             </a:fld>
             <a:endParaRPr lang="en-US"/>
           </a:p>
@@ -3190,7 +3191,7 @@
           <a:p>
             <a:fld id="{71BEB545-1150-4071-BC05-8EA9734F9E96}" type="datetimeFigureOut">
               <a:rPr lang="en-US" smtClean="0"/>
-              <a:t>9/16/2024</a:t>
+              <a:t>9/19/2024</a:t>
             </a:fld>
             <a:endParaRPr lang="en-US"/>
           </a:p>
@@ -3360,7 +3361,7 @@
           <a:p>
             <a:fld id="{71BEB545-1150-4071-BC05-8EA9734F9E96}" type="datetimeFigureOut">
               <a:rPr lang="en-US" smtClean="0"/>
-              <a:t>9/16/2024</a:t>
+              <a:t>9/19/2024</a:t>
             </a:fld>
             <a:endParaRPr lang="en-US"/>
           </a:p>
@@ -3540,7 +3541,7 @@
           <a:p>
             <a:fld id="{71BEB545-1150-4071-BC05-8EA9734F9E96}" type="datetimeFigureOut">
               <a:rPr lang="en-US" smtClean="0"/>
-              <a:t>9/16/2024</a:t>
+              <a:t>9/19/2024</a:t>
             </a:fld>
             <a:endParaRPr lang="en-US"/>
           </a:p>
@@ -3710,7 +3711,7 @@
           <a:p>
             <a:fld id="{71BEB545-1150-4071-BC05-8EA9734F9E96}" type="datetimeFigureOut">
               <a:rPr lang="en-US" smtClean="0"/>
-              <a:t>9/16/2024</a:t>
+              <a:t>9/19/2024</a:t>
             </a:fld>
             <a:endParaRPr lang="en-US"/>
           </a:p>
@@ -3957,7 +3958,7 @@
           <a:p>
             <a:fld id="{71BEB545-1150-4071-BC05-8EA9734F9E96}" type="datetimeFigureOut">
               <a:rPr lang="en-US" smtClean="0"/>
-              <a:t>9/16/2024</a:t>
+              <a:t>9/19/2024</a:t>
             </a:fld>
             <a:endParaRPr lang="en-US"/>
           </a:p>
@@ -4249,7 +4250,7 @@
           <a:p>
             <a:fld id="{71BEB545-1150-4071-BC05-8EA9734F9E96}" type="datetimeFigureOut">
               <a:rPr lang="en-US" smtClean="0"/>
-              <a:t>9/16/2024</a:t>
+              <a:t>9/19/2024</a:t>
             </a:fld>
             <a:endParaRPr lang="en-US"/>
           </a:p>
@@ -4698,7 +4699,7 @@
           <a:p>
             <a:fld id="{71BEB545-1150-4071-BC05-8EA9734F9E96}" type="datetimeFigureOut">
               <a:rPr lang="en-US" smtClean="0"/>
-              <a:t>9/16/2024</a:t>
+              <a:t>9/19/2024</a:t>
             </a:fld>
             <a:endParaRPr lang="en-US"/>
           </a:p>
@@ -4821,7 +4822,7 @@
           <a:p>
             <a:fld id="{71BEB545-1150-4071-BC05-8EA9734F9E96}" type="datetimeFigureOut">
               <a:rPr lang="en-US" smtClean="0"/>
-              <a:t>9/16/2024</a:t>
+              <a:t>9/19/2024</a:t>
             </a:fld>
             <a:endParaRPr lang="en-US"/>
           </a:p>
@@ -4916,7 +4917,7 @@
           <a:p>
             <a:fld id="{71BEB545-1150-4071-BC05-8EA9734F9E96}" type="datetimeFigureOut">
               <a:rPr lang="en-US" smtClean="0"/>
-              <a:t>9/16/2024</a:t>
+              <a:t>9/19/2024</a:t>
             </a:fld>
             <a:endParaRPr lang="en-US"/>
           </a:p>
@@ -5195,7 +5196,7 @@
           <a:p>
             <a:fld id="{71BEB545-1150-4071-BC05-8EA9734F9E96}" type="datetimeFigureOut">
               <a:rPr lang="en-US" smtClean="0"/>
-              <a:t>9/16/2024</a:t>
+              <a:t>9/19/2024</a:t>
             </a:fld>
             <a:endParaRPr lang="en-US"/>
           </a:p>
@@ -5475,7 +5476,7 @@
           <a:p>
             <a:fld id="{71BEB545-1150-4071-BC05-8EA9734F9E96}" type="datetimeFigureOut">
               <a:rPr lang="en-US" smtClean="0"/>
-              <a:t>9/16/2024</a:t>
+              <a:t>9/19/2024</a:t>
             </a:fld>
             <a:endParaRPr lang="en-US"/>
           </a:p>
@@ -5898,7 +5899,7 @@
           <a:p>
             <a:fld id="{71BEB545-1150-4071-BC05-8EA9734F9E96}" type="datetimeFigureOut">
               <a:rPr lang="en-US" smtClean="0"/>
-              <a:t>9/16/2024</a:t>
+              <a:t>9/19/2024</a:t>
             </a:fld>
             <a:endParaRPr lang="en-US"/>
           </a:p>
@@ -13766,6 +13767,4417 @@
       </p:grpSpPr>
       <p:sp>
         <p:nvSpPr>
+          <p:cNvPr id="15" name="Rectangle 14">
+            <a:extLst>
+              <a:ext uri="{FF2B5EF4-FFF2-40B4-BE49-F238E27FC236}">
+                <a16:creationId xmlns:a16="http://schemas.microsoft.com/office/drawing/2014/main" id="{25482F9D-E110-434E-9B4F-41A3F5CB2A2F}"/>
+              </a:ext>
+              <a:ext uri="{C183D7F6-B498-43B3-948B-1728B52AA6E4}">
+                <adec:decorative xmlns:adec="http://schemas.microsoft.com/office/drawing/2017/decorative" val="1"/>
+              </a:ext>
+            </a:extLst>
+          </p:cNvPr>
+          <p:cNvSpPr>
+            <a:spLocks noGrp="1" noRot="1" noChangeAspect="1" noMove="1" noResize="1" noEditPoints="1" noAdjustHandles="1" noChangeArrowheads="1" noChangeShapeType="1" noTextEdit="1"/>
+          </p:cNvSpPr>
+          <p:nvPr>
+            <p:extLst>
+              <p:ext uri="{386F3935-93C4-4BCD-93E2-E3B085C9AB24}">
+                <p16:designElem xmlns:p16="http://schemas.microsoft.com/office/powerpoint/2015/main" val="1"/>
+              </p:ext>
+            </p:extLst>
+          </p:nvPr>
+        </p:nvSpPr>
+        <p:spPr>
+          <a:xfrm>
+            <a:off x="0" y="0"/>
+            <a:ext cx="12191999" cy="6858000"/>
+          </a:xfrm>
+          <a:prstGeom prst="rect">
+            <a:avLst/>
+          </a:prstGeom>
+          <a:ln>
+            <a:noFill/>
+          </a:ln>
+        </p:spPr>
+        <p:style>
+          <a:lnRef idx="2">
+            <a:schemeClr val="accent1">
+              <a:shade val="50000"/>
+            </a:schemeClr>
+          </a:lnRef>
+          <a:fillRef idx="1003">
+            <a:schemeClr val="dk2"/>
+          </a:fillRef>
+          <a:effectRef idx="0">
+            <a:schemeClr val="accent1"/>
+          </a:effectRef>
+          <a:fontRef idx="minor">
+            <a:schemeClr val="lt1"/>
+          </a:fontRef>
+        </p:style>
+        <p:txBody>
+          <a:bodyPr rtlCol="0" anchor="ctr"/>
+          <a:lstStyle/>
+          <a:p>
+            <a:pPr marL="0" marR="0" lvl="0" indent="0" algn="ctr" defTabSz="457200" rtl="0" eaLnBrk="1" fontAlgn="auto" latinLnBrk="0" hangingPunct="1">
+              <a:lnSpc>
+                <a:spcPct val="100000"/>
+              </a:lnSpc>
+              <a:spcBef>
+                <a:spcPts val="0"/>
+              </a:spcBef>
+              <a:spcAft>
+                <a:spcPts val="0"/>
+              </a:spcAft>
+              <a:buClrTx/>
+              <a:buSzTx/>
+              <a:buFontTx/>
+              <a:buNone/>
+              <a:tabLst/>
+              <a:defRPr/>
+            </a:pPr>
+            <a:endParaRPr kumimoji="0" lang="en-US" sz="1800" b="0" i="0" u="none" strike="noStrike" kern="1200" cap="none" spc="0" normalizeH="0" baseline="0" noProof="0">
+              <a:ln>
+                <a:noFill/>
+              </a:ln>
+              <a:solidFill>
+                <a:prstClr val="white"/>
+              </a:solidFill>
+              <a:effectLst/>
+              <a:uLnTx/>
+              <a:uFillTx/>
+              <a:latin typeface="Century Gothic" panose="020B0502020202020204"/>
+              <a:ea typeface="+mn-ea"/>
+              <a:cs typeface="+mn-cs"/>
+            </a:endParaRPr>
+          </a:p>
+        </p:txBody>
+      </p:sp>
+      <p:sp>
+        <p:nvSpPr>
+          <p:cNvPr id="17" name="Freeform 7">
+            <a:extLst>
+              <a:ext uri="{FF2B5EF4-FFF2-40B4-BE49-F238E27FC236}">
+                <a16:creationId xmlns:a16="http://schemas.microsoft.com/office/drawing/2014/main" id="{5779FF2E-BB5C-4805-AAD5-275495A2B7EF}"/>
+              </a:ext>
+              <a:ext uri="{C183D7F6-B498-43B3-948B-1728B52AA6E4}">
+                <adec:decorative xmlns:adec="http://schemas.microsoft.com/office/drawing/2017/decorative" val="1"/>
+              </a:ext>
+            </a:extLst>
+          </p:cNvPr>
+          <p:cNvSpPr>
+            <a:spLocks noGrp="1" noRot="1" noChangeAspect="1" noMove="1" noResize="1" noEditPoints="1" noAdjustHandles="1" noChangeArrowheads="1" noChangeShapeType="1" noTextEdit="1"/>
+          </p:cNvSpPr>
+          <p:nvPr>
+            <p:extLst>
+              <p:ext uri="{386F3935-93C4-4BCD-93E2-E3B085C9AB24}">
+                <p16:designElem xmlns:p16="http://schemas.microsoft.com/office/powerpoint/2015/main" val="1"/>
+              </p:ext>
+            </p:extLst>
+          </p:nvPr>
+        </p:nvSpPr>
+        <p:spPr>
+          <a:xfrm>
+            <a:off x="8719939" y="1460230"/>
+            <a:ext cx="3472060" cy="825932"/>
+          </a:xfrm>
+          <a:custGeom>
+            <a:avLst/>
+            <a:gdLst>
+              <a:gd name="connsiteX0" fmla="*/ 3470310 w 3472060"/>
+              <a:gd name="connsiteY0" fmla="*/ 0 h 825932"/>
+              <a:gd name="connsiteX1" fmla="*/ 3472060 w 3472060"/>
+              <a:gd name="connsiteY1" fmla="*/ 12850 h 825932"/>
+              <a:gd name="connsiteX2" fmla="*/ 3472060 w 3472060"/>
+              <a:gd name="connsiteY2" fmla="*/ 480529 h 825932"/>
+              <a:gd name="connsiteX3" fmla="*/ 3363699 w 3472060"/>
+              <a:gd name="connsiteY3" fmla="*/ 498471 h 825932"/>
+              <a:gd name="connsiteX4" fmla="*/ 42060 w 3472060"/>
+              <a:gd name="connsiteY4" fmla="*/ 824486 h 825932"/>
+              <a:gd name="connsiteX5" fmla="*/ 0 w 3472060"/>
+              <a:gd name="connsiteY5" fmla="*/ 758452 h 825932"/>
+              <a:gd name="connsiteX6" fmla="*/ 188014 w 3472060"/>
+              <a:gd name="connsiteY6" fmla="*/ 735602 h 825932"/>
+              <a:gd name="connsiteX7" fmla="*/ 284087 w 3472060"/>
+              <a:gd name="connsiteY7" fmla="*/ 722590 h 825932"/>
+              <a:gd name="connsiteX8" fmla="*/ 382288 w 3472060"/>
+              <a:gd name="connsiteY8" fmla="*/ 709392 h 825932"/>
+              <a:gd name="connsiteX9" fmla="*/ 481858 w 3472060"/>
+              <a:gd name="connsiteY9" fmla="*/ 695774 h 825932"/>
+              <a:gd name="connsiteX10" fmla="*/ 581897 w 3472060"/>
+              <a:gd name="connsiteY10" fmla="*/ 680711 h 825932"/>
+              <a:gd name="connsiteX11" fmla="*/ 683670 w 3472060"/>
+              <a:gd name="connsiteY11" fmla="*/ 665256 h 825932"/>
+              <a:gd name="connsiteX12" fmla="*/ 787206 w 3472060"/>
+              <a:gd name="connsiteY12" fmla="*/ 649587 h 825932"/>
+              <a:gd name="connsiteX13" fmla="*/ 892019 w 3472060"/>
+              <a:gd name="connsiteY13" fmla="*/ 632968 h 825932"/>
+              <a:gd name="connsiteX14" fmla="*/ 997620 w 3472060"/>
+              <a:gd name="connsiteY14" fmla="*/ 614667 h 825932"/>
+              <a:gd name="connsiteX15" fmla="*/ 1104727 w 3472060"/>
+              <a:gd name="connsiteY15" fmla="*/ 596741 h 825932"/>
+              <a:gd name="connsiteX16" fmla="*/ 1212669 w 3472060"/>
+              <a:gd name="connsiteY16" fmla="*/ 577397 h 825932"/>
+              <a:gd name="connsiteX17" fmla="*/ 1321506 w 3472060"/>
+              <a:gd name="connsiteY17" fmla="*/ 556988 h 825932"/>
+              <a:gd name="connsiteX18" fmla="*/ 1430709 w 3472060"/>
+              <a:gd name="connsiteY18" fmla="*/ 536607 h 825932"/>
+              <a:gd name="connsiteX19" fmla="*/ 1541050 w 3472060"/>
+              <a:gd name="connsiteY19" fmla="*/ 514481 h 825932"/>
+              <a:gd name="connsiteX20" fmla="*/ 1652805 w 3472060"/>
+              <a:gd name="connsiteY20" fmla="*/ 492202 h 825932"/>
+              <a:gd name="connsiteX21" fmla="*/ 1763708 w 3472060"/>
+              <a:gd name="connsiteY21" fmla="*/ 469161 h 825932"/>
+              <a:gd name="connsiteX22" fmla="*/ 1875795 w 3472060"/>
+              <a:gd name="connsiteY22" fmla="*/ 444641 h 825932"/>
+              <a:gd name="connsiteX23" fmla="*/ 1989128 w 3472060"/>
+              <a:gd name="connsiteY23" fmla="*/ 418995 h 825932"/>
+              <a:gd name="connsiteX24" fmla="*/ 2102476 w 3472060"/>
+              <a:gd name="connsiteY24" fmla="*/ 393438 h 825932"/>
+              <a:gd name="connsiteX25" fmla="*/ 2215549 w 3472060"/>
+              <a:gd name="connsiteY25" fmla="*/ 366291 h 825932"/>
+              <a:gd name="connsiteX26" fmla="*/ 2330490 w 3472060"/>
+              <a:gd name="connsiteY26" fmla="*/ 337455 h 825932"/>
+              <a:gd name="connsiteX27" fmla="*/ 2443333 w 3472060"/>
+              <a:gd name="connsiteY27" fmla="*/ 308983 h 825932"/>
+              <a:gd name="connsiteX28" fmla="*/ 2558014 w 3472060"/>
+              <a:gd name="connsiteY28" fmla="*/ 278646 h 825932"/>
+              <a:gd name="connsiteX29" fmla="*/ 2673621 w 3472060"/>
+              <a:gd name="connsiteY29" fmla="*/ 247421 h 825932"/>
+              <a:gd name="connsiteX30" fmla="*/ 2787008 w 3472060"/>
+              <a:gd name="connsiteY30" fmla="*/ 215853 h 825932"/>
+              <a:gd name="connsiteX31" fmla="*/ 2901442 w 3472060"/>
+              <a:gd name="connsiteY31" fmla="*/ 182011 h 825932"/>
+              <a:gd name="connsiteX32" fmla="*/ 3015722 w 3472060"/>
+              <a:gd name="connsiteY32" fmla="*/ 147286 h 825932"/>
+              <a:gd name="connsiteX33" fmla="*/ 3130018 w 3472060"/>
+              <a:gd name="connsiteY33" fmla="*/ 112649 h 825932"/>
+              <a:gd name="connsiteX34" fmla="*/ 3243551 w 3472060"/>
+              <a:gd name="connsiteY34" fmla="*/ 75688 h 825932"/>
+              <a:gd name="connsiteX35" fmla="*/ 3356992 w 3472060"/>
+              <a:gd name="connsiteY35" fmla="*/ 38197 h 825932"/>
+              <a:gd name="connsiteX36" fmla="*/ 3470310 w 3472060"/>
+              <a:gd name="connsiteY36" fmla="*/ 0 h 825932"/>
+            </a:gdLst>
+            <a:ahLst/>
+            <a:cxnLst>
+              <a:cxn ang="0">
+                <a:pos x="connsiteX0" y="connsiteY0"/>
+              </a:cxn>
+              <a:cxn ang="0">
+                <a:pos x="connsiteX1" y="connsiteY1"/>
+              </a:cxn>
+              <a:cxn ang="0">
+                <a:pos x="connsiteX2" y="connsiteY2"/>
+              </a:cxn>
+              <a:cxn ang="0">
+                <a:pos x="connsiteX3" y="connsiteY3"/>
+              </a:cxn>
+              <a:cxn ang="0">
+                <a:pos x="connsiteX4" y="connsiteY4"/>
+              </a:cxn>
+              <a:cxn ang="0">
+                <a:pos x="connsiteX5" y="connsiteY5"/>
+              </a:cxn>
+              <a:cxn ang="0">
+                <a:pos x="connsiteX6" y="connsiteY6"/>
+              </a:cxn>
+              <a:cxn ang="0">
+                <a:pos x="connsiteX7" y="connsiteY7"/>
+              </a:cxn>
+              <a:cxn ang="0">
+                <a:pos x="connsiteX8" y="connsiteY8"/>
+              </a:cxn>
+              <a:cxn ang="0">
+                <a:pos x="connsiteX9" y="connsiteY9"/>
+              </a:cxn>
+              <a:cxn ang="0">
+                <a:pos x="connsiteX10" y="connsiteY10"/>
+              </a:cxn>
+              <a:cxn ang="0">
+                <a:pos x="connsiteX11" y="connsiteY11"/>
+              </a:cxn>
+              <a:cxn ang="0">
+                <a:pos x="connsiteX12" y="connsiteY12"/>
+              </a:cxn>
+              <a:cxn ang="0">
+                <a:pos x="connsiteX13" y="connsiteY13"/>
+              </a:cxn>
+              <a:cxn ang="0">
+                <a:pos x="connsiteX14" y="connsiteY14"/>
+              </a:cxn>
+              <a:cxn ang="0">
+                <a:pos x="connsiteX15" y="connsiteY15"/>
+              </a:cxn>
+              <a:cxn ang="0">
+                <a:pos x="connsiteX16" y="connsiteY16"/>
+              </a:cxn>
+              <a:cxn ang="0">
+                <a:pos x="connsiteX17" y="connsiteY17"/>
+              </a:cxn>
+              <a:cxn ang="0">
+                <a:pos x="connsiteX18" y="connsiteY18"/>
+              </a:cxn>
+              <a:cxn ang="0">
+                <a:pos x="connsiteX19" y="connsiteY19"/>
+              </a:cxn>
+              <a:cxn ang="0">
+                <a:pos x="connsiteX20" y="connsiteY20"/>
+              </a:cxn>
+              <a:cxn ang="0">
+                <a:pos x="connsiteX21" y="connsiteY21"/>
+              </a:cxn>
+              <a:cxn ang="0">
+                <a:pos x="connsiteX22" y="connsiteY22"/>
+              </a:cxn>
+              <a:cxn ang="0">
+                <a:pos x="connsiteX23" y="connsiteY23"/>
+              </a:cxn>
+              <a:cxn ang="0">
+                <a:pos x="connsiteX24" y="connsiteY24"/>
+              </a:cxn>
+              <a:cxn ang="0">
+                <a:pos x="connsiteX25" y="connsiteY25"/>
+              </a:cxn>
+              <a:cxn ang="0">
+                <a:pos x="connsiteX26" y="connsiteY26"/>
+              </a:cxn>
+              <a:cxn ang="0">
+                <a:pos x="connsiteX27" y="connsiteY27"/>
+              </a:cxn>
+              <a:cxn ang="0">
+                <a:pos x="connsiteX28" y="connsiteY28"/>
+              </a:cxn>
+              <a:cxn ang="0">
+                <a:pos x="connsiteX29" y="connsiteY29"/>
+              </a:cxn>
+              <a:cxn ang="0">
+                <a:pos x="connsiteX30" y="connsiteY30"/>
+              </a:cxn>
+              <a:cxn ang="0">
+                <a:pos x="connsiteX31" y="connsiteY31"/>
+              </a:cxn>
+              <a:cxn ang="0">
+                <a:pos x="connsiteX32" y="connsiteY32"/>
+              </a:cxn>
+              <a:cxn ang="0">
+                <a:pos x="connsiteX33" y="connsiteY33"/>
+              </a:cxn>
+              <a:cxn ang="0">
+                <a:pos x="connsiteX34" y="connsiteY34"/>
+              </a:cxn>
+              <a:cxn ang="0">
+                <a:pos x="connsiteX35" y="connsiteY35"/>
+              </a:cxn>
+              <a:cxn ang="0">
+                <a:pos x="connsiteX36" y="connsiteY36"/>
+              </a:cxn>
+            </a:cxnLst>
+            <a:rect l="l" t="t" r="r" b="b"/>
+            <a:pathLst>
+              <a:path w="3472060" h="825932">
+                <a:moveTo>
+                  <a:pt x="3470310" y="0"/>
+                </a:moveTo>
+                <a:lnTo>
+                  <a:pt x="3472060" y="12850"/>
+                </a:lnTo>
+                <a:lnTo>
+                  <a:pt x="3472060" y="480529"/>
+                </a:lnTo>
+                <a:lnTo>
+                  <a:pt x="3363699" y="498471"/>
+                </a:lnTo>
+                <a:cubicBezTo>
+                  <a:pt x="2435623" y="645518"/>
+                  <a:pt x="603076" y="844866"/>
+                  <a:pt x="42060" y="824486"/>
+                </a:cubicBezTo>
+                <a:cubicBezTo>
+                  <a:pt x="28151" y="802425"/>
+                  <a:pt x="13909" y="780513"/>
+                  <a:pt x="0" y="758452"/>
+                </a:cubicBezTo>
+                <a:lnTo>
+                  <a:pt x="188014" y="735602"/>
+                </a:lnTo>
+                <a:lnTo>
+                  <a:pt x="284087" y="722590"/>
+                </a:lnTo>
+                <a:lnTo>
+                  <a:pt x="382288" y="709392"/>
+                </a:lnTo>
+                <a:lnTo>
+                  <a:pt x="481858" y="695774"/>
+                </a:lnTo>
+                <a:lnTo>
+                  <a:pt x="581897" y="680711"/>
+                </a:lnTo>
+                <a:lnTo>
+                  <a:pt x="683670" y="665256"/>
+                </a:lnTo>
+                <a:lnTo>
+                  <a:pt x="787206" y="649587"/>
+                </a:lnTo>
+                <a:lnTo>
+                  <a:pt x="892019" y="632968"/>
+                </a:lnTo>
+                <a:lnTo>
+                  <a:pt x="997620" y="614667"/>
+                </a:lnTo>
+                <a:lnTo>
+                  <a:pt x="1104727" y="596741"/>
+                </a:lnTo>
+                <a:lnTo>
+                  <a:pt x="1212669" y="577397"/>
+                </a:lnTo>
+                <a:lnTo>
+                  <a:pt x="1321506" y="556988"/>
+                </a:lnTo>
+                <a:lnTo>
+                  <a:pt x="1430709" y="536607"/>
+                </a:lnTo>
+                <a:lnTo>
+                  <a:pt x="1541050" y="514481"/>
+                </a:lnTo>
+                <a:lnTo>
+                  <a:pt x="1652805" y="492202"/>
+                </a:lnTo>
+                <a:lnTo>
+                  <a:pt x="1763708" y="469161"/>
+                </a:lnTo>
+                <a:lnTo>
+                  <a:pt x="1875795" y="444641"/>
+                </a:lnTo>
+                <a:lnTo>
+                  <a:pt x="1989128" y="418995"/>
+                </a:lnTo>
+                <a:lnTo>
+                  <a:pt x="2102476" y="393438"/>
+                </a:lnTo>
+                <a:lnTo>
+                  <a:pt x="2215549" y="366291"/>
+                </a:lnTo>
+                <a:lnTo>
+                  <a:pt x="2330490" y="337455"/>
+                </a:lnTo>
+                <a:lnTo>
+                  <a:pt x="2443333" y="308983"/>
+                </a:lnTo>
+                <a:lnTo>
+                  <a:pt x="2558014" y="278646"/>
+                </a:lnTo>
+                <a:lnTo>
+                  <a:pt x="2673621" y="247421"/>
+                </a:lnTo>
+                <a:lnTo>
+                  <a:pt x="2787008" y="215853"/>
+                </a:lnTo>
+                <a:lnTo>
+                  <a:pt x="2901442" y="182011"/>
+                </a:lnTo>
+                <a:lnTo>
+                  <a:pt x="3015722" y="147286"/>
+                </a:lnTo>
+                <a:lnTo>
+                  <a:pt x="3130018" y="112649"/>
+                </a:lnTo>
+                <a:lnTo>
+                  <a:pt x="3243551" y="75688"/>
+                </a:lnTo>
+                <a:lnTo>
+                  <a:pt x="3356992" y="38197"/>
+                </a:lnTo>
+                <a:lnTo>
+                  <a:pt x="3470310" y="0"/>
+                </a:lnTo>
+                <a:close/>
+              </a:path>
+            </a:pathLst>
+          </a:custGeom>
+          <a:solidFill>
+            <a:schemeClr val="bg1">
+              <a:alpha val="20000"/>
+            </a:schemeClr>
+          </a:solidFill>
+          <a:ln>
+            <a:noFill/>
+          </a:ln>
+        </p:spPr>
+        <p:txBody>
+          <a:bodyPr rtlCol="0" anchor="ctr"/>
+          <a:lstStyle/>
+          <a:p>
+            <a:pPr marL="0" marR="0" lvl="0" indent="0" algn="ctr" defTabSz="457200" rtl="0" eaLnBrk="1" fontAlgn="auto" latinLnBrk="0" hangingPunct="1">
+              <a:lnSpc>
+                <a:spcPct val="100000"/>
+              </a:lnSpc>
+              <a:spcBef>
+                <a:spcPts val="0"/>
+              </a:spcBef>
+              <a:spcAft>
+                <a:spcPts val="0"/>
+              </a:spcAft>
+              <a:buClrTx/>
+              <a:buSzTx/>
+              <a:buFontTx/>
+              <a:buNone/>
+              <a:tabLst/>
+              <a:defRPr/>
+            </a:pPr>
+            <a:endParaRPr kumimoji="0" lang="en-US" sz="1800" b="0" i="0" u="none" strike="noStrike" kern="1200" cap="none" spc="0" normalizeH="0" baseline="0" noProof="0">
+              <a:ln>
+                <a:noFill/>
+              </a:ln>
+              <a:solidFill>
+                <a:prstClr val="black"/>
+              </a:solidFill>
+              <a:effectLst/>
+              <a:uLnTx/>
+              <a:uFillTx/>
+              <a:latin typeface="Century Gothic" panose="020B0502020202020204"/>
+              <a:ea typeface="+mn-ea"/>
+              <a:cs typeface="+mn-cs"/>
+            </a:endParaRPr>
+          </a:p>
+        </p:txBody>
+      </p:sp>
+      <p:sp>
+        <p:nvSpPr>
+          <p:cNvPr id="2" name="Titel 1">
+            <a:extLst>
+              <a:ext uri="{FF2B5EF4-FFF2-40B4-BE49-F238E27FC236}">
+                <a16:creationId xmlns:a16="http://schemas.microsoft.com/office/drawing/2014/main" id="{6EB2BEC0-94BF-A309-C22F-BCF8575631FE}"/>
+              </a:ext>
+            </a:extLst>
+          </p:cNvPr>
+          <p:cNvSpPr>
+            <a:spLocks noGrp="1"/>
+          </p:cNvSpPr>
+          <p:nvPr>
+            <p:ph type="title"/>
+          </p:nvPr>
+        </p:nvSpPr>
+        <p:spPr>
+          <a:xfrm>
+            <a:off x="418043" y="691779"/>
+            <a:ext cx="10705569" cy="1016654"/>
+          </a:xfrm>
+        </p:spPr>
+        <p:txBody>
+          <a:bodyPr>
+            <a:normAutofit/>
+          </a:bodyPr>
+          <a:lstStyle/>
+          <a:p>
+            <a:r>
+              <a:rPr lang="en-US" sz="3600" dirty="0">
+                <a:solidFill>
+                  <a:srgbClr val="EBEBEB"/>
+                </a:solidFill>
+                <a:latin typeface="Times New Roman" panose="02020603050405020304" pitchFamily="18" charset="0"/>
+                <a:cs typeface="Times New Roman" panose="02020603050405020304" pitchFamily="18" charset="0"/>
+              </a:rPr>
+              <a:t>C</a:t>
+            </a:r>
+            <a:r>
+              <a:rPr lang="en-US" altLang="zh-CN" sz="3600" dirty="0">
+                <a:solidFill>
+                  <a:srgbClr val="EBEBEB"/>
+                </a:solidFill>
+                <a:latin typeface="Times New Roman" panose="02020603050405020304" pitchFamily="18" charset="0"/>
+                <a:cs typeface="Times New Roman" panose="02020603050405020304" pitchFamily="18" charset="0"/>
+              </a:rPr>
+              <a:t>omparison &amp;Inspiration using SMALL Test Dataset </a:t>
+            </a:r>
+            <a:endParaRPr lang="en-US" sz="3600" dirty="0">
+              <a:solidFill>
+                <a:srgbClr val="EBEBEB"/>
+              </a:solidFill>
+            </a:endParaRPr>
+          </a:p>
+        </p:txBody>
+      </p:sp>
+      <p:sp>
+        <p:nvSpPr>
+          <p:cNvPr id="19" name="Rectangle 18">
+            <a:extLst>
+              <a:ext uri="{FF2B5EF4-FFF2-40B4-BE49-F238E27FC236}">
+                <a16:creationId xmlns:a16="http://schemas.microsoft.com/office/drawing/2014/main" id="{6EB83258-50E7-4A51-8C48-ADA7CD7FCA02}"/>
+              </a:ext>
+              <a:ext uri="{C183D7F6-B498-43B3-948B-1728B52AA6E4}">
+                <adec:decorative xmlns:adec="http://schemas.microsoft.com/office/drawing/2017/decorative" val="1"/>
+              </a:ext>
+            </a:extLst>
+          </p:cNvPr>
+          <p:cNvSpPr>
+            <a:spLocks noGrp="1" noRot="1" noChangeAspect="1" noMove="1" noResize="1" noEditPoints="1" noAdjustHandles="1" noChangeArrowheads="1" noChangeShapeType="1" noTextEdit="1"/>
+          </p:cNvSpPr>
+          <p:nvPr>
+            <p:extLst>
+              <p:ext uri="{386F3935-93C4-4BCD-93E2-E3B085C9AB24}">
+                <p16:designElem xmlns:p16="http://schemas.microsoft.com/office/powerpoint/2015/main" val="1"/>
+              </p:ext>
+            </p:extLst>
+          </p:nvPr>
+        </p:nvSpPr>
+        <p:spPr>
+          <a:xfrm>
+            <a:off x="10437812" y="0"/>
+            <a:ext cx="685800" cy="1143000"/>
+          </a:xfrm>
+          <a:prstGeom prst="rect">
+            <a:avLst/>
+          </a:prstGeom>
+          <a:solidFill>
+            <a:schemeClr val="accent1"/>
+          </a:solidFill>
+          <a:ln>
+            <a:noFill/>
+          </a:ln>
+        </p:spPr>
+        <p:style>
+          <a:lnRef idx="1">
+            <a:schemeClr val="accent1"/>
+          </a:lnRef>
+          <a:fillRef idx="3">
+            <a:schemeClr val="accent1"/>
+          </a:fillRef>
+          <a:effectRef idx="2">
+            <a:schemeClr val="accent1"/>
+          </a:effectRef>
+          <a:fontRef idx="minor">
+            <a:schemeClr val="lt1"/>
+          </a:fontRef>
+        </p:style>
+        <p:txBody>
+          <a:bodyPr/>
+          <a:lstStyle/>
+          <a:p>
+            <a:pPr marL="0" marR="0" lvl="0" indent="0" algn="l" defTabSz="457200" rtl="0" eaLnBrk="1" fontAlgn="auto" latinLnBrk="0" hangingPunct="1">
+              <a:lnSpc>
+                <a:spcPct val="100000"/>
+              </a:lnSpc>
+              <a:spcBef>
+                <a:spcPts val="0"/>
+              </a:spcBef>
+              <a:spcAft>
+                <a:spcPts val="0"/>
+              </a:spcAft>
+              <a:buClrTx/>
+              <a:buSzTx/>
+              <a:buFontTx/>
+              <a:buNone/>
+              <a:tabLst/>
+              <a:defRPr/>
+            </a:pPr>
+            <a:endParaRPr kumimoji="0" lang="en-US" sz="1800" b="0" i="0" u="none" strike="noStrike" kern="1200" cap="none" spc="0" normalizeH="0" baseline="0" noProof="0">
+              <a:ln>
+                <a:noFill/>
+              </a:ln>
+              <a:solidFill>
+                <a:prstClr val="white"/>
+              </a:solidFill>
+              <a:effectLst/>
+              <a:uLnTx/>
+              <a:uFillTx/>
+              <a:latin typeface="Century Gothic" panose="020B0502020202020204"/>
+              <a:ea typeface="+mn-ea"/>
+              <a:cs typeface="+mn-cs"/>
+            </a:endParaRPr>
+          </a:p>
+        </p:txBody>
+      </p:sp>
+      <p:sp>
+        <p:nvSpPr>
+          <p:cNvPr id="21" name="Freeform: Shape 20">
+            <a:extLst>
+              <a:ext uri="{FF2B5EF4-FFF2-40B4-BE49-F238E27FC236}">
+                <a16:creationId xmlns:a16="http://schemas.microsoft.com/office/drawing/2014/main" id="{A4188960-1398-409C-BA5D-F87CCB743390}"/>
+              </a:ext>
+              <a:ext uri="{C183D7F6-B498-43B3-948B-1728B52AA6E4}">
+                <adec:decorative xmlns:adec="http://schemas.microsoft.com/office/drawing/2017/decorative" val="1"/>
+              </a:ext>
+            </a:extLst>
+          </p:cNvPr>
+          <p:cNvSpPr>
+            <a:spLocks noGrp="1" noRot="1" noChangeAspect="1" noMove="1" noResize="1" noEditPoints="1" noAdjustHandles="1" noChangeArrowheads="1" noChangeShapeType="1" noTextEdit="1"/>
+          </p:cNvSpPr>
+          <p:nvPr>
+            <p:extLst>
+              <p:ext uri="{386F3935-93C4-4BCD-93E2-E3B085C9AB24}">
+                <p16:designElem xmlns:p16="http://schemas.microsoft.com/office/powerpoint/2015/main" val="1"/>
+              </p:ext>
+            </p:extLst>
+          </p:nvPr>
+        </p:nvSpPr>
+        <p:spPr bwMode="gray">
+          <a:xfrm>
+            <a:off x="-1" y="1762067"/>
+            <a:ext cx="12192418" cy="5095933"/>
+          </a:xfrm>
+          <a:custGeom>
+            <a:avLst/>
+            <a:gdLst>
+              <a:gd name="connsiteX0" fmla="*/ 1 w 12192418"/>
+              <a:gd name="connsiteY0" fmla="*/ 0 h 5095933"/>
+              <a:gd name="connsiteX1" fmla="*/ 71932 w 12192418"/>
+              <a:gd name="connsiteY1" fmla="*/ 12261 h 5095933"/>
+              <a:gd name="connsiteX2" fmla="*/ 282849 w 12192418"/>
+              <a:gd name="connsiteY2" fmla="*/ 48343 h 5095933"/>
+              <a:gd name="connsiteX3" fmla="*/ 436464 w 12192418"/>
+              <a:gd name="connsiteY3" fmla="*/ 73565 h 5095933"/>
+              <a:gd name="connsiteX4" fmla="*/ 619339 w 12192418"/>
+              <a:gd name="connsiteY4" fmla="*/ 100188 h 5095933"/>
+              <a:gd name="connsiteX5" fmla="*/ 836351 w 12192418"/>
+              <a:gd name="connsiteY5" fmla="*/ 132066 h 5095933"/>
+              <a:gd name="connsiteX6" fmla="*/ 1076528 w 12192418"/>
+              <a:gd name="connsiteY6" fmla="*/ 165696 h 5095933"/>
+              <a:gd name="connsiteX7" fmla="*/ 1347184 w 12192418"/>
+              <a:gd name="connsiteY7" fmla="*/ 201077 h 5095933"/>
+              <a:gd name="connsiteX8" fmla="*/ 1642223 w 12192418"/>
+              <a:gd name="connsiteY8" fmla="*/ 238560 h 5095933"/>
+              <a:gd name="connsiteX9" fmla="*/ 1962864 w 12192418"/>
+              <a:gd name="connsiteY9" fmla="*/ 276043 h 5095933"/>
+              <a:gd name="connsiteX10" fmla="*/ 2304232 w 12192418"/>
+              <a:gd name="connsiteY10" fmla="*/ 314227 h 5095933"/>
+              <a:gd name="connsiteX11" fmla="*/ 2672421 w 12192418"/>
+              <a:gd name="connsiteY11" fmla="*/ 349608 h 5095933"/>
+              <a:gd name="connsiteX12" fmla="*/ 3057678 w 12192418"/>
+              <a:gd name="connsiteY12" fmla="*/ 383588 h 5095933"/>
+              <a:gd name="connsiteX13" fmla="*/ 3464881 w 12192418"/>
+              <a:gd name="connsiteY13" fmla="*/ 414415 h 5095933"/>
+              <a:gd name="connsiteX14" fmla="*/ 3889152 w 12192418"/>
+              <a:gd name="connsiteY14" fmla="*/ 443841 h 5095933"/>
+              <a:gd name="connsiteX15" fmla="*/ 4331710 w 12192418"/>
+              <a:gd name="connsiteY15" fmla="*/ 471515 h 5095933"/>
+              <a:gd name="connsiteX16" fmla="*/ 4558476 w 12192418"/>
+              <a:gd name="connsiteY16" fmla="*/ 481324 h 5095933"/>
+              <a:gd name="connsiteX17" fmla="*/ 4790118 w 12192418"/>
+              <a:gd name="connsiteY17" fmla="*/ 492183 h 5095933"/>
+              <a:gd name="connsiteX18" fmla="*/ 5025418 w 12192418"/>
+              <a:gd name="connsiteY18" fmla="*/ 502342 h 5095933"/>
+              <a:gd name="connsiteX19" fmla="*/ 5261937 w 12192418"/>
+              <a:gd name="connsiteY19" fmla="*/ 508998 h 5095933"/>
+              <a:gd name="connsiteX20" fmla="*/ 5503332 w 12192418"/>
+              <a:gd name="connsiteY20" fmla="*/ 514953 h 5095933"/>
+              <a:gd name="connsiteX21" fmla="*/ 5747167 w 12192418"/>
+              <a:gd name="connsiteY21" fmla="*/ 521259 h 5095933"/>
+              <a:gd name="connsiteX22" fmla="*/ 5995877 w 12192418"/>
+              <a:gd name="connsiteY22" fmla="*/ 525463 h 5095933"/>
+              <a:gd name="connsiteX23" fmla="*/ 6247026 w 12192418"/>
+              <a:gd name="connsiteY23" fmla="*/ 525463 h 5095933"/>
+              <a:gd name="connsiteX24" fmla="*/ 6500613 w 12192418"/>
+              <a:gd name="connsiteY24" fmla="*/ 527565 h 5095933"/>
+              <a:gd name="connsiteX25" fmla="*/ 6756639 w 12192418"/>
+              <a:gd name="connsiteY25" fmla="*/ 525463 h 5095933"/>
+              <a:gd name="connsiteX26" fmla="*/ 7016322 w 12192418"/>
+              <a:gd name="connsiteY26" fmla="*/ 521259 h 5095933"/>
+              <a:gd name="connsiteX27" fmla="*/ 7276005 w 12192418"/>
+              <a:gd name="connsiteY27" fmla="*/ 517406 h 5095933"/>
+              <a:gd name="connsiteX28" fmla="*/ 7539345 w 12192418"/>
+              <a:gd name="connsiteY28" fmla="*/ 508998 h 5095933"/>
+              <a:gd name="connsiteX29" fmla="*/ 7805124 w 12192418"/>
+              <a:gd name="connsiteY29" fmla="*/ 500241 h 5095933"/>
+              <a:gd name="connsiteX30" fmla="*/ 8070903 w 12192418"/>
+              <a:gd name="connsiteY30" fmla="*/ 490082 h 5095933"/>
+              <a:gd name="connsiteX31" fmla="*/ 8339121 w 12192418"/>
+              <a:gd name="connsiteY31" fmla="*/ 475719 h 5095933"/>
+              <a:gd name="connsiteX32" fmla="*/ 8609776 w 12192418"/>
+              <a:gd name="connsiteY32" fmla="*/ 458554 h 5095933"/>
+              <a:gd name="connsiteX33" fmla="*/ 8881651 w 12192418"/>
+              <a:gd name="connsiteY33" fmla="*/ 442089 h 5095933"/>
+              <a:gd name="connsiteX34" fmla="*/ 9153526 w 12192418"/>
+              <a:gd name="connsiteY34" fmla="*/ 421071 h 5095933"/>
+              <a:gd name="connsiteX35" fmla="*/ 9429058 w 12192418"/>
+              <a:gd name="connsiteY35" fmla="*/ 395849 h 5095933"/>
+              <a:gd name="connsiteX36" fmla="*/ 9700933 w 12192418"/>
+              <a:gd name="connsiteY36" fmla="*/ 370626 h 5095933"/>
+              <a:gd name="connsiteX37" fmla="*/ 9977684 w 12192418"/>
+              <a:gd name="connsiteY37" fmla="*/ 341551 h 5095933"/>
+              <a:gd name="connsiteX38" fmla="*/ 10255655 w 12192418"/>
+              <a:gd name="connsiteY38" fmla="*/ 309673 h 5095933"/>
+              <a:gd name="connsiteX39" fmla="*/ 10529968 w 12192418"/>
+              <a:gd name="connsiteY39" fmla="*/ 276043 h 5095933"/>
+              <a:gd name="connsiteX40" fmla="*/ 10807939 w 12192418"/>
+              <a:gd name="connsiteY40" fmla="*/ 236809 h 5095933"/>
+              <a:gd name="connsiteX41" fmla="*/ 11084690 w 12192418"/>
+              <a:gd name="connsiteY41" fmla="*/ 194772 h 5095933"/>
+              <a:gd name="connsiteX42" fmla="*/ 11362661 w 12192418"/>
+              <a:gd name="connsiteY42" fmla="*/ 153085 h 5095933"/>
+              <a:gd name="connsiteX43" fmla="*/ 11639412 w 12192418"/>
+              <a:gd name="connsiteY43" fmla="*/ 104392 h 5095933"/>
+              <a:gd name="connsiteX44" fmla="*/ 11914945 w 12192418"/>
+              <a:gd name="connsiteY44" fmla="*/ 54648 h 5095933"/>
+              <a:gd name="connsiteX45" fmla="*/ 12191696 w 12192418"/>
+              <a:gd name="connsiteY45" fmla="*/ 2452 h 5095933"/>
+              <a:gd name="connsiteX46" fmla="*/ 12191696 w 12192418"/>
+              <a:gd name="connsiteY46" fmla="*/ 2109542 h 5095933"/>
+              <a:gd name="connsiteX47" fmla="*/ 12191999 w 12192418"/>
+              <a:gd name="connsiteY47" fmla="*/ 2109542 h 5095933"/>
+              <a:gd name="connsiteX48" fmla="*/ 12191999 w 12192418"/>
+              <a:gd name="connsiteY48" fmla="*/ 2802467 h 5095933"/>
+              <a:gd name="connsiteX49" fmla="*/ 12192418 w 12192418"/>
+              <a:gd name="connsiteY49" fmla="*/ 2802467 h 5095933"/>
+              <a:gd name="connsiteX50" fmla="*/ 12192418 w 12192418"/>
+              <a:gd name="connsiteY50" fmla="*/ 5095933 h 5095933"/>
+              <a:gd name="connsiteX51" fmla="*/ 1 w 12192418"/>
+              <a:gd name="connsiteY51" fmla="*/ 5095933 h 5095933"/>
+              <a:gd name="connsiteX52" fmla="*/ 1 w 12192418"/>
+              <a:gd name="connsiteY52" fmla="*/ 4074529 h 5095933"/>
+              <a:gd name="connsiteX53" fmla="*/ 0 w 12192418"/>
+              <a:gd name="connsiteY53" fmla="*/ 4074529 h 5095933"/>
+              <a:gd name="connsiteX54" fmla="*/ 0 w 12192418"/>
+              <a:gd name="connsiteY54" fmla="*/ 2109542 h 5095933"/>
+              <a:gd name="connsiteX55" fmla="*/ 1 w 12192418"/>
+              <a:gd name="connsiteY55" fmla="*/ 2109542 h 5095933"/>
+            </a:gdLst>
+            <a:ahLst/>
+            <a:cxnLst>
+              <a:cxn ang="0">
+                <a:pos x="connsiteX0" y="connsiteY0"/>
+              </a:cxn>
+              <a:cxn ang="0">
+                <a:pos x="connsiteX1" y="connsiteY1"/>
+              </a:cxn>
+              <a:cxn ang="0">
+                <a:pos x="connsiteX2" y="connsiteY2"/>
+              </a:cxn>
+              <a:cxn ang="0">
+                <a:pos x="connsiteX3" y="connsiteY3"/>
+              </a:cxn>
+              <a:cxn ang="0">
+                <a:pos x="connsiteX4" y="connsiteY4"/>
+              </a:cxn>
+              <a:cxn ang="0">
+                <a:pos x="connsiteX5" y="connsiteY5"/>
+              </a:cxn>
+              <a:cxn ang="0">
+                <a:pos x="connsiteX6" y="connsiteY6"/>
+              </a:cxn>
+              <a:cxn ang="0">
+                <a:pos x="connsiteX7" y="connsiteY7"/>
+              </a:cxn>
+              <a:cxn ang="0">
+                <a:pos x="connsiteX8" y="connsiteY8"/>
+              </a:cxn>
+              <a:cxn ang="0">
+                <a:pos x="connsiteX9" y="connsiteY9"/>
+              </a:cxn>
+              <a:cxn ang="0">
+                <a:pos x="connsiteX10" y="connsiteY10"/>
+              </a:cxn>
+              <a:cxn ang="0">
+                <a:pos x="connsiteX11" y="connsiteY11"/>
+              </a:cxn>
+              <a:cxn ang="0">
+                <a:pos x="connsiteX12" y="connsiteY12"/>
+              </a:cxn>
+              <a:cxn ang="0">
+                <a:pos x="connsiteX13" y="connsiteY13"/>
+              </a:cxn>
+              <a:cxn ang="0">
+                <a:pos x="connsiteX14" y="connsiteY14"/>
+              </a:cxn>
+              <a:cxn ang="0">
+                <a:pos x="connsiteX15" y="connsiteY15"/>
+              </a:cxn>
+              <a:cxn ang="0">
+                <a:pos x="connsiteX16" y="connsiteY16"/>
+              </a:cxn>
+              <a:cxn ang="0">
+                <a:pos x="connsiteX17" y="connsiteY17"/>
+              </a:cxn>
+              <a:cxn ang="0">
+                <a:pos x="connsiteX18" y="connsiteY18"/>
+              </a:cxn>
+              <a:cxn ang="0">
+                <a:pos x="connsiteX19" y="connsiteY19"/>
+              </a:cxn>
+              <a:cxn ang="0">
+                <a:pos x="connsiteX20" y="connsiteY20"/>
+              </a:cxn>
+              <a:cxn ang="0">
+                <a:pos x="connsiteX21" y="connsiteY21"/>
+              </a:cxn>
+              <a:cxn ang="0">
+                <a:pos x="connsiteX22" y="connsiteY22"/>
+              </a:cxn>
+              <a:cxn ang="0">
+                <a:pos x="connsiteX23" y="connsiteY23"/>
+              </a:cxn>
+              <a:cxn ang="0">
+                <a:pos x="connsiteX24" y="connsiteY24"/>
+              </a:cxn>
+              <a:cxn ang="0">
+                <a:pos x="connsiteX25" y="connsiteY25"/>
+              </a:cxn>
+              <a:cxn ang="0">
+                <a:pos x="connsiteX26" y="connsiteY26"/>
+              </a:cxn>
+              <a:cxn ang="0">
+                <a:pos x="connsiteX27" y="connsiteY27"/>
+              </a:cxn>
+              <a:cxn ang="0">
+                <a:pos x="connsiteX28" y="connsiteY28"/>
+              </a:cxn>
+              <a:cxn ang="0">
+                <a:pos x="connsiteX29" y="connsiteY29"/>
+              </a:cxn>
+              <a:cxn ang="0">
+                <a:pos x="connsiteX30" y="connsiteY30"/>
+              </a:cxn>
+              <a:cxn ang="0">
+                <a:pos x="connsiteX31" y="connsiteY31"/>
+              </a:cxn>
+              <a:cxn ang="0">
+                <a:pos x="connsiteX32" y="connsiteY32"/>
+              </a:cxn>
+              <a:cxn ang="0">
+                <a:pos x="connsiteX33" y="connsiteY33"/>
+              </a:cxn>
+              <a:cxn ang="0">
+                <a:pos x="connsiteX34" y="connsiteY34"/>
+              </a:cxn>
+              <a:cxn ang="0">
+                <a:pos x="connsiteX35" y="connsiteY35"/>
+              </a:cxn>
+              <a:cxn ang="0">
+                <a:pos x="connsiteX36" y="connsiteY36"/>
+              </a:cxn>
+              <a:cxn ang="0">
+                <a:pos x="connsiteX37" y="connsiteY37"/>
+              </a:cxn>
+              <a:cxn ang="0">
+                <a:pos x="connsiteX38" y="connsiteY38"/>
+              </a:cxn>
+              <a:cxn ang="0">
+                <a:pos x="connsiteX39" y="connsiteY39"/>
+              </a:cxn>
+              <a:cxn ang="0">
+                <a:pos x="connsiteX40" y="connsiteY40"/>
+              </a:cxn>
+              <a:cxn ang="0">
+                <a:pos x="connsiteX41" y="connsiteY41"/>
+              </a:cxn>
+              <a:cxn ang="0">
+                <a:pos x="connsiteX42" y="connsiteY42"/>
+              </a:cxn>
+              <a:cxn ang="0">
+                <a:pos x="connsiteX43" y="connsiteY43"/>
+              </a:cxn>
+              <a:cxn ang="0">
+                <a:pos x="connsiteX44" y="connsiteY44"/>
+              </a:cxn>
+              <a:cxn ang="0">
+                <a:pos x="connsiteX45" y="connsiteY45"/>
+              </a:cxn>
+              <a:cxn ang="0">
+                <a:pos x="connsiteX46" y="connsiteY46"/>
+              </a:cxn>
+              <a:cxn ang="0">
+                <a:pos x="connsiteX47" y="connsiteY47"/>
+              </a:cxn>
+              <a:cxn ang="0">
+                <a:pos x="connsiteX48" y="connsiteY48"/>
+              </a:cxn>
+              <a:cxn ang="0">
+                <a:pos x="connsiteX49" y="connsiteY49"/>
+              </a:cxn>
+              <a:cxn ang="0">
+                <a:pos x="connsiteX50" y="connsiteY50"/>
+              </a:cxn>
+              <a:cxn ang="0">
+                <a:pos x="connsiteX51" y="connsiteY51"/>
+              </a:cxn>
+              <a:cxn ang="0">
+                <a:pos x="connsiteX52" y="connsiteY52"/>
+              </a:cxn>
+              <a:cxn ang="0">
+                <a:pos x="connsiteX53" y="connsiteY53"/>
+              </a:cxn>
+              <a:cxn ang="0">
+                <a:pos x="connsiteX54" y="connsiteY54"/>
+              </a:cxn>
+              <a:cxn ang="0">
+                <a:pos x="connsiteX55" y="connsiteY55"/>
+              </a:cxn>
+            </a:cxnLst>
+            <a:rect l="l" t="t" r="r" b="b"/>
+            <a:pathLst>
+              <a:path w="12192418" h="5095933">
+                <a:moveTo>
+                  <a:pt x="1" y="0"/>
+                </a:moveTo>
+                <a:lnTo>
+                  <a:pt x="71932" y="12261"/>
+                </a:lnTo>
+                <a:lnTo>
+                  <a:pt x="282849" y="48343"/>
+                </a:lnTo>
+                <a:lnTo>
+                  <a:pt x="436464" y="73565"/>
+                </a:lnTo>
+                <a:lnTo>
+                  <a:pt x="619339" y="100188"/>
+                </a:lnTo>
+                <a:lnTo>
+                  <a:pt x="836351" y="132066"/>
+                </a:lnTo>
+                <a:lnTo>
+                  <a:pt x="1076528" y="165696"/>
+                </a:lnTo>
+                <a:lnTo>
+                  <a:pt x="1347184" y="201077"/>
+                </a:lnTo>
+                <a:lnTo>
+                  <a:pt x="1642223" y="238560"/>
+                </a:lnTo>
+                <a:lnTo>
+                  <a:pt x="1962864" y="276043"/>
+                </a:lnTo>
+                <a:lnTo>
+                  <a:pt x="2304232" y="314227"/>
+                </a:lnTo>
+                <a:lnTo>
+                  <a:pt x="2672421" y="349608"/>
+                </a:lnTo>
+                <a:lnTo>
+                  <a:pt x="3057678" y="383588"/>
+                </a:lnTo>
+                <a:lnTo>
+                  <a:pt x="3464881" y="414415"/>
+                </a:lnTo>
+                <a:lnTo>
+                  <a:pt x="3889152" y="443841"/>
+                </a:lnTo>
+                <a:lnTo>
+                  <a:pt x="4331710" y="471515"/>
+                </a:lnTo>
+                <a:lnTo>
+                  <a:pt x="4558476" y="481324"/>
+                </a:lnTo>
+                <a:lnTo>
+                  <a:pt x="4790118" y="492183"/>
+                </a:lnTo>
+                <a:lnTo>
+                  <a:pt x="5025418" y="502342"/>
+                </a:lnTo>
+                <a:lnTo>
+                  <a:pt x="5261937" y="508998"/>
+                </a:lnTo>
+                <a:lnTo>
+                  <a:pt x="5503332" y="514953"/>
+                </a:lnTo>
+                <a:lnTo>
+                  <a:pt x="5747167" y="521259"/>
+                </a:lnTo>
+                <a:lnTo>
+                  <a:pt x="5995877" y="525463"/>
+                </a:lnTo>
+                <a:lnTo>
+                  <a:pt x="6247026" y="525463"/>
+                </a:lnTo>
+                <a:lnTo>
+                  <a:pt x="6500613" y="527565"/>
+                </a:lnTo>
+                <a:lnTo>
+                  <a:pt x="6756639" y="525463"/>
+                </a:lnTo>
+                <a:lnTo>
+                  <a:pt x="7016322" y="521259"/>
+                </a:lnTo>
+                <a:lnTo>
+                  <a:pt x="7276005" y="517406"/>
+                </a:lnTo>
+                <a:lnTo>
+                  <a:pt x="7539345" y="508998"/>
+                </a:lnTo>
+                <a:lnTo>
+                  <a:pt x="7805124" y="500241"/>
+                </a:lnTo>
+                <a:lnTo>
+                  <a:pt x="8070903" y="490082"/>
+                </a:lnTo>
+                <a:lnTo>
+                  <a:pt x="8339121" y="475719"/>
+                </a:lnTo>
+                <a:lnTo>
+                  <a:pt x="8609776" y="458554"/>
+                </a:lnTo>
+                <a:lnTo>
+                  <a:pt x="8881651" y="442089"/>
+                </a:lnTo>
+                <a:lnTo>
+                  <a:pt x="9153526" y="421071"/>
+                </a:lnTo>
+                <a:lnTo>
+                  <a:pt x="9429058" y="395849"/>
+                </a:lnTo>
+                <a:lnTo>
+                  <a:pt x="9700933" y="370626"/>
+                </a:lnTo>
+                <a:lnTo>
+                  <a:pt x="9977684" y="341551"/>
+                </a:lnTo>
+                <a:lnTo>
+                  <a:pt x="10255655" y="309673"/>
+                </a:lnTo>
+                <a:lnTo>
+                  <a:pt x="10529968" y="276043"/>
+                </a:lnTo>
+                <a:lnTo>
+                  <a:pt x="10807939" y="236809"/>
+                </a:lnTo>
+                <a:lnTo>
+                  <a:pt x="11084690" y="194772"/>
+                </a:lnTo>
+                <a:lnTo>
+                  <a:pt x="11362661" y="153085"/>
+                </a:lnTo>
+                <a:lnTo>
+                  <a:pt x="11639412" y="104392"/>
+                </a:lnTo>
+                <a:lnTo>
+                  <a:pt x="11914945" y="54648"/>
+                </a:lnTo>
+                <a:lnTo>
+                  <a:pt x="12191696" y="2452"/>
+                </a:lnTo>
+                <a:lnTo>
+                  <a:pt x="12191696" y="2109542"/>
+                </a:lnTo>
+                <a:lnTo>
+                  <a:pt x="12191999" y="2109542"/>
+                </a:lnTo>
+                <a:lnTo>
+                  <a:pt x="12191999" y="2802467"/>
+                </a:lnTo>
+                <a:lnTo>
+                  <a:pt x="12192418" y="2802467"/>
+                </a:lnTo>
+                <a:lnTo>
+                  <a:pt x="12192418" y="5095933"/>
+                </a:lnTo>
+                <a:lnTo>
+                  <a:pt x="1" y="5095933"/>
+                </a:lnTo>
+                <a:lnTo>
+                  <a:pt x="1" y="4074529"/>
+                </a:lnTo>
+                <a:lnTo>
+                  <a:pt x="0" y="4074529"/>
+                </a:lnTo>
+                <a:lnTo>
+                  <a:pt x="0" y="2109542"/>
+                </a:lnTo>
+                <a:lnTo>
+                  <a:pt x="1" y="2109542"/>
+                </a:lnTo>
+                <a:close/>
+              </a:path>
+            </a:pathLst>
+          </a:custGeom>
+          <a:solidFill>
+            <a:schemeClr val="bg1"/>
+          </a:solidFill>
+          <a:ln>
+            <a:noFill/>
+          </a:ln>
+        </p:spPr>
+        <p:txBody>
+          <a:bodyPr/>
+          <a:lstStyle/>
+          <a:p>
+            <a:pPr marL="0" marR="0" lvl="0" indent="0" algn="l" defTabSz="457200" rtl="0" eaLnBrk="1" fontAlgn="auto" latinLnBrk="0" hangingPunct="1">
+              <a:lnSpc>
+                <a:spcPct val="100000"/>
+              </a:lnSpc>
+              <a:spcBef>
+                <a:spcPts val="0"/>
+              </a:spcBef>
+              <a:spcAft>
+                <a:spcPts val="0"/>
+              </a:spcAft>
+              <a:buClrTx/>
+              <a:buSzTx/>
+              <a:buFontTx/>
+              <a:buNone/>
+              <a:tabLst/>
+              <a:defRPr/>
+            </a:pPr>
+            <a:endParaRPr kumimoji="0" lang="en-US" sz="1800" b="0" i="0" u="none" strike="noStrike" kern="1200" cap="none" spc="0" normalizeH="0" baseline="0" noProof="0">
+              <a:ln>
+                <a:noFill/>
+              </a:ln>
+              <a:solidFill>
+                <a:prstClr val="black"/>
+              </a:solidFill>
+              <a:effectLst/>
+              <a:uLnTx/>
+              <a:uFillTx/>
+              <a:latin typeface="Century Gothic" panose="020B0502020202020204"/>
+              <a:ea typeface="+mn-ea"/>
+              <a:cs typeface="+mn-cs"/>
+            </a:endParaRPr>
+          </a:p>
+        </p:txBody>
+      </p:sp>
+      <p:sp>
+        <p:nvSpPr>
+          <p:cNvPr id="12" name="Textfeld 11">
+            <a:extLst>
+              <a:ext uri="{FF2B5EF4-FFF2-40B4-BE49-F238E27FC236}">
+                <a16:creationId xmlns:a16="http://schemas.microsoft.com/office/drawing/2014/main" id="{98A695F2-8BD5-5465-630B-B0A2DDEBA06A}"/>
+              </a:ext>
+            </a:extLst>
+          </p:cNvPr>
+          <p:cNvSpPr txBox="1"/>
+          <p:nvPr/>
+        </p:nvSpPr>
+        <p:spPr>
+          <a:xfrm>
+            <a:off x="-1529254" y="6452928"/>
+            <a:ext cx="13323322" cy="276999"/>
+          </a:xfrm>
+          <a:prstGeom prst="rect">
+            <a:avLst/>
+          </a:prstGeom>
+          <a:noFill/>
+        </p:spPr>
+        <p:txBody>
+          <a:bodyPr wrap="square">
+            <a:spAutoFit/>
+          </a:bodyPr>
+          <a:lstStyle/>
+          <a:p>
+            <a:pPr marL="2743200" marR="0" lvl="0" indent="457200" algn="l" defTabSz="457200" rtl="0" eaLnBrk="1" fontAlgn="auto" latinLnBrk="0" hangingPunct="1">
+              <a:lnSpc>
+                <a:spcPct val="100000"/>
+              </a:lnSpc>
+              <a:spcBef>
+                <a:spcPts val="0"/>
+              </a:spcBef>
+              <a:spcAft>
+                <a:spcPts val="0"/>
+              </a:spcAft>
+              <a:buClrTx/>
+              <a:buSzTx/>
+              <a:buFontTx/>
+              <a:buNone/>
+              <a:tabLst/>
+              <a:defRPr/>
+            </a:pPr>
+            <a:r>
+              <a:rPr kumimoji="0" lang="en-US" sz="1200" b="0" i="0" u="none" strike="noStrike" kern="1200" cap="none" spc="0" normalizeH="0" baseline="0" noProof="0" dirty="0">
+                <a:ln>
+                  <a:noFill/>
+                </a:ln>
+                <a:solidFill>
+                  <a:srgbClr val="000000"/>
+                </a:solidFill>
+                <a:effectLst/>
+                <a:uLnTx/>
+                <a:uFillTx/>
+                <a:latin typeface="Arial" panose="020B0604020202020204" pitchFamily="34" charset="0"/>
+                <a:ea typeface="+mn-ea"/>
+                <a:cs typeface="+mn-cs"/>
+              </a:rPr>
+              <a:t>*Use the first </a:t>
+            </a:r>
+            <a:r>
+              <a:rPr kumimoji="0" lang="en-US" sz="1200" b="1" i="0" u="none" strike="noStrike" kern="1200" cap="none" spc="0" normalizeH="0" baseline="0" noProof="0" dirty="0">
+                <a:ln>
+                  <a:noFill/>
+                </a:ln>
+                <a:solidFill>
+                  <a:srgbClr val="000000"/>
+                </a:solidFill>
+                <a:effectLst/>
+                <a:uLnTx/>
+                <a:uFillTx/>
+                <a:latin typeface="Arial" panose="020B0604020202020204" pitchFamily="34" charset="0"/>
+                <a:ea typeface="+mn-ea"/>
+                <a:cs typeface="+mn-cs"/>
+              </a:rPr>
+              <a:t>100</a:t>
+            </a:r>
+            <a:r>
+              <a:rPr kumimoji="0" lang="en-US" sz="1200" b="0" i="0" u="none" strike="noStrike" kern="1200" cap="none" spc="0" normalizeH="0" baseline="0" noProof="0" dirty="0">
+                <a:ln>
+                  <a:noFill/>
+                </a:ln>
+                <a:solidFill>
+                  <a:srgbClr val="000000"/>
+                </a:solidFill>
+                <a:effectLst/>
+                <a:uLnTx/>
+                <a:uFillTx/>
+                <a:latin typeface="Arial" panose="020B0604020202020204" pitchFamily="34" charset="0"/>
+                <a:ea typeface="+mn-ea"/>
+                <a:cs typeface="+mn-cs"/>
+              </a:rPr>
+              <a:t> samples from the test dataset of WN18RR		// 	The format of outputs vary</a:t>
+            </a:r>
+          </a:p>
+        </p:txBody>
+      </p:sp>
+      <p:sp>
+        <p:nvSpPr>
+          <p:cNvPr id="5" name="Inhaltsplatzhalter 4">
+            <a:extLst>
+              <a:ext uri="{FF2B5EF4-FFF2-40B4-BE49-F238E27FC236}">
+                <a16:creationId xmlns:a16="http://schemas.microsoft.com/office/drawing/2014/main" id="{A7259958-7F47-F402-3145-BCC1D68E2AEA}"/>
+              </a:ext>
+            </a:extLst>
+          </p:cNvPr>
+          <p:cNvSpPr>
+            <a:spLocks noGrp="1"/>
+          </p:cNvSpPr>
+          <p:nvPr>
+            <p:ph idx="1"/>
+          </p:nvPr>
+        </p:nvSpPr>
+        <p:spPr/>
+        <p:txBody>
+          <a:bodyPr/>
+          <a:lstStyle/>
+          <a:p>
+            <a:endParaRPr lang="en-US"/>
+          </a:p>
+        </p:txBody>
+      </p:sp>
+      <p:graphicFrame>
+        <p:nvGraphicFramePr>
+          <p:cNvPr id="6" name="Inhaltsplatzhalter 15">
+            <a:extLst>
+              <a:ext uri="{FF2B5EF4-FFF2-40B4-BE49-F238E27FC236}">
+                <a16:creationId xmlns:a16="http://schemas.microsoft.com/office/drawing/2014/main" id="{8602AE10-CCB9-05E6-33B9-2791A2F16312}"/>
+              </a:ext>
+            </a:extLst>
+          </p:cNvPr>
+          <p:cNvGraphicFramePr>
+            <a:graphicFrameLocks/>
+          </p:cNvGraphicFramePr>
+          <p:nvPr>
+            <p:extLst>
+              <p:ext uri="{D42A27DB-BD31-4B8C-83A1-F6EECF244321}">
+                <p14:modId xmlns:p14="http://schemas.microsoft.com/office/powerpoint/2010/main" val="247132159"/>
+              </p:ext>
+            </p:extLst>
+          </p:nvPr>
+        </p:nvGraphicFramePr>
+        <p:xfrm>
+          <a:off x="594392" y="2163623"/>
+          <a:ext cx="11319417" cy="4288705"/>
+        </p:xfrm>
+        <a:graphic>
+          <a:graphicData uri="http://schemas.openxmlformats.org/drawingml/2006/table">
+            <a:tbl>
+              <a:tblPr firstRow="1" bandRow="1">
+                <a:tableStyleId>{5C22544A-7EE6-4342-B048-85BDC9FD1C3A}</a:tableStyleId>
+              </a:tblPr>
+              <a:tblGrid>
+                <a:gridCol w="1333753">
+                  <a:extLst>
+                    <a:ext uri="{9D8B030D-6E8A-4147-A177-3AD203B41FA5}">
+                      <a16:colId xmlns:a16="http://schemas.microsoft.com/office/drawing/2014/main" val="2585912005"/>
+                    </a:ext>
+                  </a:extLst>
+                </a:gridCol>
+                <a:gridCol w="1248208">
+                  <a:extLst>
+                    <a:ext uri="{9D8B030D-6E8A-4147-A177-3AD203B41FA5}">
+                      <a16:colId xmlns:a16="http://schemas.microsoft.com/office/drawing/2014/main" val="843601698"/>
+                    </a:ext>
+                  </a:extLst>
+                </a:gridCol>
+                <a:gridCol w="1248208">
+                  <a:extLst>
+                    <a:ext uri="{9D8B030D-6E8A-4147-A177-3AD203B41FA5}">
+                      <a16:colId xmlns:a16="http://schemas.microsoft.com/office/drawing/2014/main" val="180885657"/>
+                    </a:ext>
+                  </a:extLst>
+                </a:gridCol>
+                <a:gridCol w="1248208">
+                  <a:extLst>
+                    <a:ext uri="{9D8B030D-6E8A-4147-A177-3AD203B41FA5}">
+                      <a16:colId xmlns:a16="http://schemas.microsoft.com/office/drawing/2014/main" val="2540190345"/>
+                    </a:ext>
+                  </a:extLst>
+                </a:gridCol>
+                <a:gridCol w="1248208">
+                  <a:extLst>
+                    <a:ext uri="{9D8B030D-6E8A-4147-A177-3AD203B41FA5}">
+                      <a16:colId xmlns:a16="http://schemas.microsoft.com/office/drawing/2014/main" val="3076687557"/>
+                    </a:ext>
+                  </a:extLst>
+                </a:gridCol>
+                <a:gridCol w="1248208">
+                  <a:extLst>
+                    <a:ext uri="{9D8B030D-6E8A-4147-A177-3AD203B41FA5}">
+                      <a16:colId xmlns:a16="http://schemas.microsoft.com/office/drawing/2014/main" val="773496404"/>
+                    </a:ext>
+                  </a:extLst>
+                </a:gridCol>
+                <a:gridCol w="1248208">
+                  <a:extLst>
+                    <a:ext uri="{9D8B030D-6E8A-4147-A177-3AD203B41FA5}">
+                      <a16:colId xmlns:a16="http://schemas.microsoft.com/office/drawing/2014/main" val="613038868"/>
+                    </a:ext>
+                  </a:extLst>
+                </a:gridCol>
+                <a:gridCol w="1248208">
+                  <a:extLst>
+                    <a:ext uri="{9D8B030D-6E8A-4147-A177-3AD203B41FA5}">
+                      <a16:colId xmlns:a16="http://schemas.microsoft.com/office/drawing/2014/main" val="3042228748"/>
+                    </a:ext>
+                  </a:extLst>
+                </a:gridCol>
+                <a:gridCol w="1248208">
+                  <a:extLst>
+                    <a:ext uri="{9D8B030D-6E8A-4147-A177-3AD203B41FA5}">
+                      <a16:colId xmlns:a16="http://schemas.microsoft.com/office/drawing/2014/main" val="986472483"/>
+                    </a:ext>
+                  </a:extLst>
+                </a:gridCol>
+              </a:tblGrid>
+              <a:tr h="369628">
+                <a:tc>
+                  <a:txBody>
+                    <a:bodyPr/>
+                    <a:lstStyle/>
+                    <a:p>
+                      <a:pPr marL="0" marR="0" lvl="0" indent="0" algn="ctr" defTabSz="457200" rtl="0" eaLnBrk="1" fontAlgn="auto" latinLnBrk="0" hangingPunct="1">
+                        <a:lnSpc>
+                          <a:spcPct val="100000"/>
+                        </a:lnSpc>
+                        <a:spcBef>
+                          <a:spcPts val="0"/>
+                        </a:spcBef>
+                        <a:spcAft>
+                          <a:spcPts val="0"/>
+                        </a:spcAft>
+                        <a:buClrTx/>
+                        <a:buSzTx/>
+                        <a:buFontTx/>
+                        <a:buNone/>
+                        <a:tabLst/>
+                        <a:defRPr/>
+                      </a:pPr>
+                      <a:r>
+                        <a:rPr lang="en-US" sz="1400" u="none" dirty="0">
+                          <a:solidFill>
+                            <a:schemeClr val="tx1"/>
+                          </a:solidFill>
+                          <a:latin typeface="Times New Roman" panose="02020603050405020304" pitchFamily="18" charset="0"/>
+                          <a:cs typeface="Times New Roman" panose="02020603050405020304" pitchFamily="18" charset="0"/>
+                        </a:rPr>
+                        <a:t>100 samples</a:t>
+                      </a:r>
+                    </a:p>
+                  </a:txBody>
+                  <a:tcPr/>
+                </a:tc>
+                <a:tc gridSpan="4">
+                  <a:txBody>
+                    <a:bodyPr/>
+                    <a:lstStyle/>
+                    <a:p>
+                      <a:pPr marL="0" marR="0" lvl="0" indent="0" algn="ctr" defTabSz="457200" rtl="0" eaLnBrk="1" fontAlgn="auto" latinLnBrk="0" hangingPunct="1">
+                        <a:lnSpc>
+                          <a:spcPct val="100000"/>
+                        </a:lnSpc>
+                        <a:spcBef>
+                          <a:spcPts val="0"/>
+                        </a:spcBef>
+                        <a:spcAft>
+                          <a:spcPts val="0"/>
+                        </a:spcAft>
+                        <a:buClrTx/>
+                        <a:buSzTx/>
+                        <a:buFontTx/>
+                        <a:buNone/>
+                        <a:tabLst/>
+                        <a:defRPr/>
+                      </a:pPr>
+                      <a:r>
+                        <a:rPr lang="en-US" sz="1400" b="1" dirty="0" err="1">
+                          <a:solidFill>
+                            <a:schemeClr val="tx1"/>
+                          </a:solidFill>
+                          <a:latin typeface="Times New Roman" panose="02020603050405020304" pitchFamily="18" charset="0"/>
+                          <a:cs typeface="Times New Roman" panose="02020603050405020304" pitchFamily="18" charset="0"/>
+                        </a:rPr>
+                        <a:t>KICMistral</a:t>
+                      </a:r>
+                      <a:endParaRPr lang="en-US" sz="1400" b="1" dirty="0">
+                        <a:solidFill>
+                          <a:schemeClr val="tx1"/>
+                        </a:solidFill>
+                        <a:latin typeface="Times New Roman" panose="02020603050405020304" pitchFamily="18" charset="0"/>
+                        <a:cs typeface="Times New Roman" panose="02020603050405020304" pitchFamily="18" charset="0"/>
+                      </a:endParaRPr>
+                    </a:p>
+                  </a:txBody>
+                  <a:tcPr/>
+                </a:tc>
+                <a:tc hMerge="1">
+                  <a:txBody>
+                    <a:bodyPr/>
+                    <a:lstStyle/>
+                    <a:p>
+                      <a:endParaRPr lang="en-US" dirty="0"/>
+                    </a:p>
+                  </a:txBody>
+                  <a:tcPr/>
+                </a:tc>
+                <a:tc hMerge="1">
+                  <a:txBody>
+                    <a:bodyPr/>
+                    <a:lstStyle/>
+                    <a:p>
+                      <a:endParaRPr lang="en-US" dirty="0"/>
+                    </a:p>
+                  </a:txBody>
+                  <a:tcPr/>
+                </a:tc>
+                <a:tc hMerge="1">
+                  <a:txBody>
+                    <a:bodyPr/>
+                    <a:lstStyle/>
+                    <a:p>
+                      <a:endParaRPr lang="en-US" dirty="0"/>
+                    </a:p>
+                  </a:txBody>
+                  <a:tcPr/>
+                </a:tc>
+                <a:tc gridSpan="4">
+                  <a:txBody>
+                    <a:bodyPr/>
+                    <a:lstStyle/>
+                    <a:p>
+                      <a:pPr marL="0" marR="0" lvl="0" indent="0" algn="ctr" defTabSz="457200" rtl="0" eaLnBrk="1" fontAlgn="auto" latinLnBrk="0" hangingPunct="1">
+                        <a:lnSpc>
+                          <a:spcPct val="100000"/>
+                        </a:lnSpc>
+                        <a:spcBef>
+                          <a:spcPts val="0"/>
+                        </a:spcBef>
+                        <a:spcAft>
+                          <a:spcPts val="0"/>
+                        </a:spcAft>
+                        <a:buClrTx/>
+                        <a:buSzTx/>
+                        <a:buFontTx/>
+                        <a:buNone/>
+                        <a:tabLst/>
+                        <a:defRPr/>
+                      </a:pPr>
+                      <a:r>
+                        <a:rPr lang="en-US" sz="1400" b="1" dirty="0" err="1">
+                          <a:solidFill>
+                            <a:schemeClr val="tx1"/>
+                          </a:solidFill>
+                          <a:latin typeface="Times New Roman" panose="02020603050405020304" pitchFamily="18" charset="0"/>
+                          <a:cs typeface="Times New Roman" panose="02020603050405020304" pitchFamily="18" charset="0"/>
+                        </a:rPr>
+                        <a:t>KICMistral</a:t>
+                      </a:r>
+                      <a:r>
+                        <a:rPr lang="en-US" sz="1400" b="1" dirty="0">
+                          <a:solidFill>
+                            <a:schemeClr val="tx1"/>
+                          </a:solidFill>
+                          <a:latin typeface="Times New Roman" panose="02020603050405020304" pitchFamily="18" charset="0"/>
+                          <a:cs typeface="Times New Roman" panose="02020603050405020304" pitchFamily="18" charset="0"/>
+                        </a:rPr>
+                        <a:t> 8X7B-50</a:t>
+                      </a:r>
+                    </a:p>
+                    <a:p>
+                      <a:pPr algn="ctr" rtl="0" fontAlgn="t">
+                        <a:spcBef>
+                          <a:spcPts val="0"/>
+                        </a:spcBef>
+                        <a:spcAft>
+                          <a:spcPts val="0"/>
+                        </a:spcAft>
+                      </a:pPr>
+                      <a:r>
+                        <a:rPr lang="en-US" altLang="zh-CN" sz="1400" b="1" u="none" dirty="0" err="1">
+                          <a:solidFill>
+                            <a:schemeClr val="tx1"/>
+                          </a:solidFill>
+                          <a:effectLst/>
+                          <a:latin typeface="Times New Roman" panose="02020603050405020304" pitchFamily="18" charset="0"/>
+                          <a:cs typeface="Times New Roman" panose="02020603050405020304" pitchFamily="18" charset="0"/>
+                        </a:rPr>
+                        <a:t>tsa</a:t>
+                      </a:r>
+                      <a:endParaRPr lang="en-US" sz="1400" b="1" u="none" dirty="0">
+                        <a:solidFill>
+                          <a:schemeClr val="tx1"/>
+                        </a:solidFill>
+                        <a:effectLst/>
+                        <a:latin typeface="Times New Roman" panose="02020603050405020304" pitchFamily="18" charset="0"/>
+                        <a:cs typeface="Times New Roman" panose="02020603050405020304" pitchFamily="18" charset="0"/>
+                      </a:endParaRPr>
+                    </a:p>
+                  </a:txBody>
+                  <a:tcPr/>
+                </a:tc>
+                <a:tc hMerge="1">
+                  <a:txBody>
+                    <a:bodyPr/>
+                    <a:lstStyle/>
+                    <a:p>
+                      <a:pPr algn="ctr" rtl="0" fontAlgn="t">
+                        <a:spcBef>
+                          <a:spcPts val="0"/>
+                        </a:spcBef>
+                        <a:spcAft>
+                          <a:spcPts val="0"/>
+                        </a:spcAft>
+                      </a:pPr>
+                      <a:endParaRPr lang="en-US" sz="1400" b="1" u="none" dirty="0">
+                        <a:solidFill>
+                          <a:schemeClr val="tx1"/>
+                        </a:solidFill>
+                        <a:effectLst/>
+                        <a:latin typeface="Times New Roman" panose="02020603050405020304" pitchFamily="18" charset="0"/>
+                        <a:cs typeface="Times New Roman" panose="02020603050405020304" pitchFamily="18" charset="0"/>
+                      </a:endParaRPr>
+                    </a:p>
+                  </a:txBody>
+                  <a:tcPr/>
+                </a:tc>
+                <a:tc hMerge="1">
+                  <a:txBody>
+                    <a:bodyPr/>
+                    <a:lstStyle/>
+                    <a:p>
+                      <a:pPr algn="ctr" rtl="0" fontAlgn="t">
+                        <a:spcBef>
+                          <a:spcPts val="0"/>
+                        </a:spcBef>
+                        <a:spcAft>
+                          <a:spcPts val="0"/>
+                        </a:spcAft>
+                      </a:pPr>
+                      <a:endParaRPr lang="en-US" sz="1400" b="1" u="none" dirty="0">
+                        <a:solidFill>
+                          <a:schemeClr val="tx1"/>
+                        </a:solidFill>
+                        <a:effectLst/>
+                        <a:latin typeface="Times New Roman" panose="02020603050405020304" pitchFamily="18" charset="0"/>
+                        <a:cs typeface="Times New Roman" panose="02020603050405020304" pitchFamily="18" charset="0"/>
+                      </a:endParaRPr>
+                    </a:p>
+                  </a:txBody>
+                  <a:tcPr/>
+                </a:tc>
+                <a:tc hMerge="1">
+                  <a:txBody>
+                    <a:bodyPr/>
+                    <a:lstStyle/>
+                    <a:p>
+                      <a:pPr algn="ctr" rtl="0" fontAlgn="t">
+                        <a:spcBef>
+                          <a:spcPts val="0"/>
+                        </a:spcBef>
+                        <a:spcAft>
+                          <a:spcPts val="0"/>
+                        </a:spcAft>
+                      </a:pPr>
+                      <a:endParaRPr lang="en-US" sz="1400" b="1" u="none" dirty="0">
+                        <a:solidFill>
+                          <a:schemeClr val="tx1"/>
+                        </a:solidFill>
+                        <a:effectLst/>
+                        <a:latin typeface="Times New Roman" panose="02020603050405020304" pitchFamily="18" charset="0"/>
+                        <a:cs typeface="Times New Roman" panose="02020603050405020304" pitchFamily="18" charset="0"/>
+                      </a:endParaRPr>
+                    </a:p>
+                  </a:txBody>
+                  <a:tcPr/>
+                </a:tc>
+                <a:extLst>
+                  <a:ext uri="{0D108BD9-81ED-4DB2-BD59-A6C34878D82A}">
+                    <a16:rowId xmlns:a16="http://schemas.microsoft.com/office/drawing/2014/main" val="2004111872"/>
+                  </a:ext>
+                </a:extLst>
+              </a:tr>
+              <a:tr h="359323">
+                <a:tc>
+                  <a:txBody>
+                    <a:bodyPr/>
+                    <a:lstStyle/>
+                    <a:p>
+                      <a:pPr marL="0" marR="0" lvl="0" indent="0" algn="ctr" defTabSz="457200" rtl="0" eaLnBrk="1" fontAlgn="t" latinLnBrk="0" hangingPunct="1">
+                        <a:lnSpc>
+                          <a:spcPct val="100000"/>
+                        </a:lnSpc>
+                        <a:spcBef>
+                          <a:spcPts val="0"/>
+                        </a:spcBef>
+                        <a:spcAft>
+                          <a:spcPts val="0"/>
+                        </a:spcAft>
+                        <a:buClrTx/>
+                        <a:buSzTx/>
+                        <a:buFontTx/>
+                        <a:buNone/>
+                        <a:tabLst/>
+                        <a:defRPr/>
+                      </a:pPr>
+                      <a:r>
+                        <a:rPr lang="en-US" sz="1400" b="1" kern="1200" dirty="0" err="1">
+                          <a:solidFill>
+                            <a:schemeClr val="dk1"/>
+                          </a:solidFill>
+                          <a:effectLst/>
+                          <a:latin typeface="Times New Roman" panose="02020603050405020304" pitchFamily="18" charset="0"/>
+                          <a:ea typeface="+mn-ea"/>
+                          <a:cs typeface="Times New Roman" panose="02020603050405020304" pitchFamily="18" charset="0"/>
+                        </a:rPr>
+                        <a:t>eff_demon_step</a:t>
+                      </a:r>
+                      <a:endParaRPr lang="en-US" sz="1400" b="1" kern="1200" dirty="0">
+                        <a:solidFill>
+                          <a:schemeClr val="dk1"/>
+                        </a:solidFill>
+                        <a:effectLst/>
+                        <a:latin typeface="Times New Roman" panose="02020603050405020304" pitchFamily="18" charset="0"/>
+                        <a:ea typeface="+mn-ea"/>
+                        <a:cs typeface="Times New Roman" panose="02020603050405020304" pitchFamily="18" charset="0"/>
+                      </a:endParaRPr>
+                    </a:p>
+                  </a:txBody>
+                  <a:tcPr marL="63500" marR="63500" marT="63500" marB="63500" anchor="ctr"/>
+                </a:tc>
+                <a:tc>
+                  <a:txBody>
+                    <a:bodyPr/>
+                    <a:lstStyle/>
+                    <a:p>
+                      <a:pPr algn="ctr" rtl="0" fontAlgn="t">
+                        <a:spcBef>
+                          <a:spcPts val="0"/>
+                        </a:spcBef>
+                        <a:spcAft>
+                          <a:spcPts val="0"/>
+                        </a:spcAft>
+                      </a:pPr>
+                      <a:r>
+                        <a:rPr lang="en-US" sz="1400" b="1" i="0" u="none" strike="noStrike" dirty="0">
+                          <a:solidFill>
+                            <a:srgbClr val="000000"/>
+                          </a:solidFill>
+                          <a:effectLst/>
+                          <a:latin typeface="Times New Roman" panose="02020603050405020304" pitchFamily="18" charset="0"/>
+                          <a:cs typeface="Times New Roman" panose="02020603050405020304" pitchFamily="18" charset="0"/>
+                        </a:rPr>
+                        <a:t>MRR</a:t>
+                      </a:r>
+                      <a:endParaRPr lang="en-US" sz="1400" u="none" dirty="0">
+                        <a:effectLst/>
+                        <a:latin typeface="Times New Roman" panose="02020603050405020304" pitchFamily="18" charset="0"/>
+                        <a:cs typeface="Times New Roman" panose="02020603050405020304" pitchFamily="18" charset="0"/>
+                      </a:endParaRPr>
+                    </a:p>
+                  </a:txBody>
+                  <a:tcPr marL="63500" marR="63500" marT="63500" marB="63500" anchor="ctr"/>
+                </a:tc>
+                <a:tc>
+                  <a:txBody>
+                    <a:bodyPr/>
+                    <a:lstStyle/>
+                    <a:p>
+                      <a:pPr algn="ctr" rtl="0" fontAlgn="t">
+                        <a:spcBef>
+                          <a:spcPts val="0"/>
+                        </a:spcBef>
+                        <a:spcAft>
+                          <a:spcPts val="0"/>
+                        </a:spcAft>
+                      </a:pPr>
+                      <a:r>
+                        <a:rPr lang="en-US" sz="1400" b="1" i="0" u="none" strike="noStrike" dirty="0">
+                          <a:solidFill>
+                            <a:srgbClr val="000000"/>
+                          </a:solidFill>
+                          <a:effectLst/>
+                          <a:latin typeface="Times New Roman" panose="02020603050405020304" pitchFamily="18" charset="0"/>
+                          <a:cs typeface="Times New Roman" panose="02020603050405020304" pitchFamily="18" charset="0"/>
+                        </a:rPr>
+                        <a:t>Hits@1</a:t>
+                      </a:r>
+                      <a:endParaRPr lang="en-US" sz="1400" u="none" dirty="0">
+                        <a:effectLst/>
+                        <a:latin typeface="Times New Roman" panose="02020603050405020304" pitchFamily="18" charset="0"/>
+                        <a:cs typeface="Times New Roman" panose="02020603050405020304" pitchFamily="18" charset="0"/>
+                      </a:endParaRPr>
+                    </a:p>
+                  </a:txBody>
+                  <a:tcPr marL="63500" marR="63500" marT="63500" marB="63500" anchor="ctr"/>
+                </a:tc>
+                <a:tc>
+                  <a:txBody>
+                    <a:bodyPr/>
+                    <a:lstStyle/>
+                    <a:p>
+                      <a:pPr algn="ctr" rtl="0" fontAlgn="t">
+                        <a:spcBef>
+                          <a:spcPts val="0"/>
+                        </a:spcBef>
+                        <a:spcAft>
+                          <a:spcPts val="0"/>
+                        </a:spcAft>
+                      </a:pPr>
+                      <a:r>
+                        <a:rPr lang="en-US" sz="1400" b="1" i="0" u="none" strike="noStrike" dirty="0">
+                          <a:solidFill>
+                            <a:srgbClr val="000000"/>
+                          </a:solidFill>
+                          <a:effectLst/>
+                          <a:latin typeface="Times New Roman" panose="02020603050405020304" pitchFamily="18" charset="0"/>
+                          <a:cs typeface="Times New Roman" panose="02020603050405020304" pitchFamily="18" charset="0"/>
+                        </a:rPr>
+                        <a:t>Hits@3</a:t>
+                      </a:r>
+                      <a:endParaRPr lang="en-US" sz="1400" u="none" dirty="0">
+                        <a:effectLst/>
+                        <a:latin typeface="Times New Roman" panose="02020603050405020304" pitchFamily="18" charset="0"/>
+                        <a:cs typeface="Times New Roman" panose="02020603050405020304" pitchFamily="18" charset="0"/>
+                      </a:endParaRPr>
+                    </a:p>
+                  </a:txBody>
+                  <a:tcPr marL="63500" marR="63500" marT="63500" marB="63500" anchor="ctr"/>
+                </a:tc>
+                <a:tc>
+                  <a:txBody>
+                    <a:bodyPr/>
+                    <a:lstStyle/>
+                    <a:p>
+                      <a:pPr algn="ctr" rtl="0" fontAlgn="t">
+                        <a:spcBef>
+                          <a:spcPts val="0"/>
+                        </a:spcBef>
+                        <a:spcAft>
+                          <a:spcPts val="0"/>
+                        </a:spcAft>
+                      </a:pPr>
+                      <a:r>
+                        <a:rPr lang="en-US" sz="1400" b="1" i="0" u="none" strike="noStrike" dirty="0">
+                          <a:solidFill>
+                            <a:srgbClr val="000000"/>
+                          </a:solidFill>
+                          <a:effectLst/>
+                          <a:latin typeface="Times New Roman" panose="02020603050405020304" pitchFamily="18" charset="0"/>
+                          <a:cs typeface="Times New Roman" panose="02020603050405020304" pitchFamily="18" charset="0"/>
+                        </a:rPr>
+                        <a:t>Hits@10</a:t>
+                      </a:r>
+                      <a:endParaRPr lang="en-US" sz="1400" u="none" dirty="0">
+                        <a:effectLst/>
+                        <a:latin typeface="Times New Roman" panose="02020603050405020304" pitchFamily="18" charset="0"/>
+                        <a:cs typeface="Times New Roman" panose="02020603050405020304" pitchFamily="18" charset="0"/>
+                      </a:endParaRPr>
+                    </a:p>
+                  </a:txBody>
+                  <a:tcPr marL="63500" marR="63500" marT="63500" marB="63500" anchor="ctr"/>
+                </a:tc>
+                <a:tc>
+                  <a:txBody>
+                    <a:bodyPr/>
+                    <a:lstStyle/>
+                    <a:p>
+                      <a:pPr algn="ctr" rtl="0" fontAlgn="t">
+                        <a:spcBef>
+                          <a:spcPts val="0"/>
+                        </a:spcBef>
+                        <a:spcAft>
+                          <a:spcPts val="0"/>
+                        </a:spcAft>
+                      </a:pPr>
+                      <a:r>
+                        <a:rPr lang="en-US" sz="1400" b="1" i="0" u="none" strike="noStrike" dirty="0">
+                          <a:solidFill>
+                            <a:srgbClr val="000000"/>
+                          </a:solidFill>
+                          <a:effectLst/>
+                          <a:latin typeface="Times New Roman" panose="02020603050405020304" pitchFamily="18" charset="0"/>
+                          <a:cs typeface="Times New Roman" panose="02020603050405020304" pitchFamily="18" charset="0"/>
+                        </a:rPr>
+                        <a:t>MRR</a:t>
+                      </a:r>
+                      <a:endParaRPr lang="en-US" sz="1400" u="none" dirty="0">
+                        <a:effectLst/>
+                        <a:latin typeface="Times New Roman" panose="02020603050405020304" pitchFamily="18" charset="0"/>
+                        <a:cs typeface="Times New Roman" panose="02020603050405020304" pitchFamily="18" charset="0"/>
+                      </a:endParaRPr>
+                    </a:p>
+                  </a:txBody>
+                  <a:tcPr marL="63500" marR="63500" marT="63500" marB="63500" anchor="ctr"/>
+                </a:tc>
+                <a:tc>
+                  <a:txBody>
+                    <a:bodyPr/>
+                    <a:lstStyle/>
+                    <a:p>
+                      <a:pPr algn="ctr" rtl="0" fontAlgn="t">
+                        <a:spcBef>
+                          <a:spcPts val="0"/>
+                        </a:spcBef>
+                        <a:spcAft>
+                          <a:spcPts val="0"/>
+                        </a:spcAft>
+                      </a:pPr>
+                      <a:r>
+                        <a:rPr lang="en-US" sz="1400" b="1" i="0" u="none" strike="noStrike" dirty="0">
+                          <a:solidFill>
+                            <a:srgbClr val="000000"/>
+                          </a:solidFill>
+                          <a:effectLst/>
+                          <a:latin typeface="Times New Roman" panose="02020603050405020304" pitchFamily="18" charset="0"/>
+                          <a:cs typeface="Times New Roman" panose="02020603050405020304" pitchFamily="18" charset="0"/>
+                        </a:rPr>
+                        <a:t>Hits@1</a:t>
+                      </a:r>
+                      <a:endParaRPr lang="en-US" sz="1400" u="none" dirty="0">
+                        <a:effectLst/>
+                        <a:latin typeface="Times New Roman" panose="02020603050405020304" pitchFamily="18" charset="0"/>
+                        <a:cs typeface="Times New Roman" panose="02020603050405020304" pitchFamily="18" charset="0"/>
+                      </a:endParaRPr>
+                    </a:p>
+                  </a:txBody>
+                  <a:tcPr marL="63500" marR="63500" marT="63500" marB="63500" anchor="ctr"/>
+                </a:tc>
+                <a:tc>
+                  <a:txBody>
+                    <a:bodyPr/>
+                    <a:lstStyle/>
+                    <a:p>
+                      <a:pPr algn="ctr" rtl="0" fontAlgn="t">
+                        <a:spcBef>
+                          <a:spcPts val="0"/>
+                        </a:spcBef>
+                        <a:spcAft>
+                          <a:spcPts val="0"/>
+                        </a:spcAft>
+                      </a:pPr>
+                      <a:r>
+                        <a:rPr lang="en-US" sz="1400" b="1" i="0" u="none" strike="noStrike" dirty="0">
+                          <a:solidFill>
+                            <a:srgbClr val="000000"/>
+                          </a:solidFill>
+                          <a:effectLst/>
+                          <a:latin typeface="Times New Roman" panose="02020603050405020304" pitchFamily="18" charset="0"/>
+                          <a:cs typeface="Times New Roman" panose="02020603050405020304" pitchFamily="18" charset="0"/>
+                        </a:rPr>
+                        <a:t>Hits@3</a:t>
+                      </a:r>
+                      <a:endParaRPr lang="en-US" sz="1400" u="none" dirty="0">
+                        <a:effectLst/>
+                        <a:latin typeface="Times New Roman" panose="02020603050405020304" pitchFamily="18" charset="0"/>
+                        <a:cs typeface="Times New Roman" panose="02020603050405020304" pitchFamily="18" charset="0"/>
+                      </a:endParaRPr>
+                    </a:p>
+                  </a:txBody>
+                  <a:tcPr marL="63500" marR="63500" marT="63500" marB="63500" anchor="ctr"/>
+                </a:tc>
+                <a:tc>
+                  <a:txBody>
+                    <a:bodyPr/>
+                    <a:lstStyle/>
+                    <a:p>
+                      <a:pPr algn="ctr" rtl="0" fontAlgn="t">
+                        <a:spcBef>
+                          <a:spcPts val="0"/>
+                        </a:spcBef>
+                        <a:spcAft>
+                          <a:spcPts val="0"/>
+                        </a:spcAft>
+                      </a:pPr>
+                      <a:r>
+                        <a:rPr lang="en-US" sz="1400" b="1" i="0" u="none" strike="noStrike" dirty="0">
+                          <a:solidFill>
+                            <a:srgbClr val="000000"/>
+                          </a:solidFill>
+                          <a:effectLst/>
+                          <a:latin typeface="Times New Roman" panose="02020603050405020304" pitchFamily="18" charset="0"/>
+                          <a:cs typeface="Times New Roman" panose="02020603050405020304" pitchFamily="18" charset="0"/>
+                        </a:rPr>
+                        <a:t>Hits@10</a:t>
+                      </a:r>
+                      <a:endParaRPr lang="en-US" sz="1400" u="none" dirty="0">
+                        <a:effectLst/>
+                        <a:latin typeface="Times New Roman" panose="02020603050405020304" pitchFamily="18" charset="0"/>
+                        <a:cs typeface="Times New Roman" panose="02020603050405020304" pitchFamily="18" charset="0"/>
+                      </a:endParaRPr>
+                    </a:p>
+                  </a:txBody>
+                  <a:tcPr marL="63500" marR="63500" marT="63500" marB="63500" anchor="ctr"/>
+                </a:tc>
+                <a:extLst>
+                  <a:ext uri="{0D108BD9-81ED-4DB2-BD59-A6C34878D82A}">
+                    <a16:rowId xmlns:a16="http://schemas.microsoft.com/office/drawing/2014/main" val="1788014971"/>
+                  </a:ext>
+                </a:extLst>
+              </a:tr>
+              <a:tr h="335645">
+                <a:tc>
+                  <a:txBody>
+                    <a:bodyPr/>
+                    <a:lstStyle/>
+                    <a:p>
+                      <a:pPr algn="ctr" rtl="0" fontAlgn="t">
+                        <a:spcBef>
+                          <a:spcPts val="0"/>
+                        </a:spcBef>
+                        <a:spcAft>
+                          <a:spcPts val="0"/>
+                        </a:spcAft>
+                      </a:pPr>
+                      <a:r>
+                        <a:rPr lang="en-US" sz="1400" b="0" i="0" u="none" dirty="0">
+                          <a:solidFill>
+                            <a:schemeClr val="tx1"/>
+                          </a:solidFill>
+                          <a:effectLst/>
+                          <a:latin typeface="Times New Roman" panose="02020603050405020304" pitchFamily="18" charset="0"/>
+                          <a:cs typeface="Times New Roman" panose="02020603050405020304" pitchFamily="18" charset="0"/>
+                        </a:rPr>
+                        <a:t>1</a:t>
+                      </a:r>
+                    </a:p>
+                  </a:txBody>
+                  <a:tcPr marL="63500" marR="63500" marT="63500" marB="63500" anchor="ctr"/>
+                </a:tc>
+                <a:tc>
+                  <a:txBody>
+                    <a:bodyPr/>
+                    <a:lstStyle/>
+                    <a:p>
+                      <a:pPr algn="ctr" rtl="0" fontAlgn="ctr">
+                        <a:spcBef>
+                          <a:spcPts val="0"/>
+                        </a:spcBef>
+                        <a:spcAft>
+                          <a:spcPts val="0"/>
+                        </a:spcAft>
+                      </a:pPr>
+                      <a:r>
+                        <a:rPr lang="en-US" sz="1400" b="0" u="none" dirty="0">
+                          <a:solidFill>
+                            <a:schemeClr val="tx1"/>
+                          </a:solidFill>
+                          <a:effectLst/>
+                          <a:latin typeface="Times New Roman" panose="02020603050405020304" pitchFamily="18" charset="0"/>
+                          <a:cs typeface="Times New Roman" panose="02020603050405020304" pitchFamily="18" charset="0"/>
+                        </a:rPr>
+                        <a:t>0.3149</a:t>
+                      </a:r>
+                    </a:p>
+                  </a:txBody>
+                  <a:tcPr marL="63500" marR="63500" marT="63500" marB="63500" anchor="ctr"/>
+                </a:tc>
+                <a:tc>
+                  <a:txBody>
+                    <a:bodyPr/>
+                    <a:lstStyle/>
+                    <a:p>
+                      <a:pPr algn="ctr" rtl="0" fontAlgn="ctr">
+                        <a:spcBef>
+                          <a:spcPts val="0"/>
+                        </a:spcBef>
+                        <a:spcAft>
+                          <a:spcPts val="0"/>
+                        </a:spcAft>
+                      </a:pPr>
+                      <a:r>
+                        <a:rPr lang="en-US" sz="1400" b="0" u="none" dirty="0">
+                          <a:solidFill>
+                            <a:schemeClr val="tx1"/>
+                          </a:solidFill>
+                          <a:effectLst/>
+                          <a:latin typeface="Times New Roman" panose="02020603050405020304" pitchFamily="18" charset="0"/>
+                          <a:cs typeface="Times New Roman" panose="02020603050405020304" pitchFamily="18" charset="0"/>
+                        </a:rPr>
+                        <a:t>0.1900</a:t>
+                      </a:r>
+                    </a:p>
+                  </a:txBody>
+                  <a:tcPr marL="63500" marR="63500" marT="63500" marB="63500" anchor="ctr"/>
+                </a:tc>
+                <a:tc>
+                  <a:txBody>
+                    <a:bodyPr/>
+                    <a:lstStyle/>
+                    <a:p>
+                      <a:pPr algn="ctr" rtl="0" fontAlgn="ctr">
+                        <a:spcBef>
+                          <a:spcPts val="0"/>
+                        </a:spcBef>
+                        <a:spcAft>
+                          <a:spcPts val="0"/>
+                        </a:spcAft>
+                      </a:pPr>
+                      <a:r>
+                        <a:rPr lang="en-US" sz="1400" b="0" u="none" dirty="0">
+                          <a:solidFill>
+                            <a:schemeClr val="tx1"/>
+                          </a:solidFill>
+                          <a:effectLst/>
+                          <a:latin typeface="Times New Roman" panose="02020603050405020304" pitchFamily="18" charset="0"/>
+                          <a:cs typeface="Times New Roman" panose="02020603050405020304" pitchFamily="18" charset="0"/>
+                        </a:rPr>
+                        <a:t>0.3800</a:t>
+                      </a:r>
+                    </a:p>
+                  </a:txBody>
+                  <a:tcPr marL="63500" marR="63500" marT="63500" marB="63500" anchor="ctr"/>
+                </a:tc>
+                <a:tc>
+                  <a:txBody>
+                    <a:bodyPr/>
+                    <a:lstStyle/>
+                    <a:p>
+                      <a:pPr algn="ctr" rtl="0" fontAlgn="ctr">
+                        <a:spcBef>
+                          <a:spcPts val="0"/>
+                        </a:spcBef>
+                        <a:spcAft>
+                          <a:spcPts val="0"/>
+                        </a:spcAft>
+                      </a:pPr>
+                      <a:r>
+                        <a:rPr lang="en-US" sz="1400" b="0" u="none" dirty="0">
+                          <a:solidFill>
+                            <a:schemeClr val="tx1"/>
+                          </a:solidFill>
+                          <a:effectLst/>
+                          <a:latin typeface="Times New Roman" panose="02020603050405020304" pitchFamily="18" charset="0"/>
+                          <a:cs typeface="Times New Roman" panose="02020603050405020304" pitchFamily="18" charset="0"/>
+                        </a:rPr>
+                        <a:t>0.5500</a:t>
+                      </a:r>
+                    </a:p>
+                  </a:txBody>
+                  <a:tcPr marL="63500" marR="63500" marT="63500" marB="63500" anchor="ctr"/>
+                </a:tc>
+                <a:tc>
+                  <a:txBody>
+                    <a:bodyPr/>
+                    <a:lstStyle/>
+                    <a:p>
+                      <a:pPr algn="ctr" rtl="0" fontAlgn="ctr">
+                        <a:spcBef>
+                          <a:spcPts val="0"/>
+                        </a:spcBef>
+                        <a:spcAft>
+                          <a:spcPts val="0"/>
+                        </a:spcAft>
+                      </a:pPr>
+                      <a:endParaRPr lang="en-US" sz="1400" b="0" u="none" dirty="0">
+                        <a:solidFill>
+                          <a:schemeClr val="tx1"/>
+                        </a:solidFill>
+                        <a:effectLst/>
+                        <a:latin typeface="Times New Roman" panose="02020603050405020304" pitchFamily="18" charset="0"/>
+                        <a:cs typeface="Times New Roman" panose="02020603050405020304" pitchFamily="18" charset="0"/>
+                      </a:endParaRPr>
+                    </a:p>
+                  </a:txBody>
+                  <a:tcPr marL="63500" marR="63500" marT="63500" marB="63500" anchor="ctr"/>
+                </a:tc>
+                <a:tc>
+                  <a:txBody>
+                    <a:bodyPr/>
+                    <a:lstStyle/>
+                    <a:p>
+                      <a:pPr algn="ctr" rtl="0" fontAlgn="ctr">
+                        <a:spcBef>
+                          <a:spcPts val="0"/>
+                        </a:spcBef>
+                        <a:spcAft>
+                          <a:spcPts val="0"/>
+                        </a:spcAft>
+                      </a:pPr>
+                      <a:endParaRPr lang="en-US" sz="1400" b="0" u="none" dirty="0">
+                        <a:solidFill>
+                          <a:schemeClr val="tx1"/>
+                        </a:solidFill>
+                        <a:effectLst/>
+                        <a:latin typeface="Times New Roman" panose="02020603050405020304" pitchFamily="18" charset="0"/>
+                        <a:cs typeface="Times New Roman" panose="02020603050405020304" pitchFamily="18" charset="0"/>
+                      </a:endParaRPr>
+                    </a:p>
+                  </a:txBody>
+                  <a:tcPr marL="63500" marR="63500" marT="63500" marB="63500" anchor="ctr"/>
+                </a:tc>
+                <a:tc>
+                  <a:txBody>
+                    <a:bodyPr/>
+                    <a:lstStyle/>
+                    <a:p>
+                      <a:pPr algn="ctr" rtl="0" fontAlgn="ctr">
+                        <a:spcBef>
+                          <a:spcPts val="0"/>
+                        </a:spcBef>
+                        <a:spcAft>
+                          <a:spcPts val="0"/>
+                        </a:spcAft>
+                      </a:pPr>
+                      <a:endParaRPr lang="en-US" sz="1400" b="0" u="none" dirty="0">
+                        <a:solidFill>
+                          <a:schemeClr val="tx1"/>
+                        </a:solidFill>
+                        <a:effectLst/>
+                        <a:latin typeface="Times New Roman" panose="02020603050405020304" pitchFamily="18" charset="0"/>
+                        <a:cs typeface="Times New Roman" panose="02020603050405020304" pitchFamily="18" charset="0"/>
+                      </a:endParaRPr>
+                    </a:p>
+                  </a:txBody>
+                  <a:tcPr marL="63500" marR="63500" marT="63500" marB="63500" anchor="ctr"/>
+                </a:tc>
+                <a:tc>
+                  <a:txBody>
+                    <a:bodyPr/>
+                    <a:lstStyle/>
+                    <a:p>
+                      <a:pPr algn="ctr" rtl="0" fontAlgn="ctr">
+                        <a:spcBef>
+                          <a:spcPts val="0"/>
+                        </a:spcBef>
+                        <a:spcAft>
+                          <a:spcPts val="0"/>
+                        </a:spcAft>
+                      </a:pPr>
+                      <a:endParaRPr lang="en-US" sz="1400" b="0" u="none" dirty="0">
+                        <a:solidFill>
+                          <a:schemeClr val="tx1"/>
+                        </a:solidFill>
+                        <a:effectLst/>
+                        <a:latin typeface="Times New Roman" panose="02020603050405020304" pitchFamily="18" charset="0"/>
+                        <a:cs typeface="Times New Roman" panose="02020603050405020304" pitchFamily="18" charset="0"/>
+                      </a:endParaRPr>
+                    </a:p>
+                  </a:txBody>
+                  <a:tcPr marL="63500" marR="63500" marT="63500" marB="63500" anchor="ctr"/>
+                </a:tc>
+                <a:extLst>
+                  <a:ext uri="{0D108BD9-81ED-4DB2-BD59-A6C34878D82A}">
+                    <a16:rowId xmlns:a16="http://schemas.microsoft.com/office/drawing/2014/main" val="782074905"/>
+                  </a:ext>
+                </a:extLst>
+              </a:tr>
+              <a:tr h="347982">
+                <a:tc>
+                  <a:txBody>
+                    <a:bodyPr/>
+                    <a:lstStyle/>
+                    <a:p>
+                      <a:pPr algn="ctr" rtl="0" fontAlgn="t">
+                        <a:spcBef>
+                          <a:spcPts val="0"/>
+                        </a:spcBef>
+                        <a:spcAft>
+                          <a:spcPts val="0"/>
+                        </a:spcAft>
+                      </a:pPr>
+                      <a:r>
+                        <a:rPr lang="en-US" sz="1400" b="0" i="0" u="none" dirty="0">
+                          <a:solidFill>
+                            <a:schemeClr val="tx1"/>
+                          </a:solidFill>
+                          <a:effectLst/>
+                          <a:latin typeface="Times New Roman" panose="02020603050405020304" pitchFamily="18" charset="0"/>
+                          <a:cs typeface="Times New Roman" panose="02020603050405020304" pitchFamily="18" charset="0"/>
+                        </a:rPr>
+                        <a:t>2</a:t>
+                      </a:r>
+                    </a:p>
+                  </a:txBody>
+                  <a:tcPr marL="63500" marR="63500" marT="63500" marB="63500" anchor="ctr"/>
+                </a:tc>
+                <a:tc>
+                  <a:txBody>
+                    <a:bodyPr/>
+                    <a:lstStyle/>
+                    <a:p>
+                      <a:pPr algn="ctr" rtl="0" fontAlgn="ctr">
+                        <a:spcBef>
+                          <a:spcPts val="0"/>
+                        </a:spcBef>
+                        <a:spcAft>
+                          <a:spcPts val="0"/>
+                        </a:spcAft>
+                      </a:pPr>
+                      <a:r>
+                        <a:rPr lang="en-US" sz="1400" b="0" u="none" dirty="0">
+                          <a:solidFill>
+                            <a:schemeClr val="tx1"/>
+                          </a:solidFill>
+                          <a:effectLst/>
+                          <a:latin typeface="Times New Roman" panose="02020603050405020304" pitchFamily="18" charset="0"/>
+                          <a:cs typeface="Times New Roman" panose="02020603050405020304" pitchFamily="18" charset="0"/>
+                        </a:rPr>
+                        <a:t>0.3200</a:t>
+                      </a:r>
+                    </a:p>
+                  </a:txBody>
+                  <a:tcPr marL="63500" marR="63500" marT="63500" marB="63500" anchor="ctr"/>
+                </a:tc>
+                <a:tc>
+                  <a:txBody>
+                    <a:bodyPr/>
+                    <a:lstStyle/>
+                    <a:p>
+                      <a:pPr marL="0" marR="0" lvl="0" indent="0" algn="ctr" defTabSz="457200" rtl="0" eaLnBrk="1" fontAlgn="ctr" latinLnBrk="0" hangingPunct="1">
+                        <a:lnSpc>
+                          <a:spcPct val="100000"/>
+                        </a:lnSpc>
+                        <a:spcBef>
+                          <a:spcPts val="0"/>
+                        </a:spcBef>
+                        <a:spcAft>
+                          <a:spcPts val="0"/>
+                        </a:spcAft>
+                        <a:buClrTx/>
+                        <a:buSzTx/>
+                        <a:buFontTx/>
+                        <a:buNone/>
+                        <a:tabLst/>
+                        <a:defRPr/>
+                      </a:pPr>
+                      <a:r>
+                        <a:rPr lang="en-US" sz="1400" b="0" u="none" dirty="0">
+                          <a:solidFill>
+                            <a:schemeClr val="tx1"/>
+                          </a:solidFill>
+                          <a:effectLst/>
+                          <a:latin typeface="Times New Roman" panose="02020603050405020304" pitchFamily="18" charset="0"/>
+                          <a:cs typeface="Times New Roman" panose="02020603050405020304" pitchFamily="18" charset="0"/>
+                        </a:rPr>
+                        <a:t>0.1900</a:t>
+                      </a:r>
+                    </a:p>
+                  </a:txBody>
+                  <a:tcPr marL="63500" marR="63500" marT="63500" marB="63500" anchor="ctr"/>
+                </a:tc>
+                <a:tc>
+                  <a:txBody>
+                    <a:bodyPr/>
+                    <a:lstStyle/>
+                    <a:p>
+                      <a:pPr algn="ctr" rtl="0" fontAlgn="ctr">
+                        <a:spcBef>
+                          <a:spcPts val="0"/>
+                        </a:spcBef>
+                        <a:spcAft>
+                          <a:spcPts val="0"/>
+                        </a:spcAft>
+                      </a:pPr>
+                      <a:r>
+                        <a:rPr lang="en-US" sz="1400" b="0" u="none" dirty="0">
+                          <a:solidFill>
+                            <a:schemeClr val="tx1"/>
+                          </a:solidFill>
+                          <a:effectLst/>
+                          <a:latin typeface="Times New Roman" panose="02020603050405020304" pitchFamily="18" charset="0"/>
+                          <a:cs typeface="Times New Roman" panose="02020603050405020304" pitchFamily="18" charset="0"/>
+                        </a:rPr>
+                        <a:t>0.4000</a:t>
+                      </a:r>
+                    </a:p>
+                  </a:txBody>
+                  <a:tcPr marL="63500" marR="63500" marT="63500" marB="63500" anchor="ctr"/>
+                </a:tc>
+                <a:tc>
+                  <a:txBody>
+                    <a:bodyPr/>
+                    <a:lstStyle/>
+                    <a:p>
+                      <a:pPr algn="ctr" rtl="0" fontAlgn="ctr">
+                        <a:spcBef>
+                          <a:spcPts val="0"/>
+                        </a:spcBef>
+                        <a:spcAft>
+                          <a:spcPts val="0"/>
+                        </a:spcAft>
+                      </a:pPr>
+                      <a:r>
+                        <a:rPr lang="en-US" sz="1400" b="0" u="none" dirty="0">
+                          <a:solidFill>
+                            <a:schemeClr val="tx1"/>
+                          </a:solidFill>
+                          <a:effectLst/>
+                          <a:latin typeface="Times New Roman" panose="02020603050405020304" pitchFamily="18" charset="0"/>
+                          <a:cs typeface="Times New Roman" panose="02020603050405020304" pitchFamily="18" charset="0"/>
+                        </a:rPr>
+                        <a:t>0.5700</a:t>
+                      </a:r>
+                    </a:p>
+                  </a:txBody>
+                  <a:tcPr marL="63500" marR="63500" marT="63500" marB="63500" anchor="ctr"/>
+                </a:tc>
+                <a:tc>
+                  <a:txBody>
+                    <a:bodyPr/>
+                    <a:lstStyle/>
+                    <a:p>
+                      <a:pPr algn="ctr" rtl="0" fontAlgn="ctr">
+                        <a:spcBef>
+                          <a:spcPts val="0"/>
+                        </a:spcBef>
+                        <a:spcAft>
+                          <a:spcPts val="0"/>
+                        </a:spcAft>
+                      </a:pPr>
+                      <a:endParaRPr lang="en-US" sz="1400" b="0" u="none" dirty="0">
+                        <a:solidFill>
+                          <a:schemeClr val="tx1"/>
+                        </a:solidFill>
+                        <a:effectLst/>
+                        <a:latin typeface="Times New Roman" panose="02020603050405020304" pitchFamily="18" charset="0"/>
+                        <a:cs typeface="Times New Roman" panose="02020603050405020304" pitchFamily="18" charset="0"/>
+                      </a:endParaRPr>
+                    </a:p>
+                  </a:txBody>
+                  <a:tcPr marL="63500" marR="63500" marT="63500" marB="63500" anchor="ctr"/>
+                </a:tc>
+                <a:tc>
+                  <a:txBody>
+                    <a:bodyPr/>
+                    <a:lstStyle/>
+                    <a:p>
+                      <a:pPr algn="ctr" rtl="0" fontAlgn="ctr">
+                        <a:spcBef>
+                          <a:spcPts val="0"/>
+                        </a:spcBef>
+                        <a:spcAft>
+                          <a:spcPts val="0"/>
+                        </a:spcAft>
+                      </a:pPr>
+                      <a:endParaRPr lang="en-US" sz="1400" b="0" u="none" dirty="0">
+                        <a:solidFill>
+                          <a:schemeClr val="tx1"/>
+                        </a:solidFill>
+                        <a:effectLst/>
+                        <a:latin typeface="Times New Roman" panose="02020603050405020304" pitchFamily="18" charset="0"/>
+                        <a:cs typeface="Times New Roman" panose="02020603050405020304" pitchFamily="18" charset="0"/>
+                      </a:endParaRPr>
+                    </a:p>
+                  </a:txBody>
+                  <a:tcPr marL="63500" marR="63500" marT="63500" marB="63500" anchor="ctr"/>
+                </a:tc>
+                <a:tc>
+                  <a:txBody>
+                    <a:bodyPr/>
+                    <a:lstStyle/>
+                    <a:p>
+                      <a:pPr algn="ctr" rtl="0" fontAlgn="ctr">
+                        <a:spcBef>
+                          <a:spcPts val="0"/>
+                        </a:spcBef>
+                        <a:spcAft>
+                          <a:spcPts val="0"/>
+                        </a:spcAft>
+                      </a:pPr>
+                      <a:endParaRPr lang="en-US" sz="1400" b="0" u="none" dirty="0">
+                        <a:solidFill>
+                          <a:schemeClr val="tx1"/>
+                        </a:solidFill>
+                        <a:effectLst/>
+                        <a:latin typeface="Times New Roman" panose="02020603050405020304" pitchFamily="18" charset="0"/>
+                        <a:cs typeface="Times New Roman" panose="02020603050405020304" pitchFamily="18" charset="0"/>
+                      </a:endParaRPr>
+                    </a:p>
+                  </a:txBody>
+                  <a:tcPr marL="63500" marR="63500" marT="63500" marB="63500" anchor="ctr"/>
+                </a:tc>
+                <a:tc>
+                  <a:txBody>
+                    <a:bodyPr/>
+                    <a:lstStyle/>
+                    <a:p>
+                      <a:pPr algn="ctr" rtl="0" fontAlgn="ctr">
+                        <a:spcBef>
+                          <a:spcPts val="0"/>
+                        </a:spcBef>
+                        <a:spcAft>
+                          <a:spcPts val="0"/>
+                        </a:spcAft>
+                      </a:pPr>
+                      <a:endParaRPr lang="en-US" sz="1400" b="0" u="none" dirty="0">
+                        <a:solidFill>
+                          <a:schemeClr val="tx1"/>
+                        </a:solidFill>
+                        <a:effectLst/>
+                        <a:latin typeface="Times New Roman" panose="02020603050405020304" pitchFamily="18" charset="0"/>
+                        <a:cs typeface="Times New Roman" panose="02020603050405020304" pitchFamily="18" charset="0"/>
+                      </a:endParaRPr>
+                    </a:p>
+                  </a:txBody>
+                  <a:tcPr marL="63500" marR="63500" marT="63500" marB="63500" anchor="ctr"/>
+                </a:tc>
+                <a:extLst>
+                  <a:ext uri="{0D108BD9-81ED-4DB2-BD59-A6C34878D82A}">
+                    <a16:rowId xmlns:a16="http://schemas.microsoft.com/office/drawing/2014/main" val="892219342"/>
+                  </a:ext>
+                </a:extLst>
+              </a:tr>
+              <a:tr h="293915">
+                <a:tc>
+                  <a:txBody>
+                    <a:bodyPr/>
+                    <a:lstStyle/>
+                    <a:p>
+                      <a:pPr algn="ctr" rtl="0" fontAlgn="t">
+                        <a:spcBef>
+                          <a:spcPts val="0"/>
+                        </a:spcBef>
+                        <a:spcAft>
+                          <a:spcPts val="0"/>
+                        </a:spcAft>
+                      </a:pPr>
+                      <a:r>
+                        <a:rPr lang="en-US" sz="1400" b="0" i="0" u="none" dirty="0">
+                          <a:solidFill>
+                            <a:schemeClr val="tx1"/>
+                          </a:solidFill>
+                          <a:effectLst/>
+                          <a:latin typeface="Times New Roman" panose="02020603050405020304" pitchFamily="18" charset="0"/>
+                          <a:cs typeface="Times New Roman" panose="02020603050405020304" pitchFamily="18" charset="0"/>
+                        </a:rPr>
+                        <a:t>3</a:t>
+                      </a:r>
+                    </a:p>
+                  </a:txBody>
+                  <a:tcPr marL="63500" marR="63500" marT="63500" marB="63500" anchor="ctr"/>
+                </a:tc>
+                <a:tc>
+                  <a:txBody>
+                    <a:bodyPr/>
+                    <a:lstStyle/>
+                    <a:p>
+                      <a:pPr algn="ctr" rtl="0" fontAlgn="ctr">
+                        <a:spcBef>
+                          <a:spcPts val="0"/>
+                        </a:spcBef>
+                        <a:spcAft>
+                          <a:spcPts val="0"/>
+                        </a:spcAft>
+                      </a:pPr>
+                      <a:r>
+                        <a:rPr lang="en-US" sz="1400" b="0" u="none" dirty="0">
+                          <a:solidFill>
+                            <a:schemeClr val="tx1"/>
+                          </a:solidFill>
+                          <a:effectLst/>
+                          <a:latin typeface="Times New Roman" panose="02020603050405020304" pitchFamily="18" charset="0"/>
+                          <a:cs typeface="Times New Roman" panose="02020603050405020304" pitchFamily="18" charset="0"/>
+                        </a:rPr>
+                        <a:t>0.3432</a:t>
+                      </a:r>
+                    </a:p>
+                  </a:txBody>
+                  <a:tcPr marL="63500" marR="63500" marT="63500" marB="63500" anchor="ctr"/>
+                </a:tc>
+                <a:tc>
+                  <a:txBody>
+                    <a:bodyPr/>
+                    <a:lstStyle/>
+                    <a:p>
+                      <a:pPr algn="ctr" rtl="0" fontAlgn="ctr">
+                        <a:spcBef>
+                          <a:spcPts val="0"/>
+                        </a:spcBef>
+                        <a:spcAft>
+                          <a:spcPts val="0"/>
+                        </a:spcAft>
+                      </a:pPr>
+                      <a:r>
+                        <a:rPr lang="en-US" sz="1400" b="0" u="none" dirty="0">
+                          <a:solidFill>
+                            <a:schemeClr val="tx1"/>
+                          </a:solidFill>
+                          <a:effectLst/>
+                          <a:latin typeface="Times New Roman" panose="02020603050405020304" pitchFamily="18" charset="0"/>
+                          <a:cs typeface="Times New Roman" panose="02020603050405020304" pitchFamily="18" charset="0"/>
+                        </a:rPr>
+                        <a:t>0.2200</a:t>
+                      </a:r>
+                    </a:p>
+                  </a:txBody>
+                  <a:tcPr marL="63500" marR="63500" marT="63500" marB="63500" anchor="ctr"/>
+                </a:tc>
+                <a:tc>
+                  <a:txBody>
+                    <a:bodyPr/>
+                    <a:lstStyle/>
+                    <a:p>
+                      <a:pPr algn="ctr" rtl="0" fontAlgn="ctr">
+                        <a:spcBef>
+                          <a:spcPts val="0"/>
+                        </a:spcBef>
+                        <a:spcAft>
+                          <a:spcPts val="0"/>
+                        </a:spcAft>
+                      </a:pPr>
+                      <a:r>
+                        <a:rPr lang="en-US" sz="1400" b="0" u="none" dirty="0">
+                          <a:solidFill>
+                            <a:schemeClr val="tx1"/>
+                          </a:solidFill>
+                          <a:effectLst/>
+                          <a:latin typeface="Times New Roman" panose="02020603050405020304" pitchFamily="18" charset="0"/>
+                          <a:cs typeface="Times New Roman" panose="02020603050405020304" pitchFamily="18" charset="0"/>
+                        </a:rPr>
+                        <a:t>0.4300</a:t>
+                      </a:r>
+                    </a:p>
+                  </a:txBody>
+                  <a:tcPr marL="63500" marR="63500" marT="63500" marB="63500" anchor="ctr"/>
+                </a:tc>
+                <a:tc>
+                  <a:txBody>
+                    <a:bodyPr/>
+                    <a:lstStyle/>
+                    <a:p>
+                      <a:pPr algn="ctr" rtl="0" fontAlgn="ctr">
+                        <a:spcBef>
+                          <a:spcPts val="0"/>
+                        </a:spcBef>
+                        <a:spcAft>
+                          <a:spcPts val="0"/>
+                        </a:spcAft>
+                      </a:pPr>
+                      <a:r>
+                        <a:rPr lang="en-US" sz="1400" b="0" u="none" dirty="0">
+                          <a:solidFill>
+                            <a:schemeClr val="tx1"/>
+                          </a:solidFill>
+                          <a:effectLst/>
+                          <a:latin typeface="Times New Roman" panose="02020603050405020304" pitchFamily="18" charset="0"/>
+                          <a:cs typeface="Times New Roman" panose="02020603050405020304" pitchFamily="18" charset="0"/>
+                        </a:rPr>
+                        <a:t>0.5700</a:t>
+                      </a:r>
+                    </a:p>
+                  </a:txBody>
+                  <a:tcPr marL="63500" marR="63500" marT="63500" marB="63500" anchor="ctr"/>
+                </a:tc>
+                <a:tc>
+                  <a:txBody>
+                    <a:bodyPr/>
+                    <a:lstStyle/>
+                    <a:p>
+                      <a:pPr algn="ctr" rtl="0" fontAlgn="ctr">
+                        <a:spcBef>
+                          <a:spcPts val="0"/>
+                        </a:spcBef>
+                        <a:spcAft>
+                          <a:spcPts val="0"/>
+                        </a:spcAft>
+                      </a:pPr>
+                      <a:endParaRPr lang="en-US" sz="1400" b="0" u="none" dirty="0">
+                        <a:solidFill>
+                          <a:schemeClr val="tx1"/>
+                        </a:solidFill>
+                        <a:effectLst/>
+                        <a:latin typeface="Times New Roman" panose="02020603050405020304" pitchFamily="18" charset="0"/>
+                        <a:cs typeface="Times New Roman" panose="02020603050405020304" pitchFamily="18" charset="0"/>
+                      </a:endParaRPr>
+                    </a:p>
+                  </a:txBody>
+                  <a:tcPr marL="63500" marR="63500" marT="63500" marB="63500" anchor="ctr"/>
+                </a:tc>
+                <a:tc>
+                  <a:txBody>
+                    <a:bodyPr/>
+                    <a:lstStyle/>
+                    <a:p>
+                      <a:pPr algn="ctr" rtl="0" fontAlgn="ctr">
+                        <a:spcBef>
+                          <a:spcPts val="0"/>
+                        </a:spcBef>
+                        <a:spcAft>
+                          <a:spcPts val="0"/>
+                        </a:spcAft>
+                      </a:pPr>
+                      <a:endParaRPr lang="en-US" sz="1400" b="0" u="none" dirty="0">
+                        <a:solidFill>
+                          <a:schemeClr val="tx1"/>
+                        </a:solidFill>
+                        <a:effectLst/>
+                        <a:latin typeface="Times New Roman" panose="02020603050405020304" pitchFamily="18" charset="0"/>
+                        <a:cs typeface="Times New Roman" panose="02020603050405020304" pitchFamily="18" charset="0"/>
+                      </a:endParaRPr>
+                    </a:p>
+                  </a:txBody>
+                  <a:tcPr marL="63500" marR="63500" marT="63500" marB="63500" anchor="ctr"/>
+                </a:tc>
+                <a:tc>
+                  <a:txBody>
+                    <a:bodyPr/>
+                    <a:lstStyle/>
+                    <a:p>
+                      <a:pPr algn="ctr" rtl="0" fontAlgn="ctr">
+                        <a:spcBef>
+                          <a:spcPts val="0"/>
+                        </a:spcBef>
+                        <a:spcAft>
+                          <a:spcPts val="0"/>
+                        </a:spcAft>
+                      </a:pPr>
+                      <a:endParaRPr lang="en-US" sz="1400" b="0" u="none" dirty="0">
+                        <a:solidFill>
+                          <a:schemeClr val="tx1"/>
+                        </a:solidFill>
+                        <a:effectLst/>
+                        <a:latin typeface="Times New Roman" panose="02020603050405020304" pitchFamily="18" charset="0"/>
+                        <a:cs typeface="Times New Roman" panose="02020603050405020304" pitchFamily="18" charset="0"/>
+                      </a:endParaRPr>
+                    </a:p>
+                  </a:txBody>
+                  <a:tcPr marL="63500" marR="63500" marT="63500" marB="63500" anchor="ctr"/>
+                </a:tc>
+                <a:tc>
+                  <a:txBody>
+                    <a:bodyPr/>
+                    <a:lstStyle/>
+                    <a:p>
+                      <a:pPr algn="ctr" rtl="0" fontAlgn="ctr">
+                        <a:spcBef>
+                          <a:spcPts val="0"/>
+                        </a:spcBef>
+                        <a:spcAft>
+                          <a:spcPts val="0"/>
+                        </a:spcAft>
+                      </a:pPr>
+                      <a:endParaRPr lang="en-US" sz="1400" b="0" u="none" dirty="0">
+                        <a:solidFill>
+                          <a:schemeClr val="tx1"/>
+                        </a:solidFill>
+                        <a:effectLst/>
+                        <a:latin typeface="Times New Roman" panose="02020603050405020304" pitchFamily="18" charset="0"/>
+                        <a:cs typeface="Times New Roman" panose="02020603050405020304" pitchFamily="18" charset="0"/>
+                      </a:endParaRPr>
+                    </a:p>
+                  </a:txBody>
+                  <a:tcPr marL="63500" marR="63500" marT="63500" marB="63500" anchor="ctr"/>
+                </a:tc>
+                <a:extLst>
+                  <a:ext uri="{0D108BD9-81ED-4DB2-BD59-A6C34878D82A}">
+                    <a16:rowId xmlns:a16="http://schemas.microsoft.com/office/drawing/2014/main" val="3807958631"/>
+                  </a:ext>
+                </a:extLst>
+              </a:tr>
+              <a:tr h="273595">
+                <a:tc>
+                  <a:txBody>
+                    <a:bodyPr/>
+                    <a:lstStyle/>
+                    <a:p>
+                      <a:pPr algn="ctr" rtl="0" fontAlgn="t">
+                        <a:spcBef>
+                          <a:spcPts val="0"/>
+                        </a:spcBef>
+                        <a:spcAft>
+                          <a:spcPts val="0"/>
+                        </a:spcAft>
+                      </a:pPr>
+                      <a:r>
+                        <a:rPr lang="en-US" sz="1400" b="0" i="0" u="none" dirty="0">
+                          <a:solidFill>
+                            <a:schemeClr val="tx1"/>
+                          </a:solidFill>
+                          <a:effectLst/>
+                          <a:latin typeface="Times New Roman" panose="02020603050405020304" pitchFamily="18" charset="0"/>
+                          <a:cs typeface="Times New Roman" panose="02020603050405020304" pitchFamily="18" charset="0"/>
+                        </a:rPr>
+                        <a:t>4</a:t>
+                      </a:r>
+                    </a:p>
+                  </a:txBody>
+                  <a:tcPr marL="63500" marR="63500" marT="63500" marB="63500" anchor="ctr"/>
+                </a:tc>
+                <a:tc>
+                  <a:txBody>
+                    <a:bodyPr/>
+                    <a:lstStyle/>
+                    <a:p>
+                      <a:pPr algn="ctr" rtl="0" fontAlgn="ctr">
+                        <a:spcBef>
+                          <a:spcPts val="0"/>
+                        </a:spcBef>
+                        <a:spcAft>
+                          <a:spcPts val="0"/>
+                        </a:spcAft>
+                      </a:pPr>
+                      <a:endParaRPr lang="en-US" sz="1400" b="0" u="none" dirty="0">
+                        <a:solidFill>
+                          <a:schemeClr val="tx1"/>
+                        </a:solidFill>
+                        <a:effectLst/>
+                        <a:latin typeface="Times New Roman" panose="02020603050405020304" pitchFamily="18" charset="0"/>
+                        <a:cs typeface="Times New Roman" panose="02020603050405020304" pitchFamily="18" charset="0"/>
+                      </a:endParaRPr>
+                    </a:p>
+                  </a:txBody>
+                  <a:tcPr marL="63500" marR="63500" marT="63500" marB="63500" anchor="ctr"/>
+                </a:tc>
+                <a:tc>
+                  <a:txBody>
+                    <a:bodyPr/>
+                    <a:lstStyle/>
+                    <a:p>
+                      <a:pPr algn="ctr" rtl="0" fontAlgn="ctr">
+                        <a:spcBef>
+                          <a:spcPts val="0"/>
+                        </a:spcBef>
+                        <a:spcAft>
+                          <a:spcPts val="0"/>
+                        </a:spcAft>
+                      </a:pPr>
+                      <a:endParaRPr lang="en-US" sz="1400" b="1" u="none" dirty="0">
+                        <a:solidFill>
+                          <a:schemeClr val="tx1"/>
+                        </a:solidFill>
+                        <a:effectLst/>
+                        <a:latin typeface="Times New Roman" panose="02020603050405020304" pitchFamily="18" charset="0"/>
+                        <a:cs typeface="Times New Roman" panose="02020603050405020304" pitchFamily="18" charset="0"/>
+                      </a:endParaRPr>
+                    </a:p>
+                  </a:txBody>
+                  <a:tcPr marL="63500" marR="63500" marT="63500" marB="63500" anchor="ctr"/>
+                </a:tc>
+                <a:tc>
+                  <a:txBody>
+                    <a:bodyPr/>
+                    <a:lstStyle/>
+                    <a:p>
+                      <a:pPr algn="ctr" rtl="0" fontAlgn="ctr">
+                        <a:spcBef>
+                          <a:spcPts val="0"/>
+                        </a:spcBef>
+                        <a:spcAft>
+                          <a:spcPts val="0"/>
+                        </a:spcAft>
+                      </a:pPr>
+                      <a:endParaRPr lang="en-US" sz="1400" b="0" u="none" dirty="0">
+                        <a:solidFill>
+                          <a:schemeClr val="tx1"/>
+                        </a:solidFill>
+                        <a:effectLst/>
+                        <a:latin typeface="Times New Roman" panose="02020603050405020304" pitchFamily="18" charset="0"/>
+                        <a:cs typeface="Times New Roman" panose="02020603050405020304" pitchFamily="18" charset="0"/>
+                      </a:endParaRPr>
+                    </a:p>
+                  </a:txBody>
+                  <a:tcPr marL="63500" marR="63500" marT="63500" marB="63500" anchor="ctr"/>
+                </a:tc>
+                <a:tc>
+                  <a:txBody>
+                    <a:bodyPr/>
+                    <a:lstStyle/>
+                    <a:p>
+                      <a:pPr algn="ctr" rtl="0" fontAlgn="ctr">
+                        <a:spcBef>
+                          <a:spcPts val="0"/>
+                        </a:spcBef>
+                        <a:spcAft>
+                          <a:spcPts val="0"/>
+                        </a:spcAft>
+                      </a:pPr>
+                      <a:endParaRPr lang="en-US" sz="1400" b="0" u="none" dirty="0">
+                        <a:solidFill>
+                          <a:schemeClr val="tx1"/>
+                        </a:solidFill>
+                        <a:effectLst/>
+                        <a:latin typeface="Times New Roman" panose="02020603050405020304" pitchFamily="18" charset="0"/>
+                        <a:cs typeface="Times New Roman" panose="02020603050405020304" pitchFamily="18" charset="0"/>
+                      </a:endParaRPr>
+                    </a:p>
+                  </a:txBody>
+                  <a:tcPr marL="63500" marR="63500" marT="63500" marB="63500" anchor="ctr"/>
+                </a:tc>
+                <a:tc>
+                  <a:txBody>
+                    <a:bodyPr/>
+                    <a:lstStyle/>
+                    <a:p>
+                      <a:pPr algn="ctr" rtl="0" fontAlgn="ctr">
+                        <a:spcBef>
+                          <a:spcPts val="0"/>
+                        </a:spcBef>
+                        <a:spcAft>
+                          <a:spcPts val="0"/>
+                        </a:spcAft>
+                      </a:pPr>
+                      <a:endParaRPr lang="en-US" sz="1400" b="0" u="none" dirty="0">
+                        <a:solidFill>
+                          <a:schemeClr val="tx1"/>
+                        </a:solidFill>
+                        <a:effectLst/>
+                        <a:latin typeface="Times New Roman" panose="02020603050405020304" pitchFamily="18" charset="0"/>
+                        <a:cs typeface="Times New Roman" panose="02020603050405020304" pitchFamily="18" charset="0"/>
+                      </a:endParaRPr>
+                    </a:p>
+                  </a:txBody>
+                  <a:tcPr marL="63500" marR="63500" marT="63500" marB="63500" anchor="ctr"/>
+                </a:tc>
+                <a:tc>
+                  <a:txBody>
+                    <a:bodyPr/>
+                    <a:lstStyle/>
+                    <a:p>
+                      <a:pPr algn="ctr" rtl="0" fontAlgn="ctr">
+                        <a:spcBef>
+                          <a:spcPts val="0"/>
+                        </a:spcBef>
+                        <a:spcAft>
+                          <a:spcPts val="0"/>
+                        </a:spcAft>
+                      </a:pPr>
+                      <a:endParaRPr lang="en-US" sz="1400" b="0" u="none" dirty="0">
+                        <a:solidFill>
+                          <a:schemeClr val="tx1"/>
+                        </a:solidFill>
+                        <a:effectLst/>
+                        <a:latin typeface="Times New Roman" panose="02020603050405020304" pitchFamily="18" charset="0"/>
+                        <a:cs typeface="Times New Roman" panose="02020603050405020304" pitchFamily="18" charset="0"/>
+                      </a:endParaRPr>
+                    </a:p>
+                  </a:txBody>
+                  <a:tcPr marL="63500" marR="63500" marT="63500" marB="63500" anchor="ctr"/>
+                </a:tc>
+                <a:tc>
+                  <a:txBody>
+                    <a:bodyPr/>
+                    <a:lstStyle/>
+                    <a:p>
+                      <a:pPr algn="ctr" rtl="0" fontAlgn="ctr">
+                        <a:spcBef>
+                          <a:spcPts val="0"/>
+                        </a:spcBef>
+                        <a:spcAft>
+                          <a:spcPts val="0"/>
+                        </a:spcAft>
+                      </a:pPr>
+                      <a:endParaRPr lang="en-US" sz="1400" b="0" u="none" dirty="0">
+                        <a:solidFill>
+                          <a:schemeClr val="tx1"/>
+                        </a:solidFill>
+                        <a:effectLst/>
+                        <a:latin typeface="Times New Roman" panose="02020603050405020304" pitchFamily="18" charset="0"/>
+                        <a:cs typeface="Times New Roman" panose="02020603050405020304" pitchFamily="18" charset="0"/>
+                      </a:endParaRPr>
+                    </a:p>
+                  </a:txBody>
+                  <a:tcPr marL="63500" marR="63500" marT="63500" marB="63500" anchor="ctr"/>
+                </a:tc>
+                <a:tc>
+                  <a:txBody>
+                    <a:bodyPr/>
+                    <a:lstStyle/>
+                    <a:p>
+                      <a:pPr algn="ctr" rtl="0" fontAlgn="ctr">
+                        <a:spcBef>
+                          <a:spcPts val="0"/>
+                        </a:spcBef>
+                        <a:spcAft>
+                          <a:spcPts val="0"/>
+                        </a:spcAft>
+                      </a:pPr>
+                      <a:endParaRPr lang="en-US" sz="1400" b="0" u="none" dirty="0">
+                        <a:solidFill>
+                          <a:schemeClr val="tx1"/>
+                        </a:solidFill>
+                        <a:effectLst/>
+                        <a:latin typeface="Times New Roman" panose="02020603050405020304" pitchFamily="18" charset="0"/>
+                        <a:cs typeface="Times New Roman" panose="02020603050405020304" pitchFamily="18" charset="0"/>
+                      </a:endParaRPr>
+                    </a:p>
+                  </a:txBody>
+                  <a:tcPr marL="63500" marR="63500" marT="63500" marB="63500" anchor="ctr"/>
+                </a:tc>
+                <a:extLst>
+                  <a:ext uri="{0D108BD9-81ED-4DB2-BD59-A6C34878D82A}">
+                    <a16:rowId xmlns:a16="http://schemas.microsoft.com/office/drawing/2014/main" val="613799765"/>
+                  </a:ext>
+                </a:extLst>
+              </a:tr>
+              <a:tr h="0">
+                <a:tc>
+                  <a:txBody>
+                    <a:bodyPr/>
+                    <a:lstStyle/>
+                    <a:p>
+                      <a:pPr algn="ctr" rtl="0" fontAlgn="t">
+                        <a:spcBef>
+                          <a:spcPts val="0"/>
+                        </a:spcBef>
+                        <a:spcAft>
+                          <a:spcPts val="0"/>
+                        </a:spcAft>
+                      </a:pPr>
+                      <a:r>
+                        <a:rPr lang="en-US" sz="1400" b="0" i="0" u="none" dirty="0">
+                          <a:solidFill>
+                            <a:schemeClr val="tx1"/>
+                          </a:solidFill>
+                          <a:effectLst/>
+                          <a:latin typeface="Times New Roman" panose="02020603050405020304" pitchFamily="18" charset="0"/>
+                          <a:cs typeface="Times New Roman" panose="02020603050405020304" pitchFamily="18" charset="0"/>
+                        </a:rPr>
+                        <a:t>5</a:t>
+                      </a:r>
+                    </a:p>
+                  </a:txBody>
+                  <a:tcPr marL="63500" marR="63500" marT="63500" marB="63500" anchor="ctr"/>
+                </a:tc>
+                <a:tc>
+                  <a:txBody>
+                    <a:bodyPr/>
+                    <a:lstStyle/>
+                    <a:p>
+                      <a:pPr algn="ctr" rtl="0" fontAlgn="ctr">
+                        <a:spcBef>
+                          <a:spcPts val="0"/>
+                        </a:spcBef>
+                        <a:spcAft>
+                          <a:spcPts val="0"/>
+                        </a:spcAft>
+                      </a:pPr>
+                      <a:endParaRPr lang="en-US" sz="1400" b="0" u="none" dirty="0">
+                        <a:solidFill>
+                          <a:schemeClr val="tx1"/>
+                        </a:solidFill>
+                        <a:effectLst/>
+                        <a:latin typeface="Times New Roman" panose="02020603050405020304" pitchFamily="18" charset="0"/>
+                        <a:cs typeface="Times New Roman" panose="02020603050405020304" pitchFamily="18" charset="0"/>
+                      </a:endParaRPr>
+                    </a:p>
+                  </a:txBody>
+                  <a:tcPr marL="63500" marR="63500" marT="63500" marB="63500" anchor="ctr"/>
+                </a:tc>
+                <a:tc>
+                  <a:txBody>
+                    <a:bodyPr/>
+                    <a:lstStyle/>
+                    <a:p>
+                      <a:pPr algn="ctr" rtl="0" fontAlgn="ctr">
+                        <a:spcBef>
+                          <a:spcPts val="0"/>
+                        </a:spcBef>
+                        <a:spcAft>
+                          <a:spcPts val="0"/>
+                        </a:spcAft>
+                      </a:pPr>
+                      <a:endParaRPr lang="en-US" sz="1400" b="1" u="none" dirty="0">
+                        <a:solidFill>
+                          <a:schemeClr val="tx1"/>
+                        </a:solidFill>
+                        <a:effectLst/>
+                        <a:latin typeface="Times New Roman" panose="02020603050405020304" pitchFamily="18" charset="0"/>
+                        <a:cs typeface="Times New Roman" panose="02020603050405020304" pitchFamily="18" charset="0"/>
+                      </a:endParaRPr>
+                    </a:p>
+                  </a:txBody>
+                  <a:tcPr marL="63500" marR="63500" marT="63500" marB="63500" anchor="ctr"/>
+                </a:tc>
+                <a:tc>
+                  <a:txBody>
+                    <a:bodyPr/>
+                    <a:lstStyle/>
+                    <a:p>
+                      <a:pPr algn="ctr" rtl="0" fontAlgn="ctr">
+                        <a:spcBef>
+                          <a:spcPts val="0"/>
+                        </a:spcBef>
+                        <a:spcAft>
+                          <a:spcPts val="0"/>
+                        </a:spcAft>
+                      </a:pPr>
+                      <a:endParaRPr lang="en-US" sz="1400" b="0" u="none" dirty="0">
+                        <a:solidFill>
+                          <a:schemeClr val="tx1"/>
+                        </a:solidFill>
+                        <a:effectLst/>
+                        <a:latin typeface="Times New Roman" panose="02020603050405020304" pitchFamily="18" charset="0"/>
+                        <a:cs typeface="Times New Roman" panose="02020603050405020304" pitchFamily="18" charset="0"/>
+                      </a:endParaRPr>
+                    </a:p>
+                  </a:txBody>
+                  <a:tcPr marL="63500" marR="63500" marT="63500" marB="63500" anchor="ctr"/>
+                </a:tc>
+                <a:tc>
+                  <a:txBody>
+                    <a:bodyPr/>
+                    <a:lstStyle/>
+                    <a:p>
+                      <a:pPr algn="ctr" rtl="0" fontAlgn="ctr">
+                        <a:spcBef>
+                          <a:spcPts val="0"/>
+                        </a:spcBef>
+                        <a:spcAft>
+                          <a:spcPts val="0"/>
+                        </a:spcAft>
+                      </a:pPr>
+                      <a:endParaRPr lang="en-US" sz="1400" b="0" u="none" dirty="0">
+                        <a:solidFill>
+                          <a:schemeClr val="tx1"/>
+                        </a:solidFill>
+                        <a:effectLst/>
+                        <a:latin typeface="Times New Roman" panose="02020603050405020304" pitchFamily="18" charset="0"/>
+                        <a:cs typeface="Times New Roman" panose="02020603050405020304" pitchFamily="18" charset="0"/>
+                      </a:endParaRPr>
+                    </a:p>
+                  </a:txBody>
+                  <a:tcPr marL="63500" marR="63500" marT="63500" marB="63500" anchor="ctr"/>
+                </a:tc>
+                <a:tc>
+                  <a:txBody>
+                    <a:bodyPr/>
+                    <a:lstStyle/>
+                    <a:p>
+                      <a:pPr algn="ctr" rtl="0" fontAlgn="ctr">
+                        <a:spcBef>
+                          <a:spcPts val="0"/>
+                        </a:spcBef>
+                        <a:spcAft>
+                          <a:spcPts val="0"/>
+                        </a:spcAft>
+                      </a:pPr>
+                      <a:endParaRPr lang="en-US" sz="1400" b="0" u="none" dirty="0">
+                        <a:solidFill>
+                          <a:schemeClr val="tx1"/>
+                        </a:solidFill>
+                        <a:effectLst/>
+                        <a:latin typeface="Times New Roman" panose="02020603050405020304" pitchFamily="18" charset="0"/>
+                        <a:cs typeface="Times New Roman" panose="02020603050405020304" pitchFamily="18" charset="0"/>
+                      </a:endParaRPr>
+                    </a:p>
+                  </a:txBody>
+                  <a:tcPr marL="63500" marR="63500" marT="63500" marB="63500" anchor="ctr"/>
+                </a:tc>
+                <a:tc>
+                  <a:txBody>
+                    <a:bodyPr/>
+                    <a:lstStyle/>
+                    <a:p>
+                      <a:pPr algn="ctr" rtl="0" fontAlgn="ctr">
+                        <a:spcBef>
+                          <a:spcPts val="0"/>
+                        </a:spcBef>
+                        <a:spcAft>
+                          <a:spcPts val="0"/>
+                        </a:spcAft>
+                      </a:pPr>
+                      <a:endParaRPr lang="en-US" sz="1400" b="0" u="none" dirty="0">
+                        <a:solidFill>
+                          <a:schemeClr val="tx1"/>
+                        </a:solidFill>
+                        <a:effectLst/>
+                        <a:latin typeface="Times New Roman" panose="02020603050405020304" pitchFamily="18" charset="0"/>
+                        <a:cs typeface="Times New Roman" panose="02020603050405020304" pitchFamily="18" charset="0"/>
+                      </a:endParaRPr>
+                    </a:p>
+                  </a:txBody>
+                  <a:tcPr marL="63500" marR="63500" marT="63500" marB="63500" anchor="ctr"/>
+                </a:tc>
+                <a:tc>
+                  <a:txBody>
+                    <a:bodyPr/>
+                    <a:lstStyle/>
+                    <a:p>
+                      <a:pPr algn="ctr" rtl="0" fontAlgn="ctr">
+                        <a:spcBef>
+                          <a:spcPts val="0"/>
+                        </a:spcBef>
+                        <a:spcAft>
+                          <a:spcPts val="0"/>
+                        </a:spcAft>
+                      </a:pPr>
+                      <a:endParaRPr lang="en-US" sz="1400" b="0" u="none" dirty="0">
+                        <a:solidFill>
+                          <a:schemeClr val="tx1"/>
+                        </a:solidFill>
+                        <a:effectLst/>
+                        <a:latin typeface="Times New Roman" panose="02020603050405020304" pitchFamily="18" charset="0"/>
+                        <a:cs typeface="Times New Roman" panose="02020603050405020304" pitchFamily="18" charset="0"/>
+                      </a:endParaRPr>
+                    </a:p>
+                  </a:txBody>
+                  <a:tcPr marL="63500" marR="63500" marT="63500" marB="63500" anchor="ctr"/>
+                </a:tc>
+                <a:tc>
+                  <a:txBody>
+                    <a:bodyPr/>
+                    <a:lstStyle/>
+                    <a:p>
+                      <a:pPr algn="ctr" rtl="0" fontAlgn="ctr">
+                        <a:spcBef>
+                          <a:spcPts val="0"/>
+                        </a:spcBef>
+                        <a:spcAft>
+                          <a:spcPts val="0"/>
+                        </a:spcAft>
+                      </a:pPr>
+                      <a:endParaRPr lang="en-US" sz="1400" b="0" u="none" dirty="0">
+                        <a:solidFill>
+                          <a:schemeClr val="tx1"/>
+                        </a:solidFill>
+                        <a:effectLst/>
+                        <a:latin typeface="Times New Roman" panose="02020603050405020304" pitchFamily="18" charset="0"/>
+                        <a:cs typeface="Times New Roman" panose="02020603050405020304" pitchFamily="18" charset="0"/>
+                      </a:endParaRPr>
+                    </a:p>
+                  </a:txBody>
+                  <a:tcPr marL="63500" marR="63500" marT="63500" marB="63500" anchor="ctr"/>
+                </a:tc>
+                <a:extLst>
+                  <a:ext uri="{0D108BD9-81ED-4DB2-BD59-A6C34878D82A}">
+                    <a16:rowId xmlns:a16="http://schemas.microsoft.com/office/drawing/2014/main" val="2940504507"/>
+                  </a:ext>
+                </a:extLst>
+              </a:tr>
+              <a:tr h="317209">
+                <a:tc>
+                  <a:txBody>
+                    <a:bodyPr/>
+                    <a:lstStyle/>
+                    <a:p>
+                      <a:pPr algn="ctr" rtl="0" fontAlgn="t">
+                        <a:spcBef>
+                          <a:spcPts val="0"/>
+                        </a:spcBef>
+                        <a:spcAft>
+                          <a:spcPts val="0"/>
+                        </a:spcAft>
+                      </a:pPr>
+                      <a:r>
+                        <a:rPr lang="en-US" sz="1400" b="0" i="0" u="none" dirty="0">
+                          <a:solidFill>
+                            <a:schemeClr val="tx1"/>
+                          </a:solidFill>
+                          <a:effectLst/>
+                          <a:latin typeface="Times New Roman" panose="02020603050405020304" pitchFamily="18" charset="0"/>
+                          <a:cs typeface="Times New Roman" panose="02020603050405020304" pitchFamily="18" charset="0"/>
+                        </a:rPr>
+                        <a:t>6</a:t>
+                      </a:r>
+                    </a:p>
+                  </a:txBody>
+                  <a:tcPr marL="63500" marR="63500" marT="63500" marB="63500" anchor="ctr"/>
+                </a:tc>
+                <a:tc>
+                  <a:txBody>
+                    <a:bodyPr/>
+                    <a:lstStyle/>
+                    <a:p>
+                      <a:pPr algn="ctr" rtl="0" fontAlgn="ctr">
+                        <a:spcBef>
+                          <a:spcPts val="0"/>
+                        </a:spcBef>
+                        <a:spcAft>
+                          <a:spcPts val="0"/>
+                        </a:spcAft>
+                      </a:pPr>
+                      <a:endParaRPr lang="en-US" sz="1400" b="0" u="none" dirty="0">
+                        <a:solidFill>
+                          <a:schemeClr val="tx1"/>
+                        </a:solidFill>
+                        <a:effectLst/>
+                        <a:latin typeface="Times New Roman" panose="02020603050405020304" pitchFamily="18" charset="0"/>
+                        <a:cs typeface="Times New Roman" panose="02020603050405020304" pitchFamily="18" charset="0"/>
+                      </a:endParaRPr>
+                    </a:p>
+                  </a:txBody>
+                  <a:tcPr marL="63500" marR="63500" marT="63500" marB="63500" anchor="ctr"/>
+                </a:tc>
+                <a:tc>
+                  <a:txBody>
+                    <a:bodyPr/>
+                    <a:lstStyle/>
+                    <a:p>
+                      <a:pPr algn="ctr" rtl="0" fontAlgn="ctr">
+                        <a:spcBef>
+                          <a:spcPts val="0"/>
+                        </a:spcBef>
+                        <a:spcAft>
+                          <a:spcPts val="0"/>
+                        </a:spcAft>
+                      </a:pPr>
+                      <a:endParaRPr lang="en-US" sz="1400" b="1" u="none" dirty="0">
+                        <a:solidFill>
+                          <a:schemeClr val="tx1"/>
+                        </a:solidFill>
+                        <a:effectLst/>
+                        <a:latin typeface="Times New Roman" panose="02020603050405020304" pitchFamily="18" charset="0"/>
+                        <a:cs typeface="Times New Roman" panose="02020603050405020304" pitchFamily="18" charset="0"/>
+                      </a:endParaRPr>
+                    </a:p>
+                  </a:txBody>
+                  <a:tcPr marL="63500" marR="63500" marT="63500" marB="63500" anchor="ctr"/>
+                </a:tc>
+                <a:tc>
+                  <a:txBody>
+                    <a:bodyPr/>
+                    <a:lstStyle/>
+                    <a:p>
+                      <a:pPr algn="ctr" rtl="0" fontAlgn="ctr">
+                        <a:spcBef>
+                          <a:spcPts val="0"/>
+                        </a:spcBef>
+                        <a:spcAft>
+                          <a:spcPts val="0"/>
+                        </a:spcAft>
+                      </a:pPr>
+                      <a:endParaRPr lang="en-US" sz="1400" b="0" u="none" dirty="0">
+                        <a:solidFill>
+                          <a:schemeClr val="tx1"/>
+                        </a:solidFill>
+                        <a:effectLst/>
+                        <a:latin typeface="Times New Roman" panose="02020603050405020304" pitchFamily="18" charset="0"/>
+                        <a:cs typeface="Times New Roman" panose="02020603050405020304" pitchFamily="18" charset="0"/>
+                      </a:endParaRPr>
+                    </a:p>
+                  </a:txBody>
+                  <a:tcPr marL="63500" marR="63500" marT="63500" marB="63500" anchor="ctr"/>
+                </a:tc>
+                <a:tc>
+                  <a:txBody>
+                    <a:bodyPr/>
+                    <a:lstStyle/>
+                    <a:p>
+                      <a:pPr algn="ctr" rtl="0" fontAlgn="ctr">
+                        <a:spcBef>
+                          <a:spcPts val="0"/>
+                        </a:spcBef>
+                        <a:spcAft>
+                          <a:spcPts val="0"/>
+                        </a:spcAft>
+                      </a:pPr>
+                      <a:endParaRPr lang="en-US" sz="1400" b="0" u="none" dirty="0">
+                        <a:solidFill>
+                          <a:schemeClr val="tx1"/>
+                        </a:solidFill>
+                        <a:effectLst/>
+                        <a:latin typeface="Times New Roman" panose="02020603050405020304" pitchFamily="18" charset="0"/>
+                        <a:cs typeface="Times New Roman" panose="02020603050405020304" pitchFamily="18" charset="0"/>
+                      </a:endParaRPr>
+                    </a:p>
+                  </a:txBody>
+                  <a:tcPr marL="63500" marR="63500" marT="63500" marB="63500" anchor="ctr"/>
+                </a:tc>
+                <a:tc>
+                  <a:txBody>
+                    <a:bodyPr/>
+                    <a:lstStyle/>
+                    <a:p>
+                      <a:pPr algn="ctr" rtl="0" fontAlgn="ctr">
+                        <a:spcBef>
+                          <a:spcPts val="0"/>
+                        </a:spcBef>
+                        <a:spcAft>
+                          <a:spcPts val="0"/>
+                        </a:spcAft>
+                      </a:pPr>
+                      <a:endParaRPr lang="en-US" sz="1400" b="0" u="none" dirty="0">
+                        <a:solidFill>
+                          <a:schemeClr val="tx1"/>
+                        </a:solidFill>
+                        <a:effectLst/>
+                        <a:latin typeface="Times New Roman" panose="02020603050405020304" pitchFamily="18" charset="0"/>
+                        <a:cs typeface="Times New Roman" panose="02020603050405020304" pitchFamily="18" charset="0"/>
+                      </a:endParaRPr>
+                    </a:p>
+                  </a:txBody>
+                  <a:tcPr marL="63500" marR="63500" marT="63500" marB="63500" anchor="ctr"/>
+                </a:tc>
+                <a:tc>
+                  <a:txBody>
+                    <a:bodyPr/>
+                    <a:lstStyle/>
+                    <a:p>
+                      <a:pPr algn="ctr" rtl="0" fontAlgn="ctr">
+                        <a:spcBef>
+                          <a:spcPts val="0"/>
+                        </a:spcBef>
+                        <a:spcAft>
+                          <a:spcPts val="0"/>
+                        </a:spcAft>
+                      </a:pPr>
+                      <a:endParaRPr lang="en-US" sz="1400" b="0" u="none" dirty="0">
+                        <a:solidFill>
+                          <a:schemeClr val="tx1"/>
+                        </a:solidFill>
+                        <a:effectLst/>
+                        <a:latin typeface="Times New Roman" panose="02020603050405020304" pitchFamily="18" charset="0"/>
+                        <a:cs typeface="Times New Roman" panose="02020603050405020304" pitchFamily="18" charset="0"/>
+                      </a:endParaRPr>
+                    </a:p>
+                  </a:txBody>
+                  <a:tcPr marL="63500" marR="63500" marT="63500" marB="63500" anchor="ctr"/>
+                </a:tc>
+                <a:tc>
+                  <a:txBody>
+                    <a:bodyPr/>
+                    <a:lstStyle/>
+                    <a:p>
+                      <a:pPr algn="ctr" rtl="0" fontAlgn="ctr">
+                        <a:spcBef>
+                          <a:spcPts val="0"/>
+                        </a:spcBef>
+                        <a:spcAft>
+                          <a:spcPts val="0"/>
+                        </a:spcAft>
+                      </a:pPr>
+                      <a:endParaRPr lang="en-US" sz="1400" b="0" u="none" dirty="0">
+                        <a:solidFill>
+                          <a:schemeClr val="tx1"/>
+                        </a:solidFill>
+                        <a:effectLst/>
+                        <a:latin typeface="Times New Roman" panose="02020603050405020304" pitchFamily="18" charset="0"/>
+                        <a:cs typeface="Times New Roman" panose="02020603050405020304" pitchFamily="18" charset="0"/>
+                      </a:endParaRPr>
+                    </a:p>
+                  </a:txBody>
+                  <a:tcPr marL="63500" marR="63500" marT="63500" marB="63500" anchor="ctr"/>
+                </a:tc>
+                <a:tc>
+                  <a:txBody>
+                    <a:bodyPr/>
+                    <a:lstStyle/>
+                    <a:p>
+                      <a:pPr algn="ctr" rtl="0" fontAlgn="ctr">
+                        <a:spcBef>
+                          <a:spcPts val="0"/>
+                        </a:spcBef>
+                        <a:spcAft>
+                          <a:spcPts val="0"/>
+                        </a:spcAft>
+                      </a:pPr>
+                      <a:endParaRPr lang="en-US" sz="1400" b="0" u="none" dirty="0">
+                        <a:solidFill>
+                          <a:schemeClr val="tx1"/>
+                        </a:solidFill>
+                        <a:effectLst/>
+                        <a:latin typeface="Times New Roman" panose="02020603050405020304" pitchFamily="18" charset="0"/>
+                        <a:cs typeface="Times New Roman" panose="02020603050405020304" pitchFamily="18" charset="0"/>
+                      </a:endParaRPr>
+                    </a:p>
+                  </a:txBody>
+                  <a:tcPr marL="63500" marR="63500" marT="63500" marB="63500" anchor="ctr"/>
+                </a:tc>
+                <a:extLst>
+                  <a:ext uri="{0D108BD9-81ED-4DB2-BD59-A6C34878D82A}">
+                    <a16:rowId xmlns:a16="http://schemas.microsoft.com/office/drawing/2014/main" val="3411659199"/>
+                  </a:ext>
+                </a:extLst>
+              </a:tr>
+              <a:tr h="317209">
+                <a:tc>
+                  <a:txBody>
+                    <a:bodyPr/>
+                    <a:lstStyle/>
+                    <a:p>
+                      <a:pPr algn="ctr" rtl="0" fontAlgn="t">
+                        <a:spcBef>
+                          <a:spcPts val="0"/>
+                        </a:spcBef>
+                        <a:spcAft>
+                          <a:spcPts val="0"/>
+                        </a:spcAft>
+                      </a:pPr>
+                      <a:r>
+                        <a:rPr lang="en-US" sz="1400" b="0" i="0" u="none" dirty="0">
+                          <a:solidFill>
+                            <a:schemeClr val="tx1"/>
+                          </a:solidFill>
+                          <a:effectLst/>
+                          <a:latin typeface="Times New Roman" panose="02020603050405020304" pitchFamily="18" charset="0"/>
+                          <a:cs typeface="Times New Roman" panose="02020603050405020304" pitchFamily="18" charset="0"/>
+                        </a:rPr>
+                        <a:t>7</a:t>
+                      </a:r>
+                    </a:p>
+                  </a:txBody>
+                  <a:tcPr marL="63500" marR="63500" marT="63500" marB="63500" anchor="ctr"/>
+                </a:tc>
+                <a:tc>
+                  <a:txBody>
+                    <a:bodyPr/>
+                    <a:lstStyle/>
+                    <a:p>
+                      <a:pPr algn="ctr" rtl="0" fontAlgn="ctr">
+                        <a:spcBef>
+                          <a:spcPts val="0"/>
+                        </a:spcBef>
+                        <a:spcAft>
+                          <a:spcPts val="0"/>
+                        </a:spcAft>
+                      </a:pPr>
+                      <a:endParaRPr lang="en-US" sz="1400" b="0" u="none" dirty="0">
+                        <a:solidFill>
+                          <a:schemeClr val="tx1"/>
+                        </a:solidFill>
+                        <a:effectLst/>
+                        <a:latin typeface="Times New Roman" panose="02020603050405020304" pitchFamily="18" charset="0"/>
+                        <a:cs typeface="Times New Roman" panose="02020603050405020304" pitchFamily="18" charset="0"/>
+                      </a:endParaRPr>
+                    </a:p>
+                  </a:txBody>
+                  <a:tcPr marL="63500" marR="63500" marT="63500" marB="63500" anchor="ctr"/>
+                </a:tc>
+                <a:tc>
+                  <a:txBody>
+                    <a:bodyPr/>
+                    <a:lstStyle/>
+                    <a:p>
+                      <a:pPr algn="ctr" rtl="0" fontAlgn="ctr">
+                        <a:spcBef>
+                          <a:spcPts val="0"/>
+                        </a:spcBef>
+                        <a:spcAft>
+                          <a:spcPts val="0"/>
+                        </a:spcAft>
+                      </a:pPr>
+                      <a:endParaRPr lang="en-US" sz="1400" b="1" u="none" dirty="0">
+                        <a:solidFill>
+                          <a:schemeClr val="tx1"/>
+                        </a:solidFill>
+                        <a:effectLst/>
+                        <a:latin typeface="Times New Roman" panose="02020603050405020304" pitchFamily="18" charset="0"/>
+                        <a:cs typeface="Times New Roman" panose="02020603050405020304" pitchFamily="18" charset="0"/>
+                      </a:endParaRPr>
+                    </a:p>
+                  </a:txBody>
+                  <a:tcPr marL="63500" marR="63500" marT="63500" marB="63500" anchor="ctr"/>
+                </a:tc>
+                <a:tc>
+                  <a:txBody>
+                    <a:bodyPr/>
+                    <a:lstStyle/>
+                    <a:p>
+                      <a:pPr algn="ctr" rtl="0" fontAlgn="ctr">
+                        <a:spcBef>
+                          <a:spcPts val="0"/>
+                        </a:spcBef>
+                        <a:spcAft>
+                          <a:spcPts val="0"/>
+                        </a:spcAft>
+                      </a:pPr>
+                      <a:endParaRPr lang="en-US" sz="1400" b="0" u="none" dirty="0">
+                        <a:solidFill>
+                          <a:schemeClr val="tx1"/>
+                        </a:solidFill>
+                        <a:effectLst/>
+                        <a:latin typeface="Times New Roman" panose="02020603050405020304" pitchFamily="18" charset="0"/>
+                        <a:cs typeface="Times New Roman" panose="02020603050405020304" pitchFamily="18" charset="0"/>
+                      </a:endParaRPr>
+                    </a:p>
+                  </a:txBody>
+                  <a:tcPr marL="63500" marR="63500" marT="63500" marB="63500" anchor="ctr"/>
+                </a:tc>
+                <a:tc>
+                  <a:txBody>
+                    <a:bodyPr/>
+                    <a:lstStyle/>
+                    <a:p>
+                      <a:pPr algn="ctr" rtl="0" fontAlgn="ctr">
+                        <a:spcBef>
+                          <a:spcPts val="0"/>
+                        </a:spcBef>
+                        <a:spcAft>
+                          <a:spcPts val="0"/>
+                        </a:spcAft>
+                      </a:pPr>
+                      <a:endParaRPr lang="en-US" sz="1400" b="0" u="none" dirty="0">
+                        <a:solidFill>
+                          <a:schemeClr val="tx1"/>
+                        </a:solidFill>
+                        <a:effectLst/>
+                        <a:latin typeface="Times New Roman" panose="02020603050405020304" pitchFamily="18" charset="0"/>
+                        <a:cs typeface="Times New Roman" panose="02020603050405020304" pitchFamily="18" charset="0"/>
+                      </a:endParaRPr>
+                    </a:p>
+                  </a:txBody>
+                  <a:tcPr marL="63500" marR="63500" marT="63500" marB="63500" anchor="ctr"/>
+                </a:tc>
+                <a:tc>
+                  <a:txBody>
+                    <a:bodyPr/>
+                    <a:lstStyle/>
+                    <a:p>
+                      <a:pPr algn="ctr" rtl="0" fontAlgn="ctr">
+                        <a:spcBef>
+                          <a:spcPts val="0"/>
+                        </a:spcBef>
+                        <a:spcAft>
+                          <a:spcPts val="0"/>
+                        </a:spcAft>
+                      </a:pPr>
+                      <a:endParaRPr lang="en-US" sz="1400" b="0" u="none" dirty="0">
+                        <a:solidFill>
+                          <a:schemeClr val="tx1"/>
+                        </a:solidFill>
+                        <a:effectLst/>
+                        <a:latin typeface="Times New Roman" panose="02020603050405020304" pitchFamily="18" charset="0"/>
+                        <a:cs typeface="Times New Roman" panose="02020603050405020304" pitchFamily="18" charset="0"/>
+                      </a:endParaRPr>
+                    </a:p>
+                  </a:txBody>
+                  <a:tcPr marL="63500" marR="63500" marT="63500" marB="63500" anchor="ctr"/>
+                </a:tc>
+                <a:tc>
+                  <a:txBody>
+                    <a:bodyPr/>
+                    <a:lstStyle/>
+                    <a:p>
+                      <a:pPr algn="ctr" rtl="0" fontAlgn="ctr">
+                        <a:spcBef>
+                          <a:spcPts val="0"/>
+                        </a:spcBef>
+                        <a:spcAft>
+                          <a:spcPts val="0"/>
+                        </a:spcAft>
+                      </a:pPr>
+                      <a:endParaRPr lang="en-US" sz="1400" b="0" u="none" dirty="0">
+                        <a:solidFill>
+                          <a:schemeClr val="tx1"/>
+                        </a:solidFill>
+                        <a:effectLst/>
+                        <a:latin typeface="Times New Roman" panose="02020603050405020304" pitchFamily="18" charset="0"/>
+                        <a:cs typeface="Times New Roman" panose="02020603050405020304" pitchFamily="18" charset="0"/>
+                      </a:endParaRPr>
+                    </a:p>
+                  </a:txBody>
+                  <a:tcPr marL="63500" marR="63500" marT="63500" marB="63500" anchor="ctr"/>
+                </a:tc>
+                <a:tc>
+                  <a:txBody>
+                    <a:bodyPr/>
+                    <a:lstStyle/>
+                    <a:p>
+                      <a:pPr algn="ctr" rtl="0" fontAlgn="ctr">
+                        <a:spcBef>
+                          <a:spcPts val="0"/>
+                        </a:spcBef>
+                        <a:spcAft>
+                          <a:spcPts val="0"/>
+                        </a:spcAft>
+                      </a:pPr>
+                      <a:endParaRPr lang="en-US" sz="1400" b="0" u="none" dirty="0">
+                        <a:solidFill>
+                          <a:schemeClr val="tx1"/>
+                        </a:solidFill>
+                        <a:effectLst/>
+                        <a:latin typeface="Times New Roman" panose="02020603050405020304" pitchFamily="18" charset="0"/>
+                        <a:cs typeface="Times New Roman" panose="02020603050405020304" pitchFamily="18" charset="0"/>
+                      </a:endParaRPr>
+                    </a:p>
+                  </a:txBody>
+                  <a:tcPr marL="63500" marR="63500" marT="63500" marB="63500" anchor="ctr"/>
+                </a:tc>
+                <a:tc>
+                  <a:txBody>
+                    <a:bodyPr/>
+                    <a:lstStyle/>
+                    <a:p>
+                      <a:pPr algn="ctr" rtl="0" fontAlgn="ctr">
+                        <a:spcBef>
+                          <a:spcPts val="0"/>
+                        </a:spcBef>
+                        <a:spcAft>
+                          <a:spcPts val="0"/>
+                        </a:spcAft>
+                      </a:pPr>
+                      <a:endParaRPr lang="en-US" sz="1400" b="0" u="none" dirty="0">
+                        <a:solidFill>
+                          <a:schemeClr val="tx1"/>
+                        </a:solidFill>
+                        <a:effectLst/>
+                        <a:latin typeface="Times New Roman" panose="02020603050405020304" pitchFamily="18" charset="0"/>
+                        <a:cs typeface="Times New Roman" panose="02020603050405020304" pitchFamily="18" charset="0"/>
+                      </a:endParaRPr>
+                    </a:p>
+                  </a:txBody>
+                  <a:tcPr marL="63500" marR="63500" marT="63500" marB="63500" anchor="ctr"/>
+                </a:tc>
+                <a:extLst>
+                  <a:ext uri="{0D108BD9-81ED-4DB2-BD59-A6C34878D82A}">
+                    <a16:rowId xmlns:a16="http://schemas.microsoft.com/office/drawing/2014/main" val="2685245124"/>
+                  </a:ext>
+                </a:extLst>
+              </a:tr>
+              <a:tr h="317209">
+                <a:tc>
+                  <a:txBody>
+                    <a:bodyPr/>
+                    <a:lstStyle/>
+                    <a:p>
+                      <a:pPr algn="ctr" rtl="0" fontAlgn="t">
+                        <a:spcBef>
+                          <a:spcPts val="0"/>
+                        </a:spcBef>
+                        <a:spcAft>
+                          <a:spcPts val="0"/>
+                        </a:spcAft>
+                      </a:pPr>
+                      <a:r>
+                        <a:rPr lang="en-US" sz="1400" b="0" i="0" u="none" dirty="0">
+                          <a:solidFill>
+                            <a:schemeClr val="tx1"/>
+                          </a:solidFill>
+                          <a:effectLst/>
+                          <a:latin typeface="Times New Roman" panose="02020603050405020304" pitchFamily="18" charset="0"/>
+                          <a:cs typeface="Times New Roman" panose="02020603050405020304" pitchFamily="18" charset="0"/>
+                        </a:rPr>
+                        <a:t>8</a:t>
+                      </a:r>
+                    </a:p>
+                  </a:txBody>
+                  <a:tcPr marL="63500" marR="63500" marT="63500" marB="63500" anchor="ctr"/>
+                </a:tc>
+                <a:tc>
+                  <a:txBody>
+                    <a:bodyPr/>
+                    <a:lstStyle/>
+                    <a:p>
+                      <a:pPr algn="ctr" rtl="0" fontAlgn="ctr">
+                        <a:spcBef>
+                          <a:spcPts val="0"/>
+                        </a:spcBef>
+                        <a:spcAft>
+                          <a:spcPts val="0"/>
+                        </a:spcAft>
+                      </a:pPr>
+                      <a:endParaRPr lang="en-US" sz="1400" b="0" u="none" dirty="0">
+                        <a:solidFill>
+                          <a:schemeClr val="tx1"/>
+                        </a:solidFill>
+                        <a:effectLst/>
+                        <a:latin typeface="Times New Roman" panose="02020603050405020304" pitchFamily="18" charset="0"/>
+                        <a:cs typeface="Times New Roman" panose="02020603050405020304" pitchFamily="18" charset="0"/>
+                      </a:endParaRPr>
+                    </a:p>
+                  </a:txBody>
+                  <a:tcPr marL="63500" marR="63500" marT="63500" marB="63500" anchor="ctr"/>
+                </a:tc>
+                <a:tc>
+                  <a:txBody>
+                    <a:bodyPr/>
+                    <a:lstStyle/>
+                    <a:p>
+                      <a:pPr algn="ctr" rtl="0" fontAlgn="ctr">
+                        <a:spcBef>
+                          <a:spcPts val="0"/>
+                        </a:spcBef>
+                        <a:spcAft>
+                          <a:spcPts val="0"/>
+                        </a:spcAft>
+                      </a:pPr>
+                      <a:endParaRPr lang="en-US" sz="1400" b="1" u="none" dirty="0">
+                        <a:solidFill>
+                          <a:schemeClr val="tx1"/>
+                        </a:solidFill>
+                        <a:effectLst/>
+                        <a:latin typeface="Times New Roman" panose="02020603050405020304" pitchFamily="18" charset="0"/>
+                        <a:cs typeface="Times New Roman" panose="02020603050405020304" pitchFamily="18" charset="0"/>
+                      </a:endParaRPr>
+                    </a:p>
+                  </a:txBody>
+                  <a:tcPr marL="63500" marR="63500" marT="63500" marB="63500" anchor="ctr"/>
+                </a:tc>
+                <a:tc>
+                  <a:txBody>
+                    <a:bodyPr/>
+                    <a:lstStyle/>
+                    <a:p>
+                      <a:pPr algn="ctr" rtl="0" fontAlgn="ctr">
+                        <a:spcBef>
+                          <a:spcPts val="0"/>
+                        </a:spcBef>
+                        <a:spcAft>
+                          <a:spcPts val="0"/>
+                        </a:spcAft>
+                      </a:pPr>
+                      <a:endParaRPr lang="en-US" sz="1400" b="0" u="none" dirty="0">
+                        <a:solidFill>
+                          <a:schemeClr val="tx1"/>
+                        </a:solidFill>
+                        <a:effectLst/>
+                        <a:latin typeface="Times New Roman" panose="02020603050405020304" pitchFamily="18" charset="0"/>
+                        <a:cs typeface="Times New Roman" panose="02020603050405020304" pitchFamily="18" charset="0"/>
+                      </a:endParaRPr>
+                    </a:p>
+                  </a:txBody>
+                  <a:tcPr marL="63500" marR="63500" marT="63500" marB="63500" anchor="ctr"/>
+                </a:tc>
+                <a:tc>
+                  <a:txBody>
+                    <a:bodyPr/>
+                    <a:lstStyle/>
+                    <a:p>
+                      <a:pPr algn="ctr" rtl="0" fontAlgn="ctr">
+                        <a:spcBef>
+                          <a:spcPts val="0"/>
+                        </a:spcBef>
+                        <a:spcAft>
+                          <a:spcPts val="0"/>
+                        </a:spcAft>
+                      </a:pPr>
+                      <a:endParaRPr lang="en-US" sz="1400" b="0" u="none" dirty="0">
+                        <a:solidFill>
+                          <a:schemeClr val="tx1"/>
+                        </a:solidFill>
+                        <a:effectLst/>
+                        <a:latin typeface="Times New Roman" panose="02020603050405020304" pitchFamily="18" charset="0"/>
+                        <a:cs typeface="Times New Roman" panose="02020603050405020304" pitchFamily="18" charset="0"/>
+                      </a:endParaRPr>
+                    </a:p>
+                  </a:txBody>
+                  <a:tcPr marL="63500" marR="63500" marT="63500" marB="63500" anchor="ctr"/>
+                </a:tc>
+                <a:tc>
+                  <a:txBody>
+                    <a:bodyPr/>
+                    <a:lstStyle/>
+                    <a:p>
+                      <a:pPr algn="ctr" rtl="0" fontAlgn="ctr">
+                        <a:spcBef>
+                          <a:spcPts val="0"/>
+                        </a:spcBef>
+                        <a:spcAft>
+                          <a:spcPts val="0"/>
+                        </a:spcAft>
+                      </a:pPr>
+                      <a:endParaRPr lang="en-US" sz="1400" b="0" u="none" dirty="0">
+                        <a:solidFill>
+                          <a:schemeClr val="tx1"/>
+                        </a:solidFill>
+                        <a:effectLst/>
+                        <a:latin typeface="Times New Roman" panose="02020603050405020304" pitchFamily="18" charset="0"/>
+                        <a:cs typeface="Times New Roman" panose="02020603050405020304" pitchFamily="18" charset="0"/>
+                      </a:endParaRPr>
+                    </a:p>
+                  </a:txBody>
+                  <a:tcPr marL="63500" marR="63500" marT="63500" marB="63500" anchor="ctr"/>
+                </a:tc>
+                <a:tc>
+                  <a:txBody>
+                    <a:bodyPr/>
+                    <a:lstStyle/>
+                    <a:p>
+                      <a:pPr algn="ctr" rtl="0" fontAlgn="ctr">
+                        <a:spcBef>
+                          <a:spcPts val="0"/>
+                        </a:spcBef>
+                        <a:spcAft>
+                          <a:spcPts val="0"/>
+                        </a:spcAft>
+                      </a:pPr>
+                      <a:endParaRPr lang="en-US" sz="1400" b="0" u="none" dirty="0">
+                        <a:solidFill>
+                          <a:schemeClr val="tx1"/>
+                        </a:solidFill>
+                        <a:effectLst/>
+                        <a:latin typeface="Times New Roman" panose="02020603050405020304" pitchFamily="18" charset="0"/>
+                        <a:cs typeface="Times New Roman" panose="02020603050405020304" pitchFamily="18" charset="0"/>
+                      </a:endParaRPr>
+                    </a:p>
+                  </a:txBody>
+                  <a:tcPr marL="63500" marR="63500" marT="63500" marB="63500" anchor="ctr"/>
+                </a:tc>
+                <a:tc>
+                  <a:txBody>
+                    <a:bodyPr/>
+                    <a:lstStyle/>
+                    <a:p>
+                      <a:pPr algn="ctr" rtl="0" fontAlgn="ctr">
+                        <a:spcBef>
+                          <a:spcPts val="0"/>
+                        </a:spcBef>
+                        <a:spcAft>
+                          <a:spcPts val="0"/>
+                        </a:spcAft>
+                      </a:pPr>
+                      <a:endParaRPr lang="en-US" sz="1400" b="0" u="none" dirty="0">
+                        <a:solidFill>
+                          <a:schemeClr val="tx1"/>
+                        </a:solidFill>
+                        <a:effectLst/>
+                        <a:latin typeface="Times New Roman" panose="02020603050405020304" pitchFamily="18" charset="0"/>
+                        <a:cs typeface="Times New Roman" panose="02020603050405020304" pitchFamily="18" charset="0"/>
+                      </a:endParaRPr>
+                    </a:p>
+                  </a:txBody>
+                  <a:tcPr marL="63500" marR="63500" marT="63500" marB="63500" anchor="ctr"/>
+                </a:tc>
+                <a:tc>
+                  <a:txBody>
+                    <a:bodyPr/>
+                    <a:lstStyle/>
+                    <a:p>
+                      <a:pPr algn="ctr" rtl="0" fontAlgn="ctr">
+                        <a:spcBef>
+                          <a:spcPts val="0"/>
+                        </a:spcBef>
+                        <a:spcAft>
+                          <a:spcPts val="0"/>
+                        </a:spcAft>
+                      </a:pPr>
+                      <a:endParaRPr lang="en-US" sz="1400" b="0" u="none" dirty="0">
+                        <a:solidFill>
+                          <a:schemeClr val="tx1"/>
+                        </a:solidFill>
+                        <a:effectLst/>
+                        <a:latin typeface="Times New Roman" panose="02020603050405020304" pitchFamily="18" charset="0"/>
+                        <a:cs typeface="Times New Roman" panose="02020603050405020304" pitchFamily="18" charset="0"/>
+                      </a:endParaRPr>
+                    </a:p>
+                  </a:txBody>
+                  <a:tcPr marL="63500" marR="63500" marT="63500" marB="63500" anchor="ctr"/>
+                </a:tc>
+                <a:extLst>
+                  <a:ext uri="{0D108BD9-81ED-4DB2-BD59-A6C34878D82A}">
+                    <a16:rowId xmlns:a16="http://schemas.microsoft.com/office/drawing/2014/main" val="1151525627"/>
+                  </a:ext>
+                </a:extLst>
+              </a:tr>
+              <a:tr h="317209">
+                <a:tc>
+                  <a:txBody>
+                    <a:bodyPr/>
+                    <a:lstStyle/>
+                    <a:p>
+                      <a:pPr algn="ctr" rtl="0" fontAlgn="t">
+                        <a:spcBef>
+                          <a:spcPts val="0"/>
+                        </a:spcBef>
+                        <a:spcAft>
+                          <a:spcPts val="0"/>
+                        </a:spcAft>
+                      </a:pPr>
+                      <a:r>
+                        <a:rPr lang="en-US" sz="1400" b="0" i="0" u="none" dirty="0">
+                          <a:solidFill>
+                            <a:schemeClr val="tx1"/>
+                          </a:solidFill>
+                          <a:effectLst/>
+                          <a:latin typeface="Times New Roman" panose="02020603050405020304" pitchFamily="18" charset="0"/>
+                          <a:cs typeface="Times New Roman" panose="02020603050405020304" pitchFamily="18" charset="0"/>
+                        </a:rPr>
+                        <a:t>9</a:t>
+                      </a:r>
+                    </a:p>
+                  </a:txBody>
+                  <a:tcPr marL="63500" marR="63500" marT="63500" marB="63500" anchor="ctr"/>
+                </a:tc>
+                <a:tc>
+                  <a:txBody>
+                    <a:bodyPr/>
+                    <a:lstStyle/>
+                    <a:p>
+                      <a:pPr algn="ctr" rtl="0" fontAlgn="ctr">
+                        <a:spcBef>
+                          <a:spcPts val="0"/>
+                        </a:spcBef>
+                        <a:spcAft>
+                          <a:spcPts val="0"/>
+                        </a:spcAft>
+                      </a:pPr>
+                      <a:endParaRPr lang="en-US" sz="1400" b="0" u="none" dirty="0">
+                        <a:solidFill>
+                          <a:schemeClr val="tx1"/>
+                        </a:solidFill>
+                        <a:effectLst/>
+                        <a:latin typeface="Times New Roman" panose="02020603050405020304" pitchFamily="18" charset="0"/>
+                        <a:cs typeface="Times New Roman" panose="02020603050405020304" pitchFamily="18" charset="0"/>
+                      </a:endParaRPr>
+                    </a:p>
+                  </a:txBody>
+                  <a:tcPr marL="63500" marR="63500" marT="63500" marB="63500" anchor="ctr"/>
+                </a:tc>
+                <a:tc>
+                  <a:txBody>
+                    <a:bodyPr/>
+                    <a:lstStyle/>
+                    <a:p>
+                      <a:pPr algn="ctr" rtl="0" fontAlgn="ctr">
+                        <a:spcBef>
+                          <a:spcPts val="0"/>
+                        </a:spcBef>
+                        <a:spcAft>
+                          <a:spcPts val="0"/>
+                        </a:spcAft>
+                      </a:pPr>
+                      <a:endParaRPr lang="en-US" sz="1400" b="1" u="none" dirty="0">
+                        <a:solidFill>
+                          <a:schemeClr val="tx1"/>
+                        </a:solidFill>
+                        <a:effectLst/>
+                        <a:latin typeface="Times New Roman" panose="02020603050405020304" pitchFamily="18" charset="0"/>
+                        <a:cs typeface="Times New Roman" panose="02020603050405020304" pitchFamily="18" charset="0"/>
+                      </a:endParaRPr>
+                    </a:p>
+                  </a:txBody>
+                  <a:tcPr marL="63500" marR="63500" marT="63500" marB="63500" anchor="ctr"/>
+                </a:tc>
+                <a:tc>
+                  <a:txBody>
+                    <a:bodyPr/>
+                    <a:lstStyle/>
+                    <a:p>
+                      <a:pPr algn="ctr" rtl="0" fontAlgn="ctr">
+                        <a:spcBef>
+                          <a:spcPts val="0"/>
+                        </a:spcBef>
+                        <a:spcAft>
+                          <a:spcPts val="0"/>
+                        </a:spcAft>
+                      </a:pPr>
+                      <a:endParaRPr lang="en-US" sz="1400" b="0" u="none" dirty="0">
+                        <a:solidFill>
+                          <a:schemeClr val="tx1"/>
+                        </a:solidFill>
+                        <a:effectLst/>
+                        <a:latin typeface="Times New Roman" panose="02020603050405020304" pitchFamily="18" charset="0"/>
+                        <a:cs typeface="Times New Roman" panose="02020603050405020304" pitchFamily="18" charset="0"/>
+                      </a:endParaRPr>
+                    </a:p>
+                  </a:txBody>
+                  <a:tcPr marL="63500" marR="63500" marT="63500" marB="63500" anchor="ctr"/>
+                </a:tc>
+                <a:tc>
+                  <a:txBody>
+                    <a:bodyPr/>
+                    <a:lstStyle/>
+                    <a:p>
+                      <a:pPr algn="ctr" rtl="0" fontAlgn="ctr">
+                        <a:spcBef>
+                          <a:spcPts val="0"/>
+                        </a:spcBef>
+                        <a:spcAft>
+                          <a:spcPts val="0"/>
+                        </a:spcAft>
+                      </a:pPr>
+                      <a:endParaRPr lang="en-US" sz="1400" b="0" u="none" dirty="0">
+                        <a:solidFill>
+                          <a:schemeClr val="tx1"/>
+                        </a:solidFill>
+                        <a:effectLst/>
+                        <a:latin typeface="Times New Roman" panose="02020603050405020304" pitchFamily="18" charset="0"/>
+                        <a:cs typeface="Times New Roman" panose="02020603050405020304" pitchFamily="18" charset="0"/>
+                      </a:endParaRPr>
+                    </a:p>
+                  </a:txBody>
+                  <a:tcPr marL="63500" marR="63500" marT="63500" marB="63500" anchor="ctr"/>
+                </a:tc>
+                <a:tc>
+                  <a:txBody>
+                    <a:bodyPr/>
+                    <a:lstStyle/>
+                    <a:p>
+                      <a:pPr algn="ctr" rtl="0" fontAlgn="ctr">
+                        <a:spcBef>
+                          <a:spcPts val="0"/>
+                        </a:spcBef>
+                        <a:spcAft>
+                          <a:spcPts val="0"/>
+                        </a:spcAft>
+                      </a:pPr>
+                      <a:endParaRPr lang="en-US" sz="1400" b="0" u="none" dirty="0">
+                        <a:solidFill>
+                          <a:schemeClr val="tx1"/>
+                        </a:solidFill>
+                        <a:effectLst/>
+                        <a:latin typeface="Times New Roman" panose="02020603050405020304" pitchFamily="18" charset="0"/>
+                        <a:cs typeface="Times New Roman" panose="02020603050405020304" pitchFamily="18" charset="0"/>
+                      </a:endParaRPr>
+                    </a:p>
+                  </a:txBody>
+                  <a:tcPr marL="63500" marR="63500" marT="63500" marB="63500" anchor="ctr"/>
+                </a:tc>
+                <a:tc>
+                  <a:txBody>
+                    <a:bodyPr/>
+                    <a:lstStyle/>
+                    <a:p>
+                      <a:pPr algn="ctr" rtl="0" fontAlgn="ctr">
+                        <a:spcBef>
+                          <a:spcPts val="0"/>
+                        </a:spcBef>
+                        <a:spcAft>
+                          <a:spcPts val="0"/>
+                        </a:spcAft>
+                      </a:pPr>
+                      <a:endParaRPr lang="en-US" sz="1400" b="0" u="none" dirty="0">
+                        <a:solidFill>
+                          <a:schemeClr val="tx1"/>
+                        </a:solidFill>
+                        <a:effectLst/>
+                        <a:latin typeface="Times New Roman" panose="02020603050405020304" pitchFamily="18" charset="0"/>
+                        <a:cs typeface="Times New Roman" panose="02020603050405020304" pitchFamily="18" charset="0"/>
+                      </a:endParaRPr>
+                    </a:p>
+                  </a:txBody>
+                  <a:tcPr marL="63500" marR="63500" marT="63500" marB="63500" anchor="ctr"/>
+                </a:tc>
+                <a:tc>
+                  <a:txBody>
+                    <a:bodyPr/>
+                    <a:lstStyle/>
+                    <a:p>
+                      <a:pPr algn="ctr" rtl="0" fontAlgn="ctr">
+                        <a:spcBef>
+                          <a:spcPts val="0"/>
+                        </a:spcBef>
+                        <a:spcAft>
+                          <a:spcPts val="0"/>
+                        </a:spcAft>
+                      </a:pPr>
+                      <a:endParaRPr lang="en-US" sz="1400" b="0" u="none" dirty="0">
+                        <a:solidFill>
+                          <a:schemeClr val="tx1"/>
+                        </a:solidFill>
+                        <a:effectLst/>
+                        <a:latin typeface="Times New Roman" panose="02020603050405020304" pitchFamily="18" charset="0"/>
+                        <a:cs typeface="Times New Roman" panose="02020603050405020304" pitchFamily="18" charset="0"/>
+                      </a:endParaRPr>
+                    </a:p>
+                  </a:txBody>
+                  <a:tcPr marL="63500" marR="63500" marT="63500" marB="63500" anchor="ctr"/>
+                </a:tc>
+                <a:tc>
+                  <a:txBody>
+                    <a:bodyPr/>
+                    <a:lstStyle/>
+                    <a:p>
+                      <a:pPr algn="ctr" rtl="0" fontAlgn="ctr">
+                        <a:spcBef>
+                          <a:spcPts val="0"/>
+                        </a:spcBef>
+                        <a:spcAft>
+                          <a:spcPts val="0"/>
+                        </a:spcAft>
+                      </a:pPr>
+                      <a:endParaRPr lang="en-US" sz="1400" b="0" u="none" dirty="0">
+                        <a:solidFill>
+                          <a:schemeClr val="tx1"/>
+                        </a:solidFill>
+                        <a:effectLst/>
+                        <a:latin typeface="Times New Roman" panose="02020603050405020304" pitchFamily="18" charset="0"/>
+                        <a:cs typeface="Times New Roman" panose="02020603050405020304" pitchFamily="18" charset="0"/>
+                      </a:endParaRPr>
+                    </a:p>
+                  </a:txBody>
+                  <a:tcPr marL="63500" marR="63500" marT="63500" marB="63500" anchor="ctr"/>
+                </a:tc>
+                <a:extLst>
+                  <a:ext uri="{0D108BD9-81ED-4DB2-BD59-A6C34878D82A}">
+                    <a16:rowId xmlns:a16="http://schemas.microsoft.com/office/drawing/2014/main" val="1885183063"/>
+                  </a:ext>
+                </a:extLst>
+              </a:tr>
+              <a:tr h="317209">
+                <a:tc>
+                  <a:txBody>
+                    <a:bodyPr/>
+                    <a:lstStyle/>
+                    <a:p>
+                      <a:pPr algn="ctr" rtl="0" fontAlgn="t">
+                        <a:spcBef>
+                          <a:spcPts val="0"/>
+                        </a:spcBef>
+                        <a:spcAft>
+                          <a:spcPts val="0"/>
+                        </a:spcAft>
+                      </a:pPr>
+                      <a:r>
+                        <a:rPr lang="en-US" sz="1400" b="0" i="0" u="none" dirty="0">
+                          <a:solidFill>
+                            <a:schemeClr val="tx1"/>
+                          </a:solidFill>
+                          <a:effectLst/>
+                          <a:latin typeface="Times New Roman" panose="02020603050405020304" pitchFamily="18" charset="0"/>
+                          <a:cs typeface="Times New Roman" panose="02020603050405020304" pitchFamily="18" charset="0"/>
+                        </a:rPr>
+                        <a:t>10</a:t>
+                      </a:r>
+                    </a:p>
+                  </a:txBody>
+                  <a:tcPr marL="63500" marR="63500" marT="63500" marB="63500" anchor="ctr"/>
+                </a:tc>
+                <a:tc>
+                  <a:txBody>
+                    <a:bodyPr/>
+                    <a:lstStyle/>
+                    <a:p>
+                      <a:pPr algn="ctr" rtl="0" fontAlgn="ctr">
+                        <a:spcBef>
+                          <a:spcPts val="0"/>
+                        </a:spcBef>
+                        <a:spcAft>
+                          <a:spcPts val="0"/>
+                        </a:spcAft>
+                      </a:pPr>
+                      <a:r>
+                        <a:rPr lang="en-US" sz="1400" b="1" u="none" dirty="0">
+                          <a:solidFill>
+                            <a:schemeClr val="tx1"/>
+                          </a:solidFill>
+                          <a:effectLst/>
+                          <a:latin typeface="Times New Roman" panose="02020603050405020304" pitchFamily="18" charset="0"/>
+                          <a:cs typeface="Times New Roman" panose="02020603050405020304" pitchFamily="18" charset="0"/>
+                        </a:rPr>
+                        <a:t>0.3523</a:t>
+                      </a:r>
+                    </a:p>
+                  </a:txBody>
+                  <a:tcPr marL="63500" marR="63500" marT="63500" marB="63500" anchor="ctr"/>
+                </a:tc>
+                <a:tc>
+                  <a:txBody>
+                    <a:bodyPr/>
+                    <a:lstStyle/>
+                    <a:p>
+                      <a:pPr algn="ctr" rtl="0" fontAlgn="ctr">
+                        <a:spcBef>
+                          <a:spcPts val="0"/>
+                        </a:spcBef>
+                        <a:spcAft>
+                          <a:spcPts val="0"/>
+                        </a:spcAft>
+                      </a:pPr>
+                      <a:r>
+                        <a:rPr lang="en-US" sz="1400" b="0" u="none" dirty="0">
+                          <a:solidFill>
+                            <a:schemeClr val="tx1"/>
+                          </a:solidFill>
+                          <a:effectLst/>
+                          <a:latin typeface="Times New Roman" panose="02020603050405020304" pitchFamily="18" charset="0"/>
+                          <a:cs typeface="Times New Roman" panose="02020603050405020304" pitchFamily="18" charset="0"/>
+                        </a:rPr>
+                        <a:t>0.2500</a:t>
+                      </a:r>
+                    </a:p>
+                  </a:txBody>
+                  <a:tcPr marL="63500" marR="63500" marT="63500" marB="63500" anchor="ctr"/>
+                </a:tc>
+                <a:tc>
+                  <a:txBody>
+                    <a:bodyPr/>
+                    <a:lstStyle/>
+                    <a:p>
+                      <a:pPr algn="ctr" rtl="0" fontAlgn="ctr">
+                        <a:spcBef>
+                          <a:spcPts val="0"/>
+                        </a:spcBef>
+                        <a:spcAft>
+                          <a:spcPts val="0"/>
+                        </a:spcAft>
+                      </a:pPr>
+                      <a:r>
+                        <a:rPr lang="en-US" sz="1400" b="0" u="none" dirty="0">
+                          <a:solidFill>
+                            <a:schemeClr val="tx1"/>
+                          </a:solidFill>
+                          <a:effectLst/>
+                          <a:latin typeface="Times New Roman" panose="02020603050405020304" pitchFamily="18" charset="0"/>
+                          <a:cs typeface="Times New Roman" panose="02020603050405020304" pitchFamily="18" charset="0"/>
+                        </a:rPr>
+                        <a:t>0.4100</a:t>
+                      </a:r>
+                    </a:p>
+                  </a:txBody>
+                  <a:tcPr marL="63500" marR="63500" marT="63500" marB="63500" anchor="ctr"/>
+                </a:tc>
+                <a:tc>
+                  <a:txBody>
+                    <a:bodyPr/>
+                    <a:lstStyle/>
+                    <a:p>
+                      <a:pPr algn="ctr" rtl="0" fontAlgn="ctr">
+                        <a:spcBef>
+                          <a:spcPts val="0"/>
+                        </a:spcBef>
+                        <a:spcAft>
+                          <a:spcPts val="0"/>
+                        </a:spcAft>
+                      </a:pPr>
+                      <a:r>
+                        <a:rPr lang="en-US" sz="1400" b="0" u="none" dirty="0">
+                          <a:solidFill>
+                            <a:schemeClr val="tx1"/>
+                          </a:solidFill>
+                          <a:effectLst/>
+                          <a:latin typeface="Times New Roman" panose="02020603050405020304" pitchFamily="18" charset="0"/>
+                          <a:cs typeface="Times New Roman" panose="02020603050405020304" pitchFamily="18" charset="0"/>
+                        </a:rPr>
+                        <a:t> 0.5600</a:t>
+                      </a:r>
+                    </a:p>
+                  </a:txBody>
+                  <a:tcPr marL="63500" marR="63500" marT="63500" marB="63500" anchor="ctr"/>
+                </a:tc>
+                <a:tc>
+                  <a:txBody>
+                    <a:bodyPr/>
+                    <a:lstStyle/>
+                    <a:p>
+                      <a:pPr algn="ctr" rtl="0" fontAlgn="ctr">
+                        <a:spcBef>
+                          <a:spcPts val="0"/>
+                        </a:spcBef>
+                        <a:spcAft>
+                          <a:spcPts val="0"/>
+                        </a:spcAft>
+                      </a:pPr>
+                      <a:endParaRPr lang="en-US" sz="1400" b="0" u="none" dirty="0">
+                        <a:solidFill>
+                          <a:schemeClr val="tx1"/>
+                        </a:solidFill>
+                        <a:effectLst/>
+                        <a:latin typeface="Times New Roman" panose="02020603050405020304" pitchFamily="18" charset="0"/>
+                        <a:cs typeface="Times New Roman" panose="02020603050405020304" pitchFamily="18" charset="0"/>
+                      </a:endParaRPr>
+                    </a:p>
+                  </a:txBody>
+                  <a:tcPr marL="63500" marR="63500" marT="63500" marB="63500" anchor="ctr"/>
+                </a:tc>
+                <a:tc>
+                  <a:txBody>
+                    <a:bodyPr/>
+                    <a:lstStyle/>
+                    <a:p>
+                      <a:pPr algn="ctr" rtl="0" fontAlgn="ctr">
+                        <a:spcBef>
+                          <a:spcPts val="0"/>
+                        </a:spcBef>
+                        <a:spcAft>
+                          <a:spcPts val="0"/>
+                        </a:spcAft>
+                      </a:pPr>
+                      <a:endParaRPr lang="en-US" sz="1400" b="0" u="none" dirty="0">
+                        <a:solidFill>
+                          <a:schemeClr val="tx1"/>
+                        </a:solidFill>
+                        <a:effectLst/>
+                        <a:latin typeface="Times New Roman" panose="02020603050405020304" pitchFamily="18" charset="0"/>
+                        <a:cs typeface="Times New Roman" panose="02020603050405020304" pitchFamily="18" charset="0"/>
+                      </a:endParaRPr>
+                    </a:p>
+                  </a:txBody>
+                  <a:tcPr marL="63500" marR="63500" marT="63500" marB="63500" anchor="ctr"/>
+                </a:tc>
+                <a:tc>
+                  <a:txBody>
+                    <a:bodyPr/>
+                    <a:lstStyle/>
+                    <a:p>
+                      <a:pPr algn="ctr" rtl="0" fontAlgn="ctr">
+                        <a:spcBef>
+                          <a:spcPts val="0"/>
+                        </a:spcBef>
+                        <a:spcAft>
+                          <a:spcPts val="0"/>
+                        </a:spcAft>
+                      </a:pPr>
+                      <a:endParaRPr lang="en-US" sz="1400" b="0" u="none" dirty="0">
+                        <a:solidFill>
+                          <a:schemeClr val="tx1"/>
+                        </a:solidFill>
+                        <a:effectLst/>
+                        <a:latin typeface="Times New Roman" panose="02020603050405020304" pitchFamily="18" charset="0"/>
+                        <a:cs typeface="Times New Roman" panose="02020603050405020304" pitchFamily="18" charset="0"/>
+                      </a:endParaRPr>
+                    </a:p>
+                  </a:txBody>
+                  <a:tcPr marL="63500" marR="63500" marT="63500" marB="63500" anchor="ctr"/>
+                </a:tc>
+                <a:tc>
+                  <a:txBody>
+                    <a:bodyPr/>
+                    <a:lstStyle/>
+                    <a:p>
+                      <a:pPr algn="ctr" rtl="0" fontAlgn="ctr">
+                        <a:spcBef>
+                          <a:spcPts val="0"/>
+                        </a:spcBef>
+                        <a:spcAft>
+                          <a:spcPts val="0"/>
+                        </a:spcAft>
+                      </a:pPr>
+                      <a:endParaRPr lang="en-US" sz="1400" b="0" u="none" dirty="0">
+                        <a:solidFill>
+                          <a:schemeClr val="tx1"/>
+                        </a:solidFill>
+                        <a:effectLst/>
+                        <a:latin typeface="Times New Roman" panose="02020603050405020304" pitchFamily="18" charset="0"/>
+                        <a:cs typeface="Times New Roman" panose="02020603050405020304" pitchFamily="18" charset="0"/>
+                      </a:endParaRPr>
+                    </a:p>
+                  </a:txBody>
+                  <a:tcPr marL="63500" marR="63500" marT="63500" marB="63500" anchor="ctr"/>
+                </a:tc>
+                <a:extLst>
+                  <a:ext uri="{0D108BD9-81ED-4DB2-BD59-A6C34878D82A}">
+                    <a16:rowId xmlns:a16="http://schemas.microsoft.com/office/drawing/2014/main" val="1833571747"/>
+                  </a:ext>
+                </a:extLst>
+              </a:tr>
+            </a:tbl>
+          </a:graphicData>
+        </a:graphic>
+      </p:graphicFrame>
+    </p:spTree>
+    <p:extLst>
+      <p:ext uri="{BB962C8B-B14F-4D97-AF65-F5344CB8AC3E}">
+        <p14:creationId xmlns:p14="http://schemas.microsoft.com/office/powerpoint/2010/main" val="2446943152"/>
+      </p:ext>
+    </p:extLst>
+  </p:cSld>
+  <p:clrMapOvr>
+    <a:overrideClrMapping bg1="lt1" tx1="dk1" bg2="lt2" tx2="dk2" accent1="accent1" accent2="accent2" accent3="accent3" accent4="accent4" accent5="accent5" accent6="accent6" hlink="hlink" folHlink="folHlink"/>
+  </p:clrMapOvr>
+</p:sld>
+</file>
+
+<file path=ppt/slides/slide7.xml><?xml version="1.0" encoding="utf-8"?>
+<p:sld xmlns:a="http://schemas.openxmlformats.org/drawingml/2006/main" xmlns:r="http://schemas.openxmlformats.org/officeDocument/2006/relationships" xmlns:p="http://schemas.openxmlformats.org/presentationml/2006/main">
+  <p:cSld>
+    <p:bg>
+      <p:bgPr>
+        <a:solidFill>
+          <a:schemeClr val="bg1"/>
+        </a:solidFill>
+        <a:effectLst/>
+      </p:bgPr>
+    </p:bg>
+    <p:spTree>
+      <p:nvGrpSpPr>
+        <p:cNvPr id="1" name=""/>
+        <p:cNvGrpSpPr/>
+        <p:nvPr/>
+      </p:nvGrpSpPr>
+      <p:grpSpPr>
+        <a:xfrm>
+          <a:off x="0" y="0"/>
+          <a:ext cx="0" cy="0"/>
+          <a:chOff x="0" y="0"/>
+          <a:chExt cx="0" cy="0"/>
+        </a:xfrm>
+      </p:grpSpPr>
+      <p:sp>
+        <p:nvSpPr>
           <p:cNvPr id="9" name="Rectangle 8">
             <a:extLst>
               <a:ext uri="{FF2B5EF4-FFF2-40B4-BE49-F238E27FC236}">
@@ -14827,7 +19239,7 @@
             <p:ph idx="1"/>
             <p:extLst>
               <p:ext uri="{D42A27DB-BD31-4B8C-83A1-F6EECF244321}">
-                <p14:modId xmlns:p14="http://schemas.microsoft.com/office/powerpoint/2010/main" val="1816009552"/>
+                <p14:modId xmlns:p14="http://schemas.microsoft.com/office/powerpoint/2010/main" val="1477387001"/>
               </p:ext>
             </p:extLst>
           </p:nvPr>
@@ -15624,7 +20036,7 @@
 </p:sld>
 </file>
 
-<file path=ppt/slides/slide7.xml><?xml version="1.0" encoding="utf-8"?>
+<file path=ppt/slides/slide8.xml><?xml version="1.0" encoding="utf-8"?>
 <p:sld xmlns:a="http://schemas.openxmlformats.org/drawingml/2006/main" xmlns:r="http://schemas.openxmlformats.org/officeDocument/2006/relationships" xmlns:p="http://schemas.openxmlformats.org/presentationml/2006/main">
   <p:cSld>
     <p:spTree>

</xml_diff>